<commit_message>
Adding the up-to-date powerpoint presentation. All that remains is the pictures of each of the team members and potentially some more future enhancements
</commit_message>
<xml_diff>
--- a/Project2_Presentation_Material.pptx
+++ b/Project2_Presentation_Material.pptx
@@ -9,9 +9,10 @@
     <p:sldId id="257" r:id="rId3"/>
     <p:sldId id="258" r:id="rId4"/>
     <p:sldId id="259" r:id="rId5"/>
-    <p:sldId id="260" r:id="rId6"/>
-    <p:sldId id="261" r:id="rId7"/>
-    <p:sldId id="263" r:id="rId8"/>
+    <p:sldId id="264" r:id="rId6"/>
+    <p:sldId id="260" r:id="rId7"/>
+    <p:sldId id="261" r:id="rId8"/>
+    <p:sldId id="263" r:id="rId9"/>
   </p:sldIdLst>
   <p:sldSz cx="12192000" cy="6858000"/>
   <p:notesSz cx="6858000" cy="9144000"/>
@@ -257,7 +258,7 @@
           <a:p>
             <a:fld id="{48A87A34-81AB-432B-8DAE-1953F412C126}" type="datetimeFigureOut">
               <a:rPr lang="en-US" dirty="0"/>
-              <a:t>12/17/2019</a:t>
+              <a:t>1/10/2020</a:t>
             </a:fld>
             <a:endParaRPr lang="en-US" dirty="0"/>
           </a:p>
@@ -463,7 +464,7 @@
           <a:p>
             <a:fld id="{48A87A34-81AB-432B-8DAE-1953F412C126}" type="datetimeFigureOut">
               <a:rPr lang="en-US" dirty="0"/>
-              <a:t>12/17/2019</a:t>
+              <a:t>1/10/2020</a:t>
             </a:fld>
             <a:endParaRPr lang="en-US" dirty="0"/>
           </a:p>
@@ -673,7 +674,7 @@
           <a:p>
             <a:fld id="{48A87A34-81AB-432B-8DAE-1953F412C126}" type="datetimeFigureOut">
               <a:rPr lang="en-US" dirty="0"/>
-              <a:t>12/17/2019</a:t>
+              <a:t>1/10/2020</a:t>
             </a:fld>
             <a:endParaRPr lang="en-US" dirty="0"/>
           </a:p>
@@ -869,7 +870,7 @@
           <a:p>
             <a:fld id="{48A87A34-81AB-432B-8DAE-1953F412C126}" type="datetimeFigureOut">
               <a:rPr lang="en-US" dirty="0"/>
-              <a:t>12/17/2019</a:t>
+              <a:t>1/10/2020</a:t>
             </a:fld>
             <a:endParaRPr lang="en-US" dirty="0"/>
           </a:p>
@@ -1143,7 +1144,7 @@
           <a:p>
             <a:fld id="{48A87A34-81AB-432B-8DAE-1953F412C126}" type="datetimeFigureOut">
               <a:rPr lang="en-US" dirty="0"/>
-              <a:t>12/17/2019</a:t>
+              <a:t>1/10/2020</a:t>
             </a:fld>
             <a:endParaRPr lang="en-US" dirty="0"/>
           </a:p>
@@ -1406,7 +1407,7 @@
           <a:p>
             <a:fld id="{48A87A34-81AB-432B-8DAE-1953F412C126}" type="datetimeFigureOut">
               <a:rPr lang="en-US" dirty="0"/>
-              <a:t>12/17/2019</a:t>
+              <a:t>1/10/2020</a:t>
             </a:fld>
             <a:endParaRPr lang="en-US" dirty="0"/>
           </a:p>
@@ -1817,7 +1818,7 @@
           <a:p>
             <a:fld id="{48A87A34-81AB-432B-8DAE-1953F412C126}" type="datetimeFigureOut">
               <a:rPr lang="en-US" dirty="0"/>
-              <a:t>12/17/2019</a:t>
+              <a:t>1/10/2020</a:t>
             </a:fld>
             <a:endParaRPr lang="en-US" dirty="0"/>
           </a:p>
@@ -1961,7 +1962,7 @@
           <a:p>
             <a:fld id="{48A87A34-81AB-432B-8DAE-1953F412C126}" type="datetimeFigureOut">
               <a:rPr lang="en-US" dirty="0"/>
-              <a:t>12/17/2019</a:t>
+              <a:t>1/10/2020</a:t>
             </a:fld>
             <a:endParaRPr lang="en-US" dirty="0"/>
           </a:p>
@@ -2082,7 +2083,7 @@
           <a:p>
             <a:fld id="{48A87A34-81AB-432B-8DAE-1953F412C126}" type="datetimeFigureOut">
               <a:rPr lang="en-US" dirty="0"/>
-              <a:t>12/17/2019</a:t>
+              <a:t>1/10/2020</a:t>
             </a:fld>
             <a:endParaRPr lang="en-US" dirty="0"/>
           </a:p>
@@ -2328,7 +2329,7 @@
           <a:p>
             <a:fld id="{48A87A34-81AB-432B-8DAE-1953F412C126}" type="datetimeFigureOut">
               <a:rPr lang="en-US" dirty="0"/>
-              <a:t>12/17/2019</a:t>
+              <a:t>1/10/2020</a:t>
             </a:fld>
             <a:endParaRPr lang="en-US" dirty="0"/>
           </a:p>
@@ -2769,7 +2770,7 @@
             <a:fld id="{48A87A34-81AB-432B-8DAE-1953F412C126}" type="datetimeFigureOut">
               <a:rPr lang="en-US" dirty="0"/>
               <a:pPr/>
-              <a:t>12/17/2019</a:t>
+              <a:t>1/10/2020</a:t>
             </a:fld>
             <a:endParaRPr lang="en-US" dirty="0"/>
           </a:p>
@@ -3092,7 +3093,7 @@
             <a:fld id="{48A87A34-81AB-432B-8DAE-1953F412C126}" type="datetimeFigureOut">
               <a:rPr lang="en-US" dirty="0"/>
               <a:pPr/>
-              <a:t>12/17/2019</a:t>
+              <a:t>1/10/2020</a:t>
             </a:fld>
             <a:endParaRPr lang="en-US" dirty="0"/>
           </a:p>
@@ -3596,8 +3597,10 @@
           <a:lstStyle/>
           <a:p>
             <a:r>
-              <a:rPr lang="en-US" dirty="0"/>
-              <a:t>Project 2</a:t>
+              <a:rPr lang="en-US" dirty="0">
+                <a:latin typeface="Cooper Black" panose="0208090404030B020404" pitchFamily="18" charset="0"/>
+              </a:rPr>
+              <a:t>Look out</a:t>
             </a:r>
           </a:p>
         </p:txBody>
@@ -3655,7 +3658,7 @@
           <a:p>
             <a:r>
               <a:rPr lang="en-US" dirty="0"/>
-              <a:t>Outline</a:t>
+              <a:t>Agenda</a:t>
             </a:r>
           </a:p>
         </p:txBody>
@@ -3690,6 +3693,12 @@
             <a:r>
               <a:rPr lang="en-US" dirty="0"/>
               <a:t>Proposal</a:t>
+            </a:r>
+          </a:p>
+          <a:p>
+            <a:r>
+              <a:rPr lang="en-US" dirty="0"/>
+              <a:t>Future Enhancements</a:t>
             </a:r>
           </a:p>
           <a:p>
@@ -3820,7 +3829,7 @@
         </p:nvSpPr>
         <p:spPr>
           <a:xfrm>
-            <a:off x="3270207" y="5287619"/>
+            <a:off x="3507274" y="5287619"/>
             <a:ext cx="2014330" cy="369332"/>
           </a:xfrm>
           <a:prstGeom prst="rect">
@@ -3856,7 +3865,7 @@
         </p:nvSpPr>
         <p:spPr>
           <a:xfrm>
-            <a:off x="6096000" y="5287618"/>
+            <a:off x="6570134" y="5292037"/>
             <a:ext cx="2405734" cy="369332"/>
           </a:xfrm>
           <a:prstGeom prst="rect">
@@ -3998,12 +4007,25 @@
             <p:ph idx="1"/>
           </p:nvPr>
         </p:nvSpPr>
-        <p:spPr/>
-        <p:txBody>
-          <a:bodyPr/>
-          <a:lstStyle/>
-          <a:p>
-            <a:endParaRPr lang="en-US"/>
+        <p:spPr>
+          <a:xfrm>
+            <a:off x="1451579" y="2857822"/>
+            <a:ext cx="9603275" cy="1899776"/>
+          </a:xfrm>
+        </p:spPr>
+        <p:txBody>
+          <a:bodyPr>
+            <a:normAutofit/>
+          </a:bodyPr>
+          <a:lstStyle/>
+          <a:p>
+            <a:pPr marL="0" indent="0" algn="ctr">
+              <a:buNone/>
+            </a:pPr>
+            <a:r>
+              <a:rPr lang="en-US" sz="3200" dirty="0"/>
+              <a:t>Our team wanted to create a Crime Lookup Application that allows users to search by location crimes that have/are occurring near them</a:t>
+            </a:r>
           </a:p>
         </p:txBody>
       </p:sp>
@@ -4042,7 +4064,7 @@
           <p:cNvPr id="2" name="Title 1">
             <a:extLst>
               <a:ext uri="{FF2B5EF4-FFF2-40B4-BE49-F238E27FC236}">
-                <a16:creationId xmlns:a16="http://schemas.microsoft.com/office/drawing/2014/main" id="{2F361537-FA9D-AD46-9B07-5B7CE824D1CF}"/>
+                <a16:creationId xmlns:a16="http://schemas.microsoft.com/office/drawing/2014/main" id="{B3D7FB5C-4310-954C-9EF8-BE836080327B}"/>
               </a:ext>
             </a:extLst>
           </p:cNvPr>
@@ -4059,12 +4081,8 @@
           <a:lstStyle/>
           <a:p>
             <a:r>
-              <a:rPr lang="en-US" dirty="0" err="1"/>
-              <a:t>nEW</a:t>
-            </a:r>
-            <a:r>
               <a:rPr lang="en-US" dirty="0"/>
-              <a:t> technology used</a:t>
+              <a:t>Future Enhancements </a:t>
             </a:r>
           </a:p>
         </p:txBody>
@@ -4074,7 +4092,7 @@
           <p:cNvPr id="3" name="Content Placeholder 2">
             <a:extLst>
               <a:ext uri="{FF2B5EF4-FFF2-40B4-BE49-F238E27FC236}">
-                <a16:creationId xmlns:a16="http://schemas.microsoft.com/office/drawing/2014/main" id="{F9F82464-3A17-8946-A749-E1740872BD0F}"/>
+                <a16:creationId xmlns:a16="http://schemas.microsoft.com/office/drawing/2014/main" id="{BB81AC18-2F7E-7D40-B080-42E6AF6AF522}"/>
               </a:ext>
             </a:extLst>
           </p:cNvPr>
@@ -4090,14 +4108,29 @@
           <a:bodyPr/>
           <a:lstStyle/>
           <a:p>
-            <a:endParaRPr lang="en-US"/>
+            <a:pPr marL="0" indent="0">
+              <a:buNone/>
+            </a:pPr>
+            <a:endParaRPr lang="en-US" dirty="0"/>
+          </a:p>
+          <a:p>
+            <a:r>
+              <a:rPr lang="en-US" dirty="0"/>
+              <a:t>Application can look up crimes around not only by City but also by an specific address given by the user</a:t>
+            </a:r>
+          </a:p>
+          <a:p>
+            <a:r>
+              <a:rPr lang="en-US" dirty="0"/>
+              <a:t>Live alerts- tracks your locations and alerts users in real time </a:t>
+            </a:r>
           </a:p>
         </p:txBody>
       </p:sp>
     </p:spTree>
     <p:extLst>
       <p:ext uri="{BB962C8B-B14F-4D97-AF65-F5344CB8AC3E}">
-        <p14:creationId xmlns:p14="http://schemas.microsoft.com/office/powerpoint/2010/main" val="3100956995"/>
+        <p14:creationId xmlns:p14="http://schemas.microsoft.com/office/powerpoint/2010/main" val="3932834931"/>
       </p:ext>
     </p:extLst>
   </p:cSld>
@@ -4129,6 +4162,418 @@
           <p:cNvPr id="2" name="Title 1">
             <a:extLst>
               <a:ext uri="{FF2B5EF4-FFF2-40B4-BE49-F238E27FC236}">
+                <a16:creationId xmlns:a16="http://schemas.microsoft.com/office/drawing/2014/main" id="{2F361537-FA9D-AD46-9B07-5B7CE824D1CF}"/>
+              </a:ext>
+            </a:extLst>
+          </p:cNvPr>
+          <p:cNvSpPr>
+            <a:spLocks noGrp="1"/>
+          </p:cNvSpPr>
+          <p:nvPr>
+            <p:ph type="title"/>
+          </p:nvPr>
+        </p:nvSpPr>
+        <p:spPr/>
+        <p:txBody>
+          <a:bodyPr/>
+          <a:lstStyle/>
+          <a:p>
+            <a:r>
+              <a:rPr lang="en-US" dirty="0" err="1"/>
+              <a:t>nEW</a:t>
+            </a:r>
+            <a:r>
+              <a:rPr lang="en-US" dirty="0"/>
+              <a:t> technologies used</a:t>
+            </a:r>
+          </a:p>
+        </p:txBody>
+      </p:sp>
+      <p:grpSp>
+        <p:nvGrpSpPr>
+          <p:cNvPr id="14" name="Group 13">
+            <a:extLst>
+              <a:ext uri="{FF2B5EF4-FFF2-40B4-BE49-F238E27FC236}">
+                <a16:creationId xmlns:a16="http://schemas.microsoft.com/office/drawing/2014/main" id="{CC5819F6-8481-4A1E-B309-15414416C7CE}"/>
+              </a:ext>
+            </a:extLst>
+          </p:cNvPr>
+          <p:cNvGrpSpPr/>
+          <p:nvPr/>
+        </p:nvGrpSpPr>
+        <p:grpSpPr>
+          <a:xfrm>
+            <a:off x="6367899" y="2302048"/>
+            <a:ext cx="1822140" cy="1887530"/>
+            <a:chOff x="4765322" y="3263819"/>
+            <a:chExt cx="2661356" cy="2974328"/>
+          </a:xfrm>
+        </p:grpSpPr>
+        <p:pic>
+          <p:nvPicPr>
+            <p:cNvPr id="6" name="Picture 5">
+              <a:extLst>
+                <a:ext uri="{FF2B5EF4-FFF2-40B4-BE49-F238E27FC236}">
+                  <a16:creationId xmlns:a16="http://schemas.microsoft.com/office/drawing/2014/main" id="{FE162867-291E-44DE-888C-D2F6C5345DC5}"/>
+                </a:ext>
+              </a:extLst>
+            </p:cNvPr>
+            <p:cNvPicPr>
+              <a:picLocks noChangeAspect="1"/>
+            </p:cNvPicPr>
+            <p:nvPr/>
+          </p:nvPicPr>
+          <p:blipFill>
+            <a:blip r:embed="rId2"/>
+            <a:stretch>
+              <a:fillRect/>
+            </a:stretch>
+          </p:blipFill>
+          <p:spPr>
+            <a:xfrm>
+              <a:off x="4765322" y="3263819"/>
+              <a:ext cx="2661356" cy="2566308"/>
+            </a:xfrm>
+            <a:prstGeom prst="rect">
+              <a:avLst/>
+            </a:prstGeom>
+          </p:spPr>
+        </p:pic>
+        <p:sp>
+          <p:nvSpPr>
+            <p:cNvPr id="8" name="TextBox 7">
+              <a:extLst>
+                <a:ext uri="{FF2B5EF4-FFF2-40B4-BE49-F238E27FC236}">
+                  <a16:creationId xmlns:a16="http://schemas.microsoft.com/office/drawing/2014/main" id="{B437F1C4-5F4F-4E54-8ED1-5120ECA35857}"/>
+                </a:ext>
+              </a:extLst>
+            </p:cNvPr>
+            <p:cNvSpPr txBox="1"/>
+            <p:nvPr/>
+          </p:nvSpPr>
+          <p:spPr>
+            <a:xfrm>
+              <a:off x="4765322" y="5868815"/>
+              <a:ext cx="2661356" cy="369332"/>
+            </a:xfrm>
+            <a:prstGeom prst="rect">
+              <a:avLst/>
+            </a:prstGeom>
+            <a:noFill/>
+          </p:spPr>
+          <p:txBody>
+            <a:bodyPr wrap="square" rtlCol="0">
+              <a:spAutoFit/>
+            </a:bodyPr>
+            <a:lstStyle/>
+            <a:p>
+              <a:pPr algn="ctr"/>
+              <a:r>
+                <a:rPr lang="en-US" dirty="0"/>
+                <a:t>Cheerio</a:t>
+              </a:r>
+            </a:p>
+          </p:txBody>
+        </p:sp>
+      </p:grpSp>
+      <p:pic>
+        <p:nvPicPr>
+          <p:cNvPr id="4" name="Picture 3">
+            <a:extLst>
+              <a:ext uri="{FF2B5EF4-FFF2-40B4-BE49-F238E27FC236}">
+                <a16:creationId xmlns:a16="http://schemas.microsoft.com/office/drawing/2014/main" id="{9A9190B6-A89C-4488-B30F-DC51232635BD}"/>
+              </a:ext>
+            </a:extLst>
+          </p:cNvPr>
+          <p:cNvPicPr>
+            <a:picLocks noChangeAspect="1"/>
+          </p:cNvPicPr>
+          <p:nvPr/>
+        </p:nvPicPr>
+        <p:blipFill>
+          <a:blip r:embed="rId3"/>
+          <a:stretch>
+            <a:fillRect/>
+          </a:stretch>
+        </p:blipFill>
+        <p:spPr>
+          <a:xfrm>
+            <a:off x="1975211" y="2302048"/>
+            <a:ext cx="2478164" cy="1628596"/>
+          </a:xfrm>
+          <a:prstGeom prst="rect">
+            <a:avLst/>
+          </a:prstGeom>
+        </p:spPr>
+      </p:pic>
+      <p:sp>
+        <p:nvSpPr>
+          <p:cNvPr id="10" name="TextBox 9">
+            <a:extLst>
+              <a:ext uri="{FF2B5EF4-FFF2-40B4-BE49-F238E27FC236}">
+                <a16:creationId xmlns:a16="http://schemas.microsoft.com/office/drawing/2014/main" id="{947E9A6A-5D24-41A8-8CE3-9FAB92E7A365}"/>
+              </a:ext>
+            </a:extLst>
+          </p:cNvPr>
+          <p:cNvSpPr txBox="1"/>
+          <p:nvPr/>
+        </p:nvSpPr>
+        <p:spPr>
+          <a:xfrm>
+            <a:off x="1975210" y="3930644"/>
+            <a:ext cx="2478164" cy="369332"/>
+          </a:xfrm>
+          <a:prstGeom prst="rect">
+            <a:avLst/>
+          </a:prstGeom>
+          <a:noFill/>
+        </p:spPr>
+        <p:txBody>
+          <a:bodyPr wrap="square" rtlCol="0">
+            <a:spAutoFit/>
+          </a:bodyPr>
+          <a:lstStyle/>
+          <a:p>
+            <a:pPr algn="ctr"/>
+            <a:r>
+              <a:rPr lang="en-US" dirty="0" err="1"/>
+              <a:t>JsonWebToken</a:t>
+            </a:r>
+            <a:endParaRPr lang="en-US" dirty="0"/>
+          </a:p>
+        </p:txBody>
+      </p:sp>
+      <p:pic>
+        <p:nvPicPr>
+          <p:cNvPr id="5" name="Picture 4">
+            <a:extLst>
+              <a:ext uri="{FF2B5EF4-FFF2-40B4-BE49-F238E27FC236}">
+                <a16:creationId xmlns:a16="http://schemas.microsoft.com/office/drawing/2014/main" id="{8726E24E-BB6D-482E-99B6-CAB630186553}"/>
+              </a:ext>
+            </a:extLst>
+          </p:cNvPr>
+          <p:cNvPicPr>
+            <a:picLocks noChangeAspect="1"/>
+          </p:cNvPicPr>
+          <p:nvPr/>
+        </p:nvPicPr>
+        <p:blipFill>
+          <a:blip r:embed="rId4"/>
+          <a:stretch>
+            <a:fillRect/>
+          </a:stretch>
+        </p:blipFill>
+        <p:spPr>
+          <a:xfrm>
+            <a:off x="4453374" y="2298892"/>
+            <a:ext cx="1914526" cy="1628597"/>
+          </a:xfrm>
+          <a:prstGeom prst="rect">
+            <a:avLst/>
+          </a:prstGeom>
+        </p:spPr>
+      </p:pic>
+      <p:sp>
+        <p:nvSpPr>
+          <p:cNvPr id="12" name="TextBox 11">
+            <a:extLst>
+              <a:ext uri="{FF2B5EF4-FFF2-40B4-BE49-F238E27FC236}">
+                <a16:creationId xmlns:a16="http://schemas.microsoft.com/office/drawing/2014/main" id="{0D66315C-A150-4CA9-B081-27C2B53E1C8E}"/>
+              </a:ext>
+            </a:extLst>
+          </p:cNvPr>
+          <p:cNvSpPr txBox="1"/>
+          <p:nvPr/>
+        </p:nvSpPr>
+        <p:spPr>
+          <a:xfrm>
+            <a:off x="4453374" y="3928541"/>
+            <a:ext cx="1914526" cy="369332"/>
+          </a:xfrm>
+          <a:prstGeom prst="rect">
+            <a:avLst/>
+          </a:prstGeom>
+          <a:noFill/>
+        </p:spPr>
+        <p:txBody>
+          <a:bodyPr wrap="square" rtlCol="0">
+            <a:spAutoFit/>
+          </a:bodyPr>
+          <a:lstStyle/>
+          <a:p>
+            <a:pPr algn="ctr"/>
+            <a:r>
+              <a:rPr lang="en-US" dirty="0" err="1"/>
+              <a:t>BCrypt</a:t>
+            </a:r>
+            <a:endParaRPr lang="en-US" dirty="0"/>
+          </a:p>
+        </p:txBody>
+      </p:sp>
+      <p:grpSp>
+        <p:nvGrpSpPr>
+          <p:cNvPr id="16" name="Group 15">
+            <a:extLst>
+              <a:ext uri="{FF2B5EF4-FFF2-40B4-BE49-F238E27FC236}">
+                <a16:creationId xmlns:a16="http://schemas.microsoft.com/office/drawing/2014/main" id="{D7264CEF-379E-4ED7-9684-41F47EEE2C24}"/>
+              </a:ext>
+            </a:extLst>
+          </p:cNvPr>
+          <p:cNvGrpSpPr/>
+          <p:nvPr/>
+        </p:nvGrpSpPr>
+        <p:grpSpPr>
+          <a:xfrm>
+            <a:off x="8190037" y="2302048"/>
+            <a:ext cx="2079065" cy="1998107"/>
+            <a:chOff x="8206237" y="2537176"/>
+            <a:chExt cx="2079064" cy="1998107"/>
+          </a:xfrm>
+        </p:grpSpPr>
+        <p:pic>
+          <p:nvPicPr>
+            <p:cNvPr id="7" name="Picture 6">
+              <a:extLst>
+                <a:ext uri="{FF2B5EF4-FFF2-40B4-BE49-F238E27FC236}">
+                  <a16:creationId xmlns:a16="http://schemas.microsoft.com/office/drawing/2014/main" id="{408C2B67-8CF2-49E9-93E0-A8C778797849}"/>
+                </a:ext>
+              </a:extLst>
+            </p:cNvPr>
+            <p:cNvPicPr>
+              <a:picLocks noChangeAspect="1"/>
+            </p:cNvPicPr>
+            <p:nvPr/>
+          </p:nvPicPr>
+          <p:blipFill>
+            <a:blip r:embed="rId5"/>
+            <a:stretch>
+              <a:fillRect/>
+            </a:stretch>
+          </p:blipFill>
+          <p:spPr>
+            <a:xfrm>
+              <a:off x="8206237" y="2537176"/>
+              <a:ext cx="2079064" cy="1628775"/>
+            </a:xfrm>
+            <a:prstGeom prst="rect">
+              <a:avLst/>
+            </a:prstGeom>
+          </p:spPr>
+        </p:pic>
+        <p:sp>
+          <p:nvSpPr>
+            <p:cNvPr id="15" name="TextBox 14">
+              <a:extLst>
+                <a:ext uri="{FF2B5EF4-FFF2-40B4-BE49-F238E27FC236}">
+                  <a16:creationId xmlns:a16="http://schemas.microsoft.com/office/drawing/2014/main" id="{6993A3CF-3838-4DBD-9CA1-B4A79A86D956}"/>
+                </a:ext>
+              </a:extLst>
+            </p:cNvPr>
+            <p:cNvSpPr txBox="1"/>
+            <p:nvPr/>
+          </p:nvSpPr>
+          <p:spPr>
+            <a:xfrm>
+              <a:off x="8206237" y="4165951"/>
+              <a:ext cx="2079064" cy="369332"/>
+            </a:xfrm>
+            <a:prstGeom prst="rect">
+              <a:avLst/>
+            </a:prstGeom>
+            <a:noFill/>
+          </p:spPr>
+          <p:txBody>
+            <a:bodyPr wrap="square" rtlCol="0">
+              <a:spAutoFit/>
+            </a:bodyPr>
+            <a:lstStyle/>
+            <a:p>
+              <a:pPr algn="ctr"/>
+              <a:r>
+                <a:rPr lang="en-US" dirty="0" err="1"/>
+                <a:t>DotEnv</a:t>
+              </a:r>
+              <a:endParaRPr lang="en-US" dirty="0"/>
+            </a:p>
+          </p:txBody>
+        </p:sp>
+      </p:grpSp>
+      <p:sp>
+        <p:nvSpPr>
+          <p:cNvPr id="17" name="TextBox 16">
+            <a:extLst>
+              <a:ext uri="{FF2B5EF4-FFF2-40B4-BE49-F238E27FC236}">
+                <a16:creationId xmlns:a16="http://schemas.microsoft.com/office/drawing/2014/main" id="{834D4FD3-A454-4A63-9BE3-AA87E61F2625}"/>
+              </a:ext>
+            </a:extLst>
+          </p:cNvPr>
+          <p:cNvSpPr txBox="1"/>
+          <p:nvPr/>
+        </p:nvSpPr>
+        <p:spPr>
+          <a:xfrm>
+            <a:off x="1949054" y="4819581"/>
+            <a:ext cx="8293892" cy="369332"/>
+          </a:xfrm>
+          <a:prstGeom prst="rect">
+            <a:avLst/>
+          </a:prstGeom>
+          <a:noFill/>
+        </p:spPr>
+        <p:txBody>
+          <a:bodyPr wrap="square" rtlCol="0">
+            <a:spAutoFit/>
+          </a:bodyPr>
+          <a:lstStyle/>
+          <a:p>
+            <a:pPr algn="ctr"/>
+            <a:r>
+              <a:rPr lang="en-US" dirty="0"/>
+              <a:t>CORS, Request and Cookie Parser </a:t>
+            </a:r>
+            <a:r>
+              <a:rPr lang="en-US" dirty="0" err="1"/>
+              <a:t>npm</a:t>
+            </a:r>
+            <a:endParaRPr lang="en-US" dirty="0"/>
+          </a:p>
+        </p:txBody>
+      </p:sp>
+    </p:spTree>
+    <p:extLst>
+      <p:ext uri="{BB962C8B-B14F-4D97-AF65-F5344CB8AC3E}">
+        <p14:creationId xmlns:p14="http://schemas.microsoft.com/office/powerpoint/2010/main" val="3100956995"/>
+      </p:ext>
+    </p:extLst>
+  </p:cSld>
+  <p:clrMapOvr>
+    <a:masterClrMapping/>
+  </p:clrMapOvr>
+</p:sld>
+</file>
+
+<file path=ppt/slides/slide7.xml><?xml version="1.0" encoding="utf-8"?>
+<p:sld xmlns:a="http://schemas.openxmlformats.org/drawingml/2006/main" xmlns:r="http://schemas.openxmlformats.org/officeDocument/2006/relationships" xmlns:p="http://schemas.openxmlformats.org/presentationml/2006/main">
+  <p:cSld>
+    <p:spTree>
+      <p:nvGrpSpPr>
+        <p:cNvPr id="1" name=""/>
+        <p:cNvGrpSpPr/>
+        <p:nvPr/>
+      </p:nvGrpSpPr>
+      <p:grpSpPr>
+        <a:xfrm>
+          <a:off x="0" y="0"/>
+          <a:ext cx="0" cy="0"/>
+          <a:chOff x="0" y="0"/>
+          <a:chExt cx="0" cy="0"/>
+        </a:xfrm>
+      </p:grpSpPr>
+      <p:sp>
+        <p:nvSpPr>
+          <p:cNvPr id="2" name="Title 1">
+            <a:extLst>
+              <a:ext uri="{FF2B5EF4-FFF2-40B4-BE49-F238E27FC236}">
                 <a16:creationId xmlns:a16="http://schemas.microsoft.com/office/drawing/2014/main" id="{C5D87C91-64CC-D44A-A664-F0F83EE35161}"/>
               </a:ext>
             </a:extLst>
@@ -4165,7 +4610,7 @@
 </p:sld>
 </file>
 
-<file path=ppt/slides/slide7.xml><?xml version="1.0" encoding="utf-8"?>
+<file path=ppt/slides/slide8.xml><?xml version="1.0" encoding="utf-8"?>
 <p:sld xmlns:a="http://schemas.openxmlformats.org/drawingml/2006/main" xmlns:r="http://schemas.openxmlformats.org/officeDocument/2006/relationships" xmlns:p="http://schemas.openxmlformats.org/presentationml/2006/main">
   <p:cSld>
     <p:spTree>

</xml_diff>

<commit_message>
Adding Updated Powerpoint presentation
</commit_message>
<xml_diff>
--- a/Project2_Presentation_Material.pptx
+++ b/Project2_Presentation_Material.pptx
@@ -4,15 +4,17 @@
   <p:sldMasterIdLst>
     <p:sldMasterId id="2147483648" r:id="rId1"/>
   </p:sldMasterIdLst>
+  <p:notesMasterIdLst>
+    <p:notesMasterId r:id="rId9"/>
+  </p:notesMasterIdLst>
   <p:sldIdLst>
     <p:sldId id="256" r:id="rId2"/>
-    <p:sldId id="257" r:id="rId3"/>
-    <p:sldId id="258" r:id="rId4"/>
-    <p:sldId id="259" r:id="rId5"/>
-    <p:sldId id="264" r:id="rId6"/>
-    <p:sldId id="260" r:id="rId7"/>
-    <p:sldId id="261" r:id="rId8"/>
-    <p:sldId id="263" r:id="rId9"/>
+    <p:sldId id="258" r:id="rId3"/>
+    <p:sldId id="259" r:id="rId4"/>
+    <p:sldId id="264" r:id="rId5"/>
+    <p:sldId id="260" r:id="rId6"/>
+    <p:sldId id="261" r:id="rId7"/>
+    <p:sldId id="263" r:id="rId8"/>
   </p:sldIdLst>
   <p:sldSz cx="12192000" cy="6858000"/>
   <p:notesSz cx="6858000" cy="9144000"/>
@@ -119,6 +121,442 @@
 </p:presentation>
 </file>
 
+<file path=ppt/notesMasters/notesMaster1.xml><?xml version="1.0" encoding="utf-8"?>
+<p:notesMaster xmlns:a="http://schemas.openxmlformats.org/drawingml/2006/main" xmlns:r="http://schemas.openxmlformats.org/officeDocument/2006/relationships" xmlns:p="http://schemas.openxmlformats.org/presentationml/2006/main">
+  <p:cSld>
+    <p:bg>
+      <p:bgRef idx="1001">
+        <a:schemeClr val="bg1"/>
+      </p:bgRef>
+    </p:bg>
+    <p:spTree>
+      <p:nvGrpSpPr>
+        <p:cNvPr id="1" name=""/>
+        <p:cNvGrpSpPr/>
+        <p:nvPr/>
+      </p:nvGrpSpPr>
+      <p:grpSpPr>
+        <a:xfrm>
+          <a:off x="0" y="0"/>
+          <a:ext cx="0" cy="0"/>
+          <a:chOff x="0" y="0"/>
+          <a:chExt cx="0" cy="0"/>
+        </a:xfrm>
+      </p:grpSpPr>
+      <p:sp>
+        <p:nvSpPr>
+          <p:cNvPr id="2" name="Header Placeholder 1"/>
+          <p:cNvSpPr>
+            <a:spLocks noGrp="1"/>
+          </p:cNvSpPr>
+          <p:nvPr>
+            <p:ph type="hdr" sz="quarter"/>
+          </p:nvPr>
+        </p:nvSpPr>
+        <p:spPr>
+          <a:xfrm>
+            <a:off x="0" y="0"/>
+            <a:ext cx="2971800" cy="458788"/>
+          </a:xfrm>
+          <a:prstGeom prst="rect">
+            <a:avLst/>
+          </a:prstGeom>
+        </p:spPr>
+        <p:txBody>
+          <a:bodyPr vert="horz" lIns="91440" tIns="45720" rIns="91440" bIns="45720" rtlCol="0"/>
+          <a:lstStyle>
+            <a:lvl1pPr algn="l">
+              <a:defRPr sz="1200"/>
+            </a:lvl1pPr>
+          </a:lstStyle>
+          <a:p>
+            <a:endParaRPr lang="en-US"/>
+          </a:p>
+        </p:txBody>
+      </p:sp>
+      <p:sp>
+        <p:nvSpPr>
+          <p:cNvPr id="3" name="Date Placeholder 2"/>
+          <p:cNvSpPr>
+            <a:spLocks noGrp="1"/>
+          </p:cNvSpPr>
+          <p:nvPr>
+            <p:ph type="dt" idx="1"/>
+          </p:nvPr>
+        </p:nvSpPr>
+        <p:spPr>
+          <a:xfrm>
+            <a:off x="3884613" y="0"/>
+            <a:ext cx="2971800" cy="458788"/>
+          </a:xfrm>
+          <a:prstGeom prst="rect">
+            <a:avLst/>
+          </a:prstGeom>
+        </p:spPr>
+        <p:txBody>
+          <a:bodyPr vert="horz" lIns="91440" tIns="45720" rIns="91440" bIns="45720" rtlCol="0"/>
+          <a:lstStyle>
+            <a:lvl1pPr algn="r">
+              <a:defRPr sz="1200"/>
+            </a:lvl1pPr>
+          </a:lstStyle>
+          <a:p>
+            <a:fld id="{A1193E1E-D135-CE4E-9329-B1D8AABA5A14}" type="datetimeFigureOut">
+              <a:rPr lang="en-US" smtClean="0"/>
+              <a:t>1/11/20</a:t>
+            </a:fld>
+            <a:endParaRPr lang="en-US"/>
+          </a:p>
+        </p:txBody>
+      </p:sp>
+      <p:sp>
+        <p:nvSpPr>
+          <p:cNvPr id="4" name="Slide Image Placeholder 3"/>
+          <p:cNvSpPr>
+            <a:spLocks noGrp="1" noRot="1" noChangeAspect="1"/>
+          </p:cNvSpPr>
+          <p:nvPr>
+            <p:ph type="sldImg" idx="2"/>
+          </p:nvPr>
+        </p:nvSpPr>
+        <p:spPr>
+          <a:xfrm>
+            <a:off x="685800" y="1143000"/>
+            <a:ext cx="5486400" cy="3086100"/>
+          </a:xfrm>
+          <a:prstGeom prst="rect">
+            <a:avLst/>
+          </a:prstGeom>
+          <a:noFill/>
+          <a:ln w="12700">
+            <a:solidFill>
+              <a:prstClr val="black"/>
+            </a:solidFill>
+          </a:ln>
+        </p:spPr>
+        <p:txBody>
+          <a:bodyPr vert="horz" lIns="91440" tIns="45720" rIns="91440" bIns="45720" rtlCol="0" anchor="ctr"/>
+          <a:lstStyle/>
+          <a:p>
+            <a:endParaRPr lang="en-US"/>
+          </a:p>
+        </p:txBody>
+      </p:sp>
+      <p:sp>
+        <p:nvSpPr>
+          <p:cNvPr id="5" name="Notes Placeholder 4"/>
+          <p:cNvSpPr>
+            <a:spLocks noGrp="1"/>
+          </p:cNvSpPr>
+          <p:nvPr>
+            <p:ph type="body" sz="quarter" idx="3"/>
+          </p:nvPr>
+        </p:nvSpPr>
+        <p:spPr>
+          <a:xfrm>
+            <a:off x="685800" y="4400550"/>
+            <a:ext cx="5486400" cy="3600450"/>
+          </a:xfrm>
+          <a:prstGeom prst="rect">
+            <a:avLst/>
+          </a:prstGeom>
+        </p:spPr>
+        <p:txBody>
+          <a:bodyPr vert="horz" lIns="91440" tIns="45720" rIns="91440" bIns="45720" rtlCol="0"/>
+          <a:lstStyle/>
+          <a:p>
+            <a:pPr lvl="0"/>
+            <a:r>
+              <a:rPr lang="en-US"/>
+              <a:t>Click to edit Master text styles</a:t>
+            </a:r>
+          </a:p>
+          <a:p>
+            <a:pPr lvl="1"/>
+            <a:r>
+              <a:rPr lang="en-US"/>
+              <a:t>Second level</a:t>
+            </a:r>
+          </a:p>
+          <a:p>
+            <a:pPr lvl="2"/>
+            <a:r>
+              <a:rPr lang="en-US"/>
+              <a:t>Third level</a:t>
+            </a:r>
+          </a:p>
+          <a:p>
+            <a:pPr lvl="3"/>
+            <a:r>
+              <a:rPr lang="en-US"/>
+              <a:t>Fourth level</a:t>
+            </a:r>
+          </a:p>
+          <a:p>
+            <a:pPr lvl="4"/>
+            <a:r>
+              <a:rPr lang="en-US"/>
+              <a:t>Fifth level</a:t>
+            </a:r>
+          </a:p>
+        </p:txBody>
+      </p:sp>
+      <p:sp>
+        <p:nvSpPr>
+          <p:cNvPr id="6" name="Footer Placeholder 5"/>
+          <p:cNvSpPr>
+            <a:spLocks noGrp="1"/>
+          </p:cNvSpPr>
+          <p:nvPr>
+            <p:ph type="ftr" sz="quarter" idx="4"/>
+          </p:nvPr>
+        </p:nvSpPr>
+        <p:spPr>
+          <a:xfrm>
+            <a:off x="0" y="8685213"/>
+            <a:ext cx="2971800" cy="458787"/>
+          </a:xfrm>
+          <a:prstGeom prst="rect">
+            <a:avLst/>
+          </a:prstGeom>
+        </p:spPr>
+        <p:txBody>
+          <a:bodyPr vert="horz" lIns="91440" tIns="45720" rIns="91440" bIns="45720" rtlCol="0" anchor="b"/>
+          <a:lstStyle>
+            <a:lvl1pPr algn="l">
+              <a:defRPr sz="1200"/>
+            </a:lvl1pPr>
+          </a:lstStyle>
+          <a:p>
+            <a:endParaRPr lang="en-US"/>
+          </a:p>
+        </p:txBody>
+      </p:sp>
+      <p:sp>
+        <p:nvSpPr>
+          <p:cNvPr id="7" name="Slide Number Placeholder 6"/>
+          <p:cNvSpPr>
+            <a:spLocks noGrp="1"/>
+          </p:cNvSpPr>
+          <p:nvPr>
+            <p:ph type="sldNum" sz="quarter" idx="5"/>
+          </p:nvPr>
+        </p:nvSpPr>
+        <p:spPr>
+          <a:xfrm>
+            <a:off x="3884613" y="8685213"/>
+            <a:ext cx="2971800" cy="458787"/>
+          </a:xfrm>
+          <a:prstGeom prst="rect">
+            <a:avLst/>
+          </a:prstGeom>
+        </p:spPr>
+        <p:txBody>
+          <a:bodyPr vert="horz" lIns="91440" tIns="45720" rIns="91440" bIns="45720" rtlCol="0" anchor="b"/>
+          <a:lstStyle>
+            <a:lvl1pPr algn="r">
+              <a:defRPr sz="1200"/>
+            </a:lvl1pPr>
+          </a:lstStyle>
+          <a:p>
+            <a:fld id="{8E262D57-DFD1-A444-AE45-6E292DED6AC3}" type="slidenum">
+              <a:rPr lang="en-US" smtClean="0"/>
+              <a:t>‹#›</a:t>
+            </a:fld>
+            <a:endParaRPr lang="en-US"/>
+          </a:p>
+        </p:txBody>
+      </p:sp>
+    </p:spTree>
+    <p:extLst>
+      <p:ext uri="{BB962C8B-B14F-4D97-AF65-F5344CB8AC3E}">
+        <p14:creationId xmlns:p14="http://schemas.microsoft.com/office/powerpoint/2010/main" val="2357967202"/>
+      </p:ext>
+    </p:extLst>
+  </p:cSld>
+  <p:clrMap bg1="lt1" tx1="dk1" bg2="lt2" tx2="dk2" accent1="accent1" accent2="accent2" accent3="accent3" accent4="accent4" accent5="accent5" accent6="accent6" hlink="hlink" folHlink="folHlink"/>
+  <p:notesStyle>
+    <a:lvl1pPr marL="0" algn="l" defTabSz="914400" rtl="0" eaLnBrk="1" latinLnBrk="0" hangingPunct="1">
+      <a:defRPr sz="1200" kern="1200">
+        <a:solidFill>
+          <a:schemeClr val="tx1"/>
+        </a:solidFill>
+        <a:latin typeface="+mn-lt"/>
+        <a:ea typeface="+mn-ea"/>
+        <a:cs typeface="+mn-cs"/>
+      </a:defRPr>
+    </a:lvl1pPr>
+    <a:lvl2pPr marL="457200" algn="l" defTabSz="914400" rtl="0" eaLnBrk="1" latinLnBrk="0" hangingPunct="1">
+      <a:defRPr sz="1200" kern="1200">
+        <a:solidFill>
+          <a:schemeClr val="tx1"/>
+        </a:solidFill>
+        <a:latin typeface="+mn-lt"/>
+        <a:ea typeface="+mn-ea"/>
+        <a:cs typeface="+mn-cs"/>
+      </a:defRPr>
+    </a:lvl2pPr>
+    <a:lvl3pPr marL="914400" algn="l" defTabSz="914400" rtl="0" eaLnBrk="1" latinLnBrk="0" hangingPunct="1">
+      <a:defRPr sz="1200" kern="1200">
+        <a:solidFill>
+          <a:schemeClr val="tx1"/>
+        </a:solidFill>
+        <a:latin typeface="+mn-lt"/>
+        <a:ea typeface="+mn-ea"/>
+        <a:cs typeface="+mn-cs"/>
+      </a:defRPr>
+    </a:lvl3pPr>
+    <a:lvl4pPr marL="1371600" algn="l" defTabSz="914400" rtl="0" eaLnBrk="1" latinLnBrk="0" hangingPunct="1">
+      <a:defRPr sz="1200" kern="1200">
+        <a:solidFill>
+          <a:schemeClr val="tx1"/>
+        </a:solidFill>
+        <a:latin typeface="+mn-lt"/>
+        <a:ea typeface="+mn-ea"/>
+        <a:cs typeface="+mn-cs"/>
+      </a:defRPr>
+    </a:lvl4pPr>
+    <a:lvl5pPr marL="1828800" algn="l" defTabSz="914400" rtl="0" eaLnBrk="1" latinLnBrk="0" hangingPunct="1">
+      <a:defRPr sz="1200" kern="1200">
+        <a:solidFill>
+          <a:schemeClr val="tx1"/>
+        </a:solidFill>
+        <a:latin typeface="+mn-lt"/>
+        <a:ea typeface="+mn-ea"/>
+        <a:cs typeface="+mn-cs"/>
+      </a:defRPr>
+    </a:lvl5pPr>
+    <a:lvl6pPr marL="2286000" algn="l" defTabSz="914400" rtl="0" eaLnBrk="1" latinLnBrk="0" hangingPunct="1">
+      <a:defRPr sz="1200" kern="1200">
+        <a:solidFill>
+          <a:schemeClr val="tx1"/>
+        </a:solidFill>
+        <a:latin typeface="+mn-lt"/>
+        <a:ea typeface="+mn-ea"/>
+        <a:cs typeface="+mn-cs"/>
+      </a:defRPr>
+    </a:lvl6pPr>
+    <a:lvl7pPr marL="2743200" algn="l" defTabSz="914400" rtl="0" eaLnBrk="1" latinLnBrk="0" hangingPunct="1">
+      <a:defRPr sz="1200" kern="1200">
+        <a:solidFill>
+          <a:schemeClr val="tx1"/>
+        </a:solidFill>
+        <a:latin typeface="+mn-lt"/>
+        <a:ea typeface="+mn-ea"/>
+        <a:cs typeface="+mn-cs"/>
+      </a:defRPr>
+    </a:lvl7pPr>
+    <a:lvl8pPr marL="3200400" algn="l" defTabSz="914400" rtl="0" eaLnBrk="1" latinLnBrk="0" hangingPunct="1">
+      <a:defRPr sz="1200" kern="1200">
+        <a:solidFill>
+          <a:schemeClr val="tx1"/>
+        </a:solidFill>
+        <a:latin typeface="+mn-lt"/>
+        <a:ea typeface="+mn-ea"/>
+        <a:cs typeface="+mn-cs"/>
+      </a:defRPr>
+    </a:lvl8pPr>
+    <a:lvl9pPr marL="3657600" algn="l" defTabSz="914400" rtl="0" eaLnBrk="1" latinLnBrk="0" hangingPunct="1">
+      <a:defRPr sz="1200" kern="1200">
+        <a:solidFill>
+          <a:schemeClr val="tx1"/>
+        </a:solidFill>
+        <a:latin typeface="+mn-lt"/>
+        <a:ea typeface="+mn-ea"/>
+        <a:cs typeface="+mn-cs"/>
+      </a:defRPr>
+    </a:lvl9pPr>
+  </p:notesStyle>
+</p:notesMaster>
+</file>
+
+<file path=ppt/notesSlides/notesSlide1.xml><?xml version="1.0" encoding="utf-8"?>
+<p:notes xmlns:a="http://schemas.openxmlformats.org/drawingml/2006/main" xmlns:r="http://schemas.openxmlformats.org/officeDocument/2006/relationships" xmlns:p="http://schemas.openxmlformats.org/presentationml/2006/main">
+  <p:cSld>
+    <p:spTree>
+      <p:nvGrpSpPr>
+        <p:cNvPr id="1" name=""/>
+        <p:cNvGrpSpPr/>
+        <p:nvPr/>
+      </p:nvGrpSpPr>
+      <p:grpSpPr>
+        <a:xfrm>
+          <a:off x="0" y="0"/>
+          <a:ext cx="0" cy="0"/>
+          <a:chOff x="0" y="0"/>
+          <a:chExt cx="0" cy="0"/>
+        </a:xfrm>
+      </p:grpSpPr>
+      <p:sp>
+        <p:nvSpPr>
+          <p:cNvPr id="2" name="Slide Image Placeholder 1"/>
+          <p:cNvSpPr>
+            <a:spLocks noGrp="1" noRot="1" noChangeAspect="1"/>
+          </p:cNvSpPr>
+          <p:nvPr>
+            <p:ph type="sldImg"/>
+          </p:nvPr>
+        </p:nvSpPr>
+        <p:spPr/>
+      </p:sp>
+      <p:sp>
+        <p:nvSpPr>
+          <p:cNvPr id="3" name="Notes Placeholder 2"/>
+          <p:cNvSpPr>
+            <a:spLocks noGrp="1"/>
+          </p:cNvSpPr>
+          <p:nvPr>
+            <p:ph type="body" idx="1"/>
+          </p:nvPr>
+        </p:nvSpPr>
+        <p:spPr/>
+        <p:txBody>
+          <a:bodyPr/>
+          <a:lstStyle/>
+          <a:p>
+            <a:r>
+              <a:rPr lang="en-US" dirty="0"/>
+              <a:t>Mike Stanley will do demo </a:t>
+            </a:r>
+          </a:p>
+        </p:txBody>
+      </p:sp>
+      <p:sp>
+        <p:nvSpPr>
+          <p:cNvPr id="4" name="Slide Number Placeholder 3"/>
+          <p:cNvSpPr>
+            <a:spLocks noGrp="1"/>
+          </p:cNvSpPr>
+          <p:nvPr>
+            <p:ph type="sldNum" sz="quarter" idx="5"/>
+          </p:nvPr>
+        </p:nvSpPr>
+        <p:spPr/>
+        <p:txBody>
+          <a:bodyPr/>
+          <a:lstStyle/>
+          <a:p>
+            <a:fld id="{8E262D57-DFD1-A444-AE45-6E292DED6AC3}" type="slidenum">
+              <a:rPr lang="en-US" smtClean="0"/>
+              <a:t>6</a:t>
+            </a:fld>
+            <a:endParaRPr lang="en-US"/>
+          </a:p>
+        </p:txBody>
+      </p:sp>
+    </p:spTree>
+    <p:extLst>
+      <p:ext uri="{BB962C8B-B14F-4D97-AF65-F5344CB8AC3E}">
+        <p14:creationId xmlns:p14="http://schemas.microsoft.com/office/powerpoint/2010/main" val="3606343212"/>
+      </p:ext>
+    </p:extLst>
+  </p:cSld>
+  <p:clrMapOvr>
+    <a:masterClrMapping/>
+  </p:clrMapOvr>
+</p:notes>
+</file>
+
 <file path=ppt/slideLayouts/slideLayout1.xml><?xml version="1.0" encoding="utf-8"?>
 <p:sldLayout xmlns:a="http://schemas.openxmlformats.org/drawingml/2006/main" xmlns:r="http://schemas.openxmlformats.org/officeDocument/2006/relationships" xmlns:p="http://schemas.openxmlformats.org/presentationml/2006/main" type="title" preserve="1">
   <p:cSld name="Title Slide">
@@ -258,7 +696,7 @@
           <a:p>
             <a:fld id="{48A87A34-81AB-432B-8DAE-1953F412C126}" type="datetimeFigureOut">
               <a:rPr lang="en-US" dirty="0"/>
-              <a:t>1/10/2020</a:t>
+              <a:t>1/11/20</a:t>
             </a:fld>
             <a:endParaRPr lang="en-US" dirty="0"/>
           </a:p>
@@ -464,7 +902,7 @@
           <a:p>
             <a:fld id="{48A87A34-81AB-432B-8DAE-1953F412C126}" type="datetimeFigureOut">
               <a:rPr lang="en-US" dirty="0"/>
-              <a:t>1/10/2020</a:t>
+              <a:t>1/11/20</a:t>
             </a:fld>
             <a:endParaRPr lang="en-US" dirty="0"/>
           </a:p>
@@ -674,7 +1112,7 @@
           <a:p>
             <a:fld id="{48A87A34-81AB-432B-8DAE-1953F412C126}" type="datetimeFigureOut">
               <a:rPr lang="en-US" dirty="0"/>
-              <a:t>1/10/2020</a:t>
+              <a:t>1/11/20</a:t>
             </a:fld>
             <a:endParaRPr lang="en-US" dirty="0"/>
           </a:p>
@@ -870,7 +1308,7 @@
           <a:p>
             <a:fld id="{48A87A34-81AB-432B-8DAE-1953F412C126}" type="datetimeFigureOut">
               <a:rPr lang="en-US" dirty="0"/>
-              <a:t>1/10/2020</a:t>
+              <a:t>1/11/20</a:t>
             </a:fld>
             <a:endParaRPr lang="en-US" dirty="0"/>
           </a:p>
@@ -1144,7 +1582,7 @@
           <a:p>
             <a:fld id="{48A87A34-81AB-432B-8DAE-1953F412C126}" type="datetimeFigureOut">
               <a:rPr lang="en-US" dirty="0"/>
-              <a:t>1/10/2020</a:t>
+              <a:t>1/11/20</a:t>
             </a:fld>
             <a:endParaRPr lang="en-US" dirty="0"/>
           </a:p>
@@ -1407,7 +1845,7 @@
           <a:p>
             <a:fld id="{48A87A34-81AB-432B-8DAE-1953F412C126}" type="datetimeFigureOut">
               <a:rPr lang="en-US" dirty="0"/>
-              <a:t>1/10/2020</a:t>
+              <a:t>1/11/20</a:t>
             </a:fld>
             <a:endParaRPr lang="en-US" dirty="0"/>
           </a:p>
@@ -1818,7 +2256,7 @@
           <a:p>
             <a:fld id="{48A87A34-81AB-432B-8DAE-1953F412C126}" type="datetimeFigureOut">
               <a:rPr lang="en-US" dirty="0"/>
-              <a:t>1/10/2020</a:t>
+              <a:t>1/11/20</a:t>
             </a:fld>
             <a:endParaRPr lang="en-US" dirty="0"/>
           </a:p>
@@ -1962,7 +2400,7 @@
           <a:p>
             <a:fld id="{48A87A34-81AB-432B-8DAE-1953F412C126}" type="datetimeFigureOut">
               <a:rPr lang="en-US" dirty="0"/>
-              <a:t>1/10/2020</a:t>
+              <a:t>1/11/20</a:t>
             </a:fld>
             <a:endParaRPr lang="en-US" dirty="0"/>
           </a:p>
@@ -2083,7 +2521,7 @@
           <a:p>
             <a:fld id="{48A87A34-81AB-432B-8DAE-1953F412C126}" type="datetimeFigureOut">
               <a:rPr lang="en-US" dirty="0"/>
-              <a:t>1/10/2020</a:t>
+              <a:t>1/11/20</a:t>
             </a:fld>
             <a:endParaRPr lang="en-US" dirty="0"/>
           </a:p>
@@ -2329,7 +2767,7 @@
           <a:p>
             <a:fld id="{48A87A34-81AB-432B-8DAE-1953F412C126}" type="datetimeFigureOut">
               <a:rPr lang="en-US" dirty="0"/>
-              <a:t>1/10/2020</a:t>
+              <a:t>1/11/20</a:t>
             </a:fld>
             <a:endParaRPr lang="en-US" dirty="0"/>
           </a:p>
@@ -2770,7 +3208,7 @@
             <a:fld id="{48A87A34-81AB-432B-8DAE-1953F412C126}" type="datetimeFigureOut">
               <a:rPr lang="en-US" dirty="0"/>
               <a:pPr/>
-              <a:t>1/10/2020</a:t>
+              <a:t>1/11/20</a:t>
             </a:fld>
             <a:endParaRPr lang="en-US" dirty="0"/>
           </a:p>
@@ -3093,7 +3531,7 @@
             <a:fld id="{48A87A34-81AB-432B-8DAE-1953F412C126}" type="datetimeFigureOut">
               <a:rPr lang="en-US" dirty="0"/>
               <a:pPr/>
-              <a:t>1/10/2020</a:t>
+              <a:t>1/11/20</a:t>
             </a:fld>
             <a:endParaRPr lang="en-US" dirty="0"/>
           </a:p>
@@ -3561,6 +3999,30 @@
 <file path=ppt/slides/slide1.xml><?xml version="1.0" encoding="utf-8"?>
 <p:sld xmlns:a="http://schemas.openxmlformats.org/drawingml/2006/main" xmlns:r="http://schemas.openxmlformats.org/officeDocument/2006/relationships" xmlns:p="http://schemas.openxmlformats.org/presentationml/2006/main">
   <p:cSld>
+    <p:bg>
+      <p:bgPr>
+        <a:gradFill rotWithShape="1">
+          <a:gsLst>
+            <a:gs pos="0">
+              <a:schemeClr val="bg2">
+                <a:tint val="94000"/>
+                <a:satMod val="80000"/>
+                <a:lumMod val="106000"/>
+              </a:schemeClr>
+            </a:gs>
+            <a:gs pos="100000">
+              <a:schemeClr val="bg2">
+                <a:shade val="80000"/>
+              </a:schemeClr>
+            </a:gs>
+          </a:gsLst>
+          <a:path path="circle">
+            <a:fillToRect l="50000" t="50000" r="50000" b="50000"/>
+          </a:path>
+        </a:gradFill>
+        <a:effectLst/>
+      </p:bgPr>
+    </p:bg>
     <p:spTree>
       <p:nvGrpSpPr>
         <p:cNvPr id="1" name=""/>
@@ -3575,36 +4037,553 @@
           <a:chExt cx="0" cy="0"/>
         </a:xfrm>
       </p:grpSpPr>
-      <p:sp>
-        <p:nvSpPr>
-          <p:cNvPr id="2" name="Title 1">
+      <p:sp useBgFill="1">
+        <p:nvSpPr>
+          <p:cNvPr id="7" name="Rectangle 6">
             <a:extLst>
               <a:ext uri="{FF2B5EF4-FFF2-40B4-BE49-F238E27FC236}">
-                <a16:creationId xmlns:a16="http://schemas.microsoft.com/office/drawing/2014/main" id="{C5D87C91-64CC-D44A-A664-F0F83EE35161}"/>
+                <a16:creationId xmlns:a16="http://schemas.microsoft.com/office/drawing/2014/main" id="{1BF0792A-0F2B-4A2E-AB38-0A4F18A3072D}"/>
+              </a:ext>
+              <a:ext uri="{C183D7F6-B498-43B3-948B-1728B52AA6E4}">
+                <adec:decorative xmlns:adec="http://schemas.microsoft.com/office/drawing/2017/decorative" val="1"/>
               </a:ext>
             </a:extLst>
           </p:cNvPr>
           <p:cNvSpPr>
-            <a:spLocks noGrp="1"/>
-          </p:cNvSpPr>
-          <p:nvPr>
-            <p:ph type="ctrTitle"/>
-          </p:nvPr>
-        </p:nvSpPr>
-        <p:spPr/>
-        <p:txBody>
-          <a:bodyPr/>
-          <a:lstStyle/>
-          <a:p>
-            <a:r>
-              <a:rPr lang="en-US" dirty="0">
-                <a:latin typeface="Cooper Black" panose="0208090404030B020404" pitchFamily="18" charset="0"/>
-              </a:rPr>
-              <a:t>Look out</a:t>
-            </a:r>
-          </a:p>
-        </p:txBody>
-      </p:sp>
+            <a:spLocks noGrp="1" noRot="1" noChangeAspect="1" noMove="1" noResize="1" noEditPoints="1" noAdjustHandles="1" noChangeArrowheads="1" noChangeShapeType="1" noTextEdit="1"/>
+          </p:cNvSpPr>
+          <p:nvPr>
+            <p:extLst>
+              <p:ext uri="{386F3935-93C4-4BCD-93E2-E3B085C9AB24}">
+                <p16:designElem xmlns:p16="http://schemas.microsoft.com/office/powerpoint/2015/main" val="1"/>
+              </p:ext>
+            </p:extLst>
+          </p:nvPr>
+        </p:nvSpPr>
+        <p:spPr>
+          <a:xfrm>
+            <a:off x="2" y="0"/>
+            <a:ext cx="12191695" cy="6858000"/>
+          </a:xfrm>
+          <a:prstGeom prst="rect">
+            <a:avLst/>
+          </a:prstGeom>
+          <a:ln>
+            <a:noFill/>
+          </a:ln>
+        </p:spPr>
+        <p:style>
+          <a:lnRef idx="2">
+            <a:schemeClr val="accent1">
+              <a:shade val="50000"/>
+            </a:schemeClr>
+          </a:lnRef>
+          <a:fillRef idx="1">
+            <a:schemeClr val="accent1"/>
+          </a:fillRef>
+          <a:effectRef idx="0">
+            <a:schemeClr val="accent1"/>
+          </a:effectRef>
+          <a:fontRef idx="minor">
+            <a:schemeClr val="lt1"/>
+          </a:fontRef>
+        </p:style>
+        <p:txBody>
+          <a:bodyPr rtlCol="0" anchor="ctr"/>
+          <a:lstStyle/>
+          <a:p>
+            <a:pPr algn="ctr"/>
+            <a:endParaRPr lang="en-US"/>
+          </a:p>
+        </p:txBody>
+      </p:sp>
+      <p:sp>
+        <p:nvSpPr>
+          <p:cNvPr id="9" name="Rectangle 8">
+            <a:extLst>
+              <a:ext uri="{FF2B5EF4-FFF2-40B4-BE49-F238E27FC236}">
+                <a16:creationId xmlns:a16="http://schemas.microsoft.com/office/drawing/2014/main" id="{F57DB18D-C2F1-4C8C-8808-9C01ECE6834E}"/>
+              </a:ext>
+              <a:ext uri="{C183D7F6-B498-43B3-948B-1728B52AA6E4}">
+                <adec:decorative xmlns:adec="http://schemas.microsoft.com/office/drawing/2017/decorative" val="1"/>
+              </a:ext>
+            </a:extLst>
+          </p:cNvPr>
+          <p:cNvSpPr>
+            <a:spLocks noGrp="1" noRot="1" noChangeAspect="1" noMove="1" noResize="1" noEditPoints="1" noAdjustHandles="1" noChangeArrowheads="1" noChangeShapeType="1" noTextEdit="1"/>
+          </p:cNvSpPr>
+          <p:nvPr>
+            <p:extLst>
+              <p:ext uri="{386F3935-93C4-4BCD-93E2-E3B085C9AB24}">
+                <p16:designElem xmlns:p16="http://schemas.microsoft.com/office/powerpoint/2015/main" val="1"/>
+              </p:ext>
+            </p:extLst>
+          </p:nvPr>
+        </p:nvSpPr>
+        <p:spPr>
+          <a:xfrm>
+            <a:off x="0" y="2019476"/>
+            <a:ext cx="12192000" cy="4105941"/>
+          </a:xfrm>
+          <a:prstGeom prst="rect">
+            <a:avLst/>
+          </a:prstGeom>
+          <a:gradFill flip="none" rotWithShape="1">
+            <a:gsLst>
+              <a:gs pos="0">
+                <a:schemeClr val="bg2">
+                  <a:alpha val="0"/>
+                </a:schemeClr>
+              </a:gs>
+              <a:gs pos="100000">
+                <a:schemeClr val="bg2"/>
+              </a:gs>
+            </a:gsLst>
+            <a:lin ang="5400000" scaled="0"/>
+            <a:tileRect/>
+          </a:gradFill>
+          <a:ln>
+            <a:noFill/>
+          </a:ln>
+        </p:spPr>
+        <p:style>
+          <a:lnRef idx="2">
+            <a:schemeClr val="accent1">
+              <a:shade val="50000"/>
+            </a:schemeClr>
+          </a:lnRef>
+          <a:fillRef idx="1">
+            <a:schemeClr val="accent1"/>
+          </a:fillRef>
+          <a:effectRef idx="0">
+            <a:schemeClr val="accent1"/>
+          </a:effectRef>
+          <a:fontRef idx="minor">
+            <a:schemeClr val="lt1"/>
+          </a:fontRef>
+        </p:style>
+        <p:txBody>
+          <a:bodyPr rtlCol="0" anchor="ctr"/>
+          <a:lstStyle/>
+          <a:p>
+            <a:pPr lvl="0" algn="ctr"/>
+            <a:endParaRPr lang="en-US"/>
+          </a:p>
+        </p:txBody>
+      </p:sp>
+      <p:grpSp>
+        <p:nvGrpSpPr>
+          <p:cNvPr id="11" name="Group 10">
+            <a:extLst>
+              <a:ext uri="{FF2B5EF4-FFF2-40B4-BE49-F238E27FC236}">
+                <a16:creationId xmlns:a16="http://schemas.microsoft.com/office/drawing/2014/main" id="{E5D935FA-3336-4941-9214-E250A5727F40}"/>
+              </a:ext>
+              <a:ext uri="{C183D7F6-B498-43B3-948B-1728B52AA6E4}">
+                <adec:decorative xmlns:adec="http://schemas.microsoft.com/office/drawing/2017/decorative" val="1"/>
+              </a:ext>
+            </a:extLst>
+          </p:cNvPr>
+          <p:cNvGrpSpPr>
+            <a:grpSpLocks noGrp="1" noUngrp="1" noRot="1" noChangeAspect="1" noMove="1" noResize="1"/>
+          </p:cNvGrpSpPr>
+          <p:nvPr>
+            <p:extLst>
+              <p:ext uri="{386F3935-93C4-4BCD-93E2-E3B085C9AB24}">
+                <p16:designElem xmlns:p16="http://schemas.microsoft.com/office/powerpoint/2015/main" val="1"/>
+              </p:ext>
+            </p:extLst>
+          </p:nvPr>
+        </p:nvGrpSpPr>
+        <p:grpSpPr>
+          <a:xfrm>
+            <a:off x="1445671" y="644327"/>
+            <a:ext cx="9299965" cy="4811366"/>
+            <a:chOff x="7639235" y="600024"/>
+            <a:chExt cx="3898557" cy="6878929"/>
+          </a:xfrm>
+        </p:grpSpPr>
+        <p:sp>
+          <p:nvSpPr>
+            <p:cNvPr id="12" name="Rectangle 11">
+              <a:extLst>
+                <a:ext uri="{FF2B5EF4-FFF2-40B4-BE49-F238E27FC236}">
+                  <a16:creationId xmlns:a16="http://schemas.microsoft.com/office/drawing/2014/main" id="{45D9E2ED-FF90-4200-A7EE-6D41D6526F27}"/>
+                </a:ext>
+                <a:ext uri="{C183D7F6-B498-43B3-948B-1728B52AA6E4}">
+                  <adec:decorative xmlns:adec="http://schemas.microsoft.com/office/drawing/2017/decorative" val="1"/>
+                </a:ext>
+              </a:extLst>
+            </p:cNvPr>
+            <p:cNvSpPr/>
+            <p:nvPr>
+              <p:extLst>
+                <p:ext uri="{386F3935-93C4-4BCD-93E2-E3B085C9AB24}">
+                  <p16:designElem xmlns:p16="http://schemas.microsoft.com/office/powerpoint/2015/main" val="1"/>
+                </p:ext>
+              </p:extLst>
+            </p:nvPr>
+          </p:nvSpPr>
+          <p:spPr>
+            <a:xfrm>
+              <a:off x="7639235" y="600024"/>
+              <a:ext cx="3898557" cy="6878929"/>
+            </a:xfrm>
+            <a:prstGeom prst="rect">
+              <a:avLst/>
+            </a:prstGeom>
+            <a:gradFill>
+              <a:gsLst>
+                <a:gs pos="0">
+                  <a:srgbClr val="000001"/>
+                </a:gs>
+                <a:gs pos="100000">
+                  <a:srgbClr val="191919"/>
+                </a:gs>
+              </a:gsLst>
+            </a:gradFill>
+            <a:ln w="76200" cmpd="sng">
+              <a:noFill/>
+              <a:miter lim="800000"/>
+            </a:ln>
+            <a:effectLst>
+              <a:outerShdw blurRad="127000" dist="228600" dir="4740000" sx="98000" sy="98000" algn="tl" rotWithShape="0">
+                <a:srgbClr val="000000">
+                  <a:alpha val="34000"/>
+                </a:srgbClr>
+              </a:outerShdw>
+            </a:effectLst>
+            <a:scene3d>
+              <a:camera prst="orthographicFront"/>
+              <a:lightRig rig="threePt" dir="t"/>
+            </a:scene3d>
+            <a:sp3d>
+              <a:bevelT w="152400" h="50800" prst="softRound"/>
+            </a:sp3d>
+          </p:spPr>
+          <p:style>
+            <a:lnRef idx="1">
+              <a:schemeClr val="accent1"/>
+            </a:lnRef>
+            <a:fillRef idx="3">
+              <a:schemeClr val="accent1"/>
+            </a:fillRef>
+            <a:effectRef idx="2">
+              <a:schemeClr val="accent1"/>
+            </a:effectRef>
+            <a:fontRef idx="minor">
+              <a:schemeClr val="lt1"/>
+            </a:fontRef>
+          </p:style>
+          <p:txBody>
+            <a:bodyPr rtlCol="0" anchor="ctr"/>
+            <a:lstStyle/>
+            <a:p>
+              <a:pPr algn="ctr"/>
+              <a:endParaRPr lang="en-US"/>
+            </a:p>
+          </p:txBody>
+        </p:sp>
+        <p:sp>
+          <p:nvSpPr>
+            <p:cNvPr id="13" name="Rectangle 12">
+              <a:extLst>
+                <a:ext uri="{FF2B5EF4-FFF2-40B4-BE49-F238E27FC236}">
+                  <a16:creationId xmlns:a16="http://schemas.microsoft.com/office/drawing/2014/main" id="{3A4BEB8D-68AD-4314-8A2B-F8DC85A5301F}"/>
+                </a:ext>
+                <a:ext uri="{C183D7F6-B498-43B3-948B-1728B52AA6E4}">
+                  <adec:decorative xmlns:adec="http://schemas.microsoft.com/office/drawing/2017/decorative" val="1"/>
+                </a:ext>
+              </a:extLst>
+            </p:cNvPr>
+            <p:cNvSpPr/>
+            <p:nvPr>
+              <p:extLst>
+                <p:ext uri="{386F3935-93C4-4BCD-93E2-E3B085C9AB24}">
+                  <p16:designElem xmlns:p16="http://schemas.microsoft.com/office/powerpoint/2015/main" val="1"/>
+                </p:ext>
+              </p:extLst>
+            </p:nvPr>
+          </p:nvSpPr>
+          <p:spPr>
+            <a:xfrm>
+              <a:off x="7770263" y="1062693"/>
+              <a:ext cx="3635738" cy="5954752"/>
+            </a:xfrm>
+            <a:prstGeom prst="rect">
+              <a:avLst/>
+            </a:prstGeom>
+            <a:gradFill>
+              <a:gsLst>
+                <a:gs pos="0">
+                  <a:srgbClr val="DADADA"/>
+                </a:gs>
+                <a:gs pos="100000">
+                  <a:srgbClr val="FFFFFE"/>
+                </a:gs>
+              </a:gsLst>
+              <a:lin ang="16200000" scaled="0"/>
+            </a:gradFill>
+            <a:ln w="50800" cmpd="sng">
+              <a:solidFill>
+                <a:srgbClr val="191919"/>
+              </a:solidFill>
+              <a:miter lim="800000"/>
+            </a:ln>
+            <a:effectLst>
+              <a:innerShdw blurRad="63500" dist="88900" dir="14100000">
+                <a:srgbClr val="000000">
+                  <a:alpha val="30000"/>
+                </a:srgbClr>
+              </a:innerShdw>
+            </a:effectLst>
+            <a:scene3d>
+              <a:camera prst="orthographicFront"/>
+              <a:lightRig rig="threePt" dir="t"/>
+            </a:scene3d>
+            <a:sp3d>
+              <a:bevelT prst="relaxedInset"/>
+            </a:sp3d>
+          </p:spPr>
+          <p:style>
+            <a:lnRef idx="1">
+              <a:schemeClr val="accent1"/>
+            </a:lnRef>
+            <a:fillRef idx="3">
+              <a:schemeClr val="accent1"/>
+            </a:fillRef>
+            <a:effectRef idx="2">
+              <a:schemeClr val="accent1"/>
+            </a:effectRef>
+            <a:fontRef idx="minor">
+              <a:schemeClr val="lt1"/>
+            </a:fontRef>
+          </p:style>
+          <p:txBody>
+            <a:bodyPr rtlCol="0" anchor="ctr"/>
+            <a:lstStyle/>
+            <a:p>
+              <a:pPr algn="ctr"/>
+              <a:endParaRPr lang="en-US"/>
+            </a:p>
+          </p:txBody>
+        </p:sp>
+      </p:grpSp>
+      <p:cxnSp>
+        <p:nvCxnSpPr>
+          <p:cNvPr id="15" name="Straight Connector 14">
+            <a:extLst>
+              <a:ext uri="{FF2B5EF4-FFF2-40B4-BE49-F238E27FC236}">
+                <a16:creationId xmlns:a16="http://schemas.microsoft.com/office/drawing/2014/main" id="{87F797D1-251E-41FE-9FF8-AD487DEF28AC}"/>
+              </a:ext>
+              <a:ext uri="{C183D7F6-B498-43B3-948B-1728B52AA6E4}">
+                <adec:decorative xmlns:adec="http://schemas.microsoft.com/office/drawing/2017/decorative" val="1"/>
+              </a:ext>
+            </a:extLst>
+          </p:cNvPr>
+          <p:cNvCxnSpPr>
+            <a:cxnSpLocks noGrp="1" noRot="1" noChangeAspect="1" noMove="1" noResize="1" noEditPoints="1" noAdjustHandles="1" noChangeArrowheads="1" noChangeShapeType="1"/>
+          </p:cNvCxnSpPr>
+          <p:nvPr>
+            <p:extLst>
+              <p:ext uri="{386F3935-93C4-4BCD-93E2-E3B085C9AB24}">
+                <p16:designElem xmlns:p16="http://schemas.microsoft.com/office/powerpoint/2015/main" val="1"/>
+              </p:ext>
+            </p:extLst>
+          </p:nvPr>
+        </p:nvCxnSpPr>
+        <p:spPr>
+          <a:xfrm>
+            <a:off x="2391407" y="1416139"/>
+            <a:ext cx="7405874" cy="0"/>
+          </a:xfrm>
+          <a:prstGeom prst="line">
+            <a:avLst/>
+          </a:prstGeom>
+          <a:ln w="31750"/>
+        </p:spPr>
+        <p:style>
+          <a:lnRef idx="3">
+            <a:schemeClr val="accent1"/>
+          </a:lnRef>
+          <a:fillRef idx="0">
+            <a:schemeClr val="accent1"/>
+          </a:fillRef>
+          <a:effectRef idx="2">
+            <a:schemeClr val="accent1"/>
+          </a:effectRef>
+          <a:fontRef idx="minor">
+            <a:schemeClr val="tx1"/>
+          </a:fontRef>
+        </p:style>
+      </p:cxnSp>
+      <p:cxnSp>
+        <p:nvCxnSpPr>
+          <p:cNvPr id="17" name="Straight Connector 16">
+            <a:extLst>
+              <a:ext uri="{FF2B5EF4-FFF2-40B4-BE49-F238E27FC236}">
+                <a16:creationId xmlns:a16="http://schemas.microsoft.com/office/drawing/2014/main" id="{09A0CE28-0E59-4F4D-9855-8A8DCE9A8EFE}"/>
+              </a:ext>
+              <a:ext uri="{C183D7F6-B498-43B3-948B-1728B52AA6E4}">
+                <adec:decorative xmlns:adec="http://schemas.microsoft.com/office/drawing/2017/decorative" val="1"/>
+              </a:ext>
+            </a:extLst>
+          </p:cNvPr>
+          <p:cNvCxnSpPr>
+            <a:cxnSpLocks noGrp="1" noRot="1" noChangeAspect="1" noMove="1" noResize="1" noEditPoints="1" noAdjustHandles="1" noChangeArrowheads="1" noChangeShapeType="1"/>
+          </p:cNvCxnSpPr>
+          <p:nvPr>
+            <p:extLst>
+              <p:ext uri="{386F3935-93C4-4BCD-93E2-E3B085C9AB24}">
+                <p16:designElem xmlns:p16="http://schemas.microsoft.com/office/powerpoint/2015/main" val="1"/>
+              </p:ext>
+            </p:extLst>
+          </p:nvPr>
+        </p:nvCxnSpPr>
+        <p:spPr>
+          <a:xfrm>
+            <a:off x="2391407" y="4285341"/>
+            <a:ext cx="7405874" cy="0"/>
+          </a:xfrm>
+          <a:prstGeom prst="line">
+            <a:avLst/>
+          </a:prstGeom>
+          <a:ln w="31750"/>
+        </p:spPr>
+        <p:style>
+          <a:lnRef idx="3">
+            <a:schemeClr val="accent1"/>
+          </a:lnRef>
+          <a:fillRef idx="0">
+            <a:schemeClr val="accent1"/>
+          </a:fillRef>
+          <a:effectRef idx="2">
+            <a:schemeClr val="accent1"/>
+          </a:effectRef>
+          <a:fontRef idx="minor">
+            <a:schemeClr val="tx1"/>
+          </a:fontRef>
+        </p:style>
+      </p:cxnSp>
+      <p:pic>
+        <p:nvPicPr>
+          <p:cNvPr id="19" name="Picture 18">
+            <a:extLst>
+              <a:ext uri="{FF2B5EF4-FFF2-40B4-BE49-F238E27FC236}">
+                <a16:creationId xmlns:a16="http://schemas.microsoft.com/office/drawing/2014/main" id="{75CC23F7-9F20-4C4B-8608-BD4DE9728FA5}"/>
+              </a:ext>
+              <a:ext uri="{C183D7F6-B498-43B3-948B-1728B52AA6E4}">
+                <adec:decorative xmlns:adec="http://schemas.microsoft.com/office/drawing/2017/decorative" val="1"/>
+              </a:ext>
+            </a:extLst>
+          </p:cNvPr>
+          <p:cNvPicPr>
+            <a:picLocks noGrp="1" noRot="1" noChangeAspect="1" noMove="1" noResize="1" noEditPoints="1" noAdjustHandles="1" noChangeArrowheads="1" noChangeShapeType="1" noCrop="1"/>
+          </p:cNvPicPr>
+          <p:nvPr>
+            <p:extLst>
+              <p:ext uri="{386F3935-93C4-4BCD-93E2-E3B085C9AB24}">
+                <p16:designElem xmlns:p16="http://schemas.microsoft.com/office/powerpoint/2015/main" val="1"/>
+              </p:ext>
+            </p:extLst>
+          </p:nvPr>
+        </p:nvPicPr>
+        <p:blipFill rotWithShape="1">
+          <a:blip r:embed="rId2">
+            <a:extLst>
+              <a:ext uri="{28A0092B-C50C-407E-A947-70E740481C1C}">
+                <a14:useLocalDpi xmlns:a14="http://schemas.microsoft.com/office/drawing/2010/main" val="0"/>
+              </a:ext>
+            </a:extLst>
+          </a:blip>
+          <a:srcRect t="1538" b="-1538"/>
+          <a:stretch/>
+        </p:blipFill>
+        <p:spPr bwMode="black">
+          <a:xfrm>
+            <a:off x="0" y="6126480"/>
+            <a:ext cx="12192000" cy="742950"/>
+          </a:xfrm>
+          <a:prstGeom prst="rect">
+            <a:avLst/>
+          </a:prstGeom>
+        </p:spPr>
+      </p:pic>
+      <p:sp>
+        <p:nvSpPr>
+          <p:cNvPr id="5" name="Rectangle 4">
+            <a:extLst>
+              <a:ext uri="{FF2B5EF4-FFF2-40B4-BE49-F238E27FC236}">
+                <a16:creationId xmlns:a16="http://schemas.microsoft.com/office/drawing/2014/main" id="{7F043B42-1F43-6343-AA72-EA16B34C85FF}"/>
+              </a:ext>
+            </a:extLst>
+          </p:cNvPr>
+          <p:cNvSpPr/>
+          <p:nvPr/>
+        </p:nvSpPr>
+        <p:spPr>
+          <a:xfrm>
+            <a:off x="1603513" y="696272"/>
+            <a:ext cx="8814485" cy="4502026"/>
+          </a:xfrm>
+          <a:prstGeom prst="rect">
+            <a:avLst/>
+          </a:prstGeom>
+        </p:spPr>
+        <p:style>
+          <a:lnRef idx="2">
+            <a:schemeClr val="dk1">
+              <a:shade val="50000"/>
+            </a:schemeClr>
+          </a:lnRef>
+          <a:fillRef idx="1">
+            <a:schemeClr val="dk1"/>
+          </a:fillRef>
+          <a:effectRef idx="0">
+            <a:schemeClr val="dk1"/>
+          </a:effectRef>
+          <a:fontRef idx="minor">
+            <a:schemeClr val="lt1"/>
+          </a:fontRef>
+        </p:style>
+        <p:txBody>
+          <a:bodyPr rtlCol="0" anchor="ctr"/>
+          <a:lstStyle/>
+          <a:p>
+            <a:pPr algn="ctr"/>
+            <a:endParaRPr lang="en-US"/>
+          </a:p>
+        </p:txBody>
+      </p:sp>
+      <p:pic>
+        <p:nvPicPr>
+          <p:cNvPr id="8" name="Picture 7" descr="A picture containing drawing&#10;&#10;Description automatically generated">
+            <a:extLst>
+              <a:ext uri="{FF2B5EF4-FFF2-40B4-BE49-F238E27FC236}">
+                <a16:creationId xmlns:a16="http://schemas.microsoft.com/office/drawing/2014/main" id="{EB06F86A-56CD-6547-AB6D-51042BA8966E}"/>
+              </a:ext>
+            </a:extLst>
+          </p:cNvPr>
+          <p:cNvPicPr>
+            <a:picLocks noChangeAspect="1"/>
+          </p:cNvPicPr>
+          <p:nvPr/>
+        </p:nvPicPr>
+        <p:blipFill>
+          <a:blip r:embed="rId3"/>
+          <a:stretch>
+            <a:fillRect/>
+          </a:stretch>
+        </p:blipFill>
+        <p:spPr>
+          <a:xfrm>
+            <a:off x="3308989" y="727779"/>
+            <a:ext cx="5574021" cy="4371471"/>
+          </a:xfrm>
+          <a:prstGeom prst="rect">
+            <a:avLst/>
+          </a:prstGeom>
+        </p:spPr>
+      </p:pic>
     </p:spTree>
     <p:extLst>
       <p:ext uri="{BB962C8B-B14F-4D97-AF65-F5344CB8AC3E}">
@@ -3640,7 +4619,7 @@
           <p:cNvPr id="2" name="Title 1">
             <a:extLst>
               <a:ext uri="{FF2B5EF4-FFF2-40B4-BE49-F238E27FC236}">
-                <a16:creationId xmlns:a16="http://schemas.microsoft.com/office/drawing/2014/main" id="{D076A2A3-141C-7A45-8FBC-02EFA3577BF6}"/>
+                <a16:creationId xmlns:a16="http://schemas.microsoft.com/office/drawing/2014/main" id="{B345F55A-A4AC-DD45-B364-046A1FECDCF3}"/>
               </a:ext>
             </a:extLst>
           </p:cNvPr>
@@ -3658,73 +4637,309 @@
           <a:p>
             <a:r>
               <a:rPr lang="en-US" dirty="0"/>
-              <a:t>Agenda</a:t>
-            </a:r>
-          </a:p>
-        </p:txBody>
-      </p:sp>
-      <p:sp>
-        <p:nvSpPr>
-          <p:cNvPr id="3" name="Content Placeholder 2">
+              <a:t>Team members</a:t>
+            </a:r>
+          </a:p>
+        </p:txBody>
+      </p:sp>
+      <p:grpSp>
+        <p:nvGrpSpPr>
+          <p:cNvPr id="23" name="Group 22">
             <a:extLst>
               <a:ext uri="{FF2B5EF4-FFF2-40B4-BE49-F238E27FC236}">
-                <a16:creationId xmlns:a16="http://schemas.microsoft.com/office/drawing/2014/main" id="{D2638019-A83E-7441-A16B-AF6523B1D40A}"/>
+                <a16:creationId xmlns:a16="http://schemas.microsoft.com/office/drawing/2014/main" id="{AFAB6A22-1ED7-8E44-BD01-0F9275D3FD49}"/>
               </a:ext>
             </a:extLst>
           </p:cNvPr>
-          <p:cNvSpPr>
-            <a:spLocks noGrp="1"/>
-          </p:cNvSpPr>
-          <p:nvPr>
-            <p:ph idx="1"/>
-          </p:nvPr>
-        </p:nvSpPr>
-        <p:spPr/>
-        <p:txBody>
-          <a:bodyPr/>
-          <a:lstStyle/>
-          <a:p>
-            <a:r>
-              <a:rPr lang="en-US" dirty="0"/>
-              <a:t>Team Members</a:t>
-            </a:r>
-          </a:p>
-          <a:p>
-            <a:r>
-              <a:rPr lang="en-US" dirty="0"/>
-              <a:t>Proposal</a:t>
-            </a:r>
-          </a:p>
-          <a:p>
-            <a:r>
-              <a:rPr lang="en-US" dirty="0"/>
-              <a:t>Future Enhancements</a:t>
-            </a:r>
-          </a:p>
-          <a:p>
-            <a:r>
-              <a:rPr lang="en-US" dirty="0"/>
-              <a:t>New Technology Used</a:t>
-            </a:r>
-          </a:p>
-          <a:p>
-            <a:r>
-              <a:rPr lang="en-US" dirty="0"/>
-              <a:t>System Demo</a:t>
-            </a:r>
-          </a:p>
-          <a:p>
-            <a:r>
-              <a:rPr lang="en-US" dirty="0"/>
-              <a:t>Q&amp;A</a:t>
-            </a:r>
-          </a:p>
-        </p:txBody>
-      </p:sp>
+          <p:cNvGrpSpPr/>
+          <p:nvPr/>
+        </p:nvGrpSpPr>
+        <p:grpSpPr>
+          <a:xfrm>
+            <a:off x="849209" y="2320098"/>
+            <a:ext cx="10493582" cy="2865159"/>
+            <a:chOff x="163307" y="2510550"/>
+            <a:chExt cx="11867860" cy="3150818"/>
+          </a:xfrm>
+        </p:grpSpPr>
+        <p:sp>
+          <p:nvSpPr>
+            <p:cNvPr id="4" name="TextBox 3">
+              <a:extLst>
+                <a:ext uri="{FF2B5EF4-FFF2-40B4-BE49-F238E27FC236}">
+                  <a16:creationId xmlns:a16="http://schemas.microsoft.com/office/drawing/2014/main" id="{715A414B-25CF-5645-AD07-0532CCD5E679}"/>
+                </a:ext>
+              </a:extLst>
+            </p:cNvPr>
+            <p:cNvSpPr txBox="1"/>
+            <p:nvPr/>
+          </p:nvSpPr>
+          <p:spPr>
+            <a:xfrm>
+              <a:off x="444414" y="5287618"/>
+              <a:ext cx="2014330" cy="369332"/>
+            </a:xfrm>
+            <a:prstGeom prst="rect">
+              <a:avLst/>
+            </a:prstGeom>
+            <a:noFill/>
+          </p:spPr>
+          <p:txBody>
+            <a:bodyPr wrap="square" rtlCol="0">
+              <a:spAutoFit/>
+            </a:bodyPr>
+            <a:lstStyle/>
+            <a:p>
+              <a:pPr algn="ctr"/>
+              <a:r>
+                <a:rPr lang="en-US" dirty="0"/>
+                <a:t>Mike Stanley</a:t>
+              </a:r>
+            </a:p>
+          </p:txBody>
+        </p:sp>
+        <p:sp>
+          <p:nvSpPr>
+            <p:cNvPr id="5" name="TextBox 4">
+              <a:extLst>
+                <a:ext uri="{FF2B5EF4-FFF2-40B4-BE49-F238E27FC236}">
+                  <a16:creationId xmlns:a16="http://schemas.microsoft.com/office/drawing/2014/main" id="{5A727AE0-29F5-4E4D-8D99-B21EE1A037AD}"/>
+                </a:ext>
+              </a:extLst>
+            </p:cNvPr>
+            <p:cNvSpPr txBox="1"/>
+            <p:nvPr/>
+          </p:nvSpPr>
+          <p:spPr>
+            <a:xfrm>
+              <a:off x="9643935" y="5287618"/>
+              <a:ext cx="2014330" cy="369332"/>
+            </a:xfrm>
+            <a:prstGeom prst="rect">
+              <a:avLst/>
+            </a:prstGeom>
+            <a:noFill/>
+          </p:spPr>
+          <p:txBody>
+            <a:bodyPr wrap="square" rtlCol="0">
+              <a:spAutoFit/>
+            </a:bodyPr>
+            <a:lstStyle/>
+            <a:p>
+              <a:pPr algn="ctr"/>
+              <a:r>
+                <a:rPr lang="en-US" dirty="0"/>
+                <a:t>Mark Sterrenberg </a:t>
+              </a:r>
+            </a:p>
+          </p:txBody>
+        </p:sp>
+        <p:sp>
+          <p:nvSpPr>
+            <p:cNvPr id="6" name="TextBox 5">
+              <a:extLst>
+                <a:ext uri="{FF2B5EF4-FFF2-40B4-BE49-F238E27FC236}">
+                  <a16:creationId xmlns:a16="http://schemas.microsoft.com/office/drawing/2014/main" id="{44FFA5F2-B2AD-0149-8624-9C71A01E2444}"/>
+                </a:ext>
+              </a:extLst>
+            </p:cNvPr>
+            <p:cNvSpPr txBox="1"/>
+            <p:nvPr/>
+          </p:nvSpPr>
+          <p:spPr>
+            <a:xfrm>
+              <a:off x="3392385" y="5292036"/>
+              <a:ext cx="2405734" cy="369332"/>
+            </a:xfrm>
+            <a:prstGeom prst="rect">
+              <a:avLst/>
+            </a:prstGeom>
+            <a:noFill/>
+          </p:spPr>
+          <p:txBody>
+            <a:bodyPr wrap="square" rtlCol="0">
+              <a:spAutoFit/>
+            </a:bodyPr>
+            <a:lstStyle/>
+            <a:p>
+              <a:pPr algn="ctr"/>
+              <a:r>
+                <a:rPr lang="en-US" dirty="0"/>
+                <a:t>Jessica </a:t>
+              </a:r>
+              <a:r>
+                <a:rPr lang="en-US" dirty="0" err="1"/>
+                <a:t>Hoxworth</a:t>
+              </a:r>
+              <a:endParaRPr lang="en-US" dirty="0"/>
+            </a:p>
+          </p:txBody>
+        </p:sp>
+        <p:sp>
+          <p:nvSpPr>
+            <p:cNvPr id="7" name="TextBox 6">
+              <a:extLst>
+                <a:ext uri="{FF2B5EF4-FFF2-40B4-BE49-F238E27FC236}">
+                  <a16:creationId xmlns:a16="http://schemas.microsoft.com/office/drawing/2014/main" id="{7CF2DECF-96D5-A84F-8C77-9D796A1AACFE}"/>
+                </a:ext>
+              </a:extLst>
+            </p:cNvPr>
+            <p:cNvSpPr txBox="1"/>
+            <p:nvPr/>
+          </p:nvSpPr>
+          <p:spPr>
+            <a:xfrm>
+              <a:off x="6393883" y="5287618"/>
+              <a:ext cx="2553120" cy="369332"/>
+            </a:xfrm>
+            <a:prstGeom prst="rect">
+              <a:avLst/>
+            </a:prstGeom>
+            <a:noFill/>
+          </p:spPr>
+          <p:txBody>
+            <a:bodyPr wrap="square" rtlCol="0">
+              <a:spAutoFit/>
+            </a:bodyPr>
+            <a:lstStyle/>
+            <a:p>
+              <a:pPr algn="ctr"/>
+              <a:r>
+                <a:rPr lang="en-US" dirty="0"/>
+                <a:t>Anthony </a:t>
+              </a:r>
+              <a:r>
+                <a:rPr lang="en-US" dirty="0" err="1"/>
+                <a:t>Pricer</a:t>
+              </a:r>
+              <a:endParaRPr lang="en-US" dirty="0"/>
+            </a:p>
+          </p:txBody>
+        </p:sp>
+        <p:pic>
+          <p:nvPicPr>
+            <p:cNvPr id="16" name="Picture 15" descr="A person wearing a suit and tie&#10;&#10;Description automatically generated">
+              <a:extLst>
+                <a:ext uri="{FF2B5EF4-FFF2-40B4-BE49-F238E27FC236}">
+                  <a16:creationId xmlns:a16="http://schemas.microsoft.com/office/drawing/2014/main" id="{E6BE8AF6-9FE2-A247-B7D0-3A342F77A0B5}"/>
+                </a:ext>
+              </a:extLst>
+            </p:cNvPr>
+            <p:cNvPicPr>
+              <a:picLocks noChangeAspect="1"/>
+            </p:cNvPicPr>
+            <p:nvPr/>
+          </p:nvPicPr>
+          <p:blipFill rotWithShape="1">
+            <a:blip r:embed="rId2"/>
+            <a:srcRect/>
+            <a:stretch/>
+          </p:blipFill>
+          <p:spPr>
+            <a:xfrm>
+              <a:off x="163307" y="2527484"/>
+              <a:ext cx="2743200" cy="2743200"/>
+            </a:xfrm>
+            <a:prstGeom prst="rect">
+              <a:avLst/>
+            </a:prstGeom>
+          </p:spPr>
+        </p:pic>
+        <p:pic>
+          <p:nvPicPr>
+            <p:cNvPr id="18" name="Picture 17" descr="A person wearing a red shirt&#10;&#10;Description automatically generated">
+              <a:extLst>
+                <a:ext uri="{FF2B5EF4-FFF2-40B4-BE49-F238E27FC236}">
+                  <a16:creationId xmlns:a16="http://schemas.microsoft.com/office/drawing/2014/main" id="{EBB36758-17D0-2A47-B26A-929834386818}"/>
+                </a:ext>
+              </a:extLst>
+            </p:cNvPr>
+            <p:cNvPicPr>
+              <a:picLocks noChangeAspect="1"/>
+            </p:cNvPicPr>
+            <p:nvPr/>
+          </p:nvPicPr>
+          <p:blipFill>
+            <a:blip r:embed="rId3"/>
+            <a:stretch>
+              <a:fillRect/>
+            </a:stretch>
+          </p:blipFill>
+          <p:spPr>
+            <a:xfrm>
+              <a:off x="3113586" y="2527484"/>
+              <a:ext cx="2963333" cy="2760134"/>
+            </a:xfrm>
+            <a:prstGeom prst="rect">
+              <a:avLst/>
+            </a:prstGeom>
+          </p:spPr>
+        </p:pic>
+        <p:pic>
+          <p:nvPicPr>
+            <p:cNvPr id="20" name="Picture 19" descr="A person smiling for the camera&#10;&#10;Description automatically generated">
+              <a:extLst>
+                <a:ext uri="{FF2B5EF4-FFF2-40B4-BE49-F238E27FC236}">
+                  <a16:creationId xmlns:a16="http://schemas.microsoft.com/office/drawing/2014/main" id="{241E1DF7-2B7D-3B4E-9F31-566580A03D1E}"/>
+                </a:ext>
+              </a:extLst>
+            </p:cNvPr>
+            <p:cNvPicPr>
+              <a:picLocks noChangeAspect="1"/>
+            </p:cNvPicPr>
+            <p:nvPr/>
+          </p:nvPicPr>
+          <p:blipFill>
+            <a:blip r:embed="rId4"/>
+            <a:stretch>
+              <a:fillRect/>
+            </a:stretch>
+          </p:blipFill>
+          <p:spPr>
+            <a:xfrm>
+              <a:off x="6283998" y="2527484"/>
+              <a:ext cx="2779956" cy="2743200"/>
+            </a:xfrm>
+            <a:prstGeom prst="rect">
+              <a:avLst/>
+            </a:prstGeom>
+          </p:spPr>
+        </p:pic>
+        <p:pic>
+          <p:nvPicPr>
+            <p:cNvPr id="22" name="Picture 21" descr="A person eating a donut&#10;&#10;Description automatically generated">
+              <a:extLst>
+                <a:ext uri="{FF2B5EF4-FFF2-40B4-BE49-F238E27FC236}">
+                  <a16:creationId xmlns:a16="http://schemas.microsoft.com/office/drawing/2014/main" id="{DF5AE518-17AF-B44A-953B-4C505FE715E8}"/>
+                </a:ext>
+              </a:extLst>
+            </p:cNvPr>
+            <p:cNvPicPr>
+              <a:picLocks noChangeAspect="1"/>
+            </p:cNvPicPr>
+            <p:nvPr/>
+          </p:nvPicPr>
+          <p:blipFill>
+            <a:blip r:embed="rId5"/>
+            <a:stretch>
+              <a:fillRect/>
+            </a:stretch>
+          </p:blipFill>
+          <p:spPr>
+            <a:xfrm>
+              <a:off x="9271033" y="2510550"/>
+              <a:ext cx="2760134" cy="2760134"/>
+            </a:xfrm>
+            <a:prstGeom prst="rect">
+              <a:avLst/>
+            </a:prstGeom>
+          </p:spPr>
+        </p:pic>
+      </p:grpSp>
     </p:spTree>
     <p:extLst>
       <p:ext uri="{BB962C8B-B14F-4D97-AF65-F5344CB8AC3E}">
-        <p14:creationId xmlns:p14="http://schemas.microsoft.com/office/powerpoint/2010/main" val="1162590351"/>
+        <p14:creationId xmlns:p14="http://schemas.microsoft.com/office/powerpoint/2010/main" val="652506924"/>
       </p:ext>
     </p:extLst>
   </p:cSld>
@@ -3756,7 +4971,7 @@
           <p:cNvPr id="2" name="Title 1">
             <a:extLst>
               <a:ext uri="{FF2B5EF4-FFF2-40B4-BE49-F238E27FC236}">
-                <a16:creationId xmlns:a16="http://schemas.microsoft.com/office/drawing/2014/main" id="{B345F55A-A4AC-DD45-B364-046A1FECDCF3}"/>
+                <a16:creationId xmlns:a16="http://schemas.microsoft.com/office/drawing/2014/main" id="{B3D7FB5C-4310-954C-9EF8-BE836080327B}"/>
               </a:ext>
             </a:extLst>
           </p:cNvPr>
@@ -3774,169 +4989,59 @@
           <a:p>
             <a:r>
               <a:rPr lang="en-US" dirty="0"/>
-              <a:t>Team members</a:t>
-            </a:r>
-          </a:p>
-        </p:txBody>
-      </p:sp>
-      <p:sp>
-        <p:nvSpPr>
-          <p:cNvPr id="4" name="TextBox 3">
+              <a:t>proposal</a:t>
+            </a:r>
+          </a:p>
+        </p:txBody>
+      </p:sp>
+      <p:sp>
+        <p:nvSpPr>
+          <p:cNvPr id="3" name="Content Placeholder 2">
             <a:extLst>
               <a:ext uri="{FF2B5EF4-FFF2-40B4-BE49-F238E27FC236}">
-                <a16:creationId xmlns:a16="http://schemas.microsoft.com/office/drawing/2014/main" id="{715A414B-25CF-5645-AD07-0532CCD5E679}"/>
+                <a16:creationId xmlns:a16="http://schemas.microsoft.com/office/drawing/2014/main" id="{BB81AC18-2F7E-7D40-B080-42E6AF6AF522}"/>
               </a:ext>
             </a:extLst>
           </p:cNvPr>
-          <p:cNvSpPr txBox="1"/>
-          <p:nvPr/>
+          <p:cNvSpPr>
+            <a:spLocks noGrp="1"/>
+          </p:cNvSpPr>
+          <p:nvPr>
+            <p:ph idx="1"/>
+          </p:nvPr>
         </p:nvSpPr>
         <p:spPr>
           <a:xfrm>
-            <a:off x="444414" y="5287619"/>
-            <a:ext cx="2014330" cy="369332"/>
+            <a:off x="1451579" y="2951921"/>
+            <a:ext cx="9603275" cy="954157"/>
           </a:xfrm>
-          <a:prstGeom prst="rect">
-            <a:avLst/>
-          </a:prstGeom>
-          <a:noFill/>
         </p:spPr>
         <p:txBody>
-          <a:bodyPr wrap="square" rtlCol="0">
-            <a:spAutoFit/>
-          </a:bodyPr>
-          <a:lstStyle/>
-          <a:p>
-            <a:pPr algn="ctr"/>
+          <a:bodyPr/>
+          <a:lstStyle/>
+          <a:p>
+            <a:pPr marL="0" indent="0">
+              <a:buNone/>
+            </a:pPr>
             <a:r>
               <a:rPr lang="en-US" dirty="0"/>
-              <a:t>Mike Stanley</a:t>
-            </a:r>
-          </a:p>
-        </p:txBody>
-      </p:sp>
-      <p:sp>
-        <p:nvSpPr>
-          <p:cNvPr id="5" name="TextBox 4">
-            <a:extLst>
-              <a:ext uri="{FF2B5EF4-FFF2-40B4-BE49-F238E27FC236}">
-                <a16:creationId xmlns:a16="http://schemas.microsoft.com/office/drawing/2014/main" id="{5A727AE0-29F5-4E4D-8D99-B21EE1A037AD}"/>
-              </a:ext>
-            </a:extLst>
-          </p:cNvPr>
-          <p:cNvSpPr txBox="1"/>
-          <p:nvPr/>
-        </p:nvSpPr>
-        <p:spPr>
-          <a:xfrm>
-            <a:off x="3507274" y="5287619"/>
-            <a:ext cx="2014330" cy="369332"/>
-          </a:xfrm>
-          <a:prstGeom prst="rect">
-            <a:avLst/>
-          </a:prstGeom>
-          <a:noFill/>
-        </p:spPr>
-        <p:txBody>
-          <a:bodyPr wrap="square" rtlCol="0">
-            <a:spAutoFit/>
-          </a:bodyPr>
-          <a:lstStyle/>
-          <a:p>
-            <a:pPr algn="ctr"/>
+              <a:t>A crime lookup application that allows users to </a:t>
+            </a:r>
+            <a:r>
+              <a:rPr lang="en-US"/>
+              <a:t>search for crimes </a:t>
+            </a:r>
             <a:r>
               <a:rPr lang="en-US" dirty="0"/>
-              <a:t>Mark Sterrenberg </a:t>
-            </a:r>
-          </a:p>
-        </p:txBody>
-      </p:sp>
-      <p:sp>
-        <p:nvSpPr>
-          <p:cNvPr id="6" name="TextBox 5">
-            <a:extLst>
-              <a:ext uri="{FF2B5EF4-FFF2-40B4-BE49-F238E27FC236}">
-                <a16:creationId xmlns:a16="http://schemas.microsoft.com/office/drawing/2014/main" id="{44FFA5F2-B2AD-0149-8624-9C71A01E2444}"/>
-              </a:ext>
-            </a:extLst>
-          </p:cNvPr>
-          <p:cNvSpPr txBox="1"/>
-          <p:nvPr/>
-        </p:nvSpPr>
-        <p:spPr>
-          <a:xfrm>
-            <a:off x="6570134" y="5292037"/>
-            <a:ext cx="2405734" cy="369332"/>
-          </a:xfrm>
-          <a:prstGeom prst="rect">
-            <a:avLst/>
-          </a:prstGeom>
-          <a:noFill/>
-        </p:spPr>
-        <p:txBody>
-          <a:bodyPr wrap="square" rtlCol="0">
-            <a:spAutoFit/>
-          </a:bodyPr>
-          <a:lstStyle/>
-          <a:p>
-            <a:pPr algn="ctr"/>
-            <a:r>
-              <a:rPr lang="en-US" dirty="0"/>
-              <a:t>Jessica </a:t>
-            </a:r>
-            <a:r>
-              <a:rPr lang="en-US" dirty="0" err="1"/>
-              <a:t>Hoxworth</a:t>
-            </a:r>
-            <a:endParaRPr lang="en-US" dirty="0"/>
-          </a:p>
-        </p:txBody>
-      </p:sp>
-      <p:sp>
-        <p:nvSpPr>
-          <p:cNvPr id="7" name="TextBox 6">
-            <a:extLst>
-              <a:ext uri="{FF2B5EF4-FFF2-40B4-BE49-F238E27FC236}">
-                <a16:creationId xmlns:a16="http://schemas.microsoft.com/office/drawing/2014/main" id="{7CF2DECF-96D5-A84F-8C77-9D796A1AACFE}"/>
-              </a:ext>
-            </a:extLst>
-          </p:cNvPr>
-          <p:cNvSpPr txBox="1"/>
-          <p:nvPr/>
-        </p:nvSpPr>
-        <p:spPr>
-          <a:xfrm>
-            <a:off x="9313197" y="5287619"/>
-            <a:ext cx="2553120" cy="369332"/>
-          </a:xfrm>
-          <a:prstGeom prst="rect">
-            <a:avLst/>
-          </a:prstGeom>
-          <a:noFill/>
-        </p:spPr>
-        <p:txBody>
-          <a:bodyPr wrap="square" rtlCol="0">
-            <a:spAutoFit/>
-          </a:bodyPr>
-          <a:lstStyle/>
-          <a:p>
-            <a:pPr algn="ctr"/>
-            <a:r>
-              <a:rPr lang="en-US" dirty="0"/>
-              <a:t>Anthony </a:t>
-            </a:r>
-            <a:r>
-              <a:rPr lang="en-US" dirty="0" err="1"/>
-              <a:t>Pricer</a:t>
-            </a:r>
-            <a:endParaRPr lang="en-US" dirty="0"/>
+              <a:t>that have occurred near their area</a:t>
+            </a:r>
           </a:p>
         </p:txBody>
       </p:sp>
     </p:spTree>
     <p:extLst>
       <p:ext uri="{BB962C8B-B14F-4D97-AF65-F5344CB8AC3E}">
-        <p14:creationId xmlns:p14="http://schemas.microsoft.com/office/powerpoint/2010/main" val="652506924"/>
+        <p14:creationId xmlns:p14="http://schemas.microsoft.com/office/powerpoint/2010/main" val="971274011"/>
       </p:ext>
     </p:extLst>
   </p:cSld>
@@ -3986,7 +5091,7 @@
           <a:p>
             <a:r>
               <a:rPr lang="en-US" dirty="0"/>
-              <a:t>proposal</a:t>
+              <a:t>Future enhancements</a:t>
             </a:r>
           </a:p>
         </p:txBody>
@@ -4007,24 +5112,45 @@
             <p:ph idx="1"/>
           </p:nvPr>
         </p:nvSpPr>
-        <p:spPr>
-          <a:xfrm>
-            <a:off x="1451579" y="2857822"/>
-            <a:ext cx="9603275" cy="1899776"/>
-          </a:xfrm>
-        </p:spPr>
-        <p:txBody>
-          <a:bodyPr>
-            <a:normAutofit/>
-          </a:bodyPr>
-          <a:lstStyle/>
-          <a:p>
-            <a:pPr marL="0" indent="0" algn="ctr">
-              <a:buNone/>
-            </a:pPr>
-            <a:r>
-              <a:rPr lang="en-US" sz="3200" dirty="0"/>
-              <a:t>Our team wanted to create a Crime Lookup Application that allows users to search by location crimes that have/are occurring near them</a:t>
+        <p:spPr/>
+        <p:txBody>
+          <a:bodyPr/>
+          <a:lstStyle/>
+          <a:p>
+            <a:r>
+              <a:rPr lang="en-US" dirty="0"/>
+              <a:t>Be able to access crime information real-time so viewers could see crimes</a:t>
+            </a:r>
+          </a:p>
+          <a:p>
+            <a:r>
+              <a:rPr lang="en-US" dirty="0"/>
+              <a:t>Add more security protocols surrounding API-keys and a person’s </a:t>
+            </a:r>
+            <a:r>
+              <a:rPr lang="en-US" dirty="0" err="1"/>
+              <a:t>mysql</a:t>
+            </a:r>
+            <a:r>
+              <a:rPr lang="en-US" dirty="0"/>
+              <a:t> credentials to ensure that if someone accidentally commits their credentials they are protected from malicious use </a:t>
+            </a:r>
+          </a:p>
+          <a:p>
+            <a:r>
+              <a:rPr lang="en-US" dirty="0"/>
+              <a:t>Adding ways to communicate with local law enforcement, emergency services, </a:t>
+            </a:r>
+            <a:r>
+              <a:rPr lang="en-US" dirty="0" err="1"/>
+              <a:t>etc</a:t>
+            </a:r>
+            <a:endParaRPr lang="en-US" dirty="0"/>
+          </a:p>
+          <a:p>
+            <a:r>
+              <a:rPr lang="en-US" dirty="0"/>
+              <a:t>Adding social media profiles and potential login to application via social media </a:t>
             </a:r>
           </a:p>
         </p:txBody>
@@ -4032,7 +5158,7 @@
     </p:spTree>
     <p:extLst>
       <p:ext uri="{BB962C8B-B14F-4D97-AF65-F5344CB8AC3E}">
-        <p14:creationId xmlns:p14="http://schemas.microsoft.com/office/powerpoint/2010/main" val="971274011"/>
+        <p14:creationId xmlns:p14="http://schemas.microsoft.com/office/powerpoint/2010/main" val="4174293239"/>
       </p:ext>
     </p:extLst>
   </p:cSld>
@@ -4064,7 +5190,7 @@
           <p:cNvPr id="2" name="Title 1">
             <a:extLst>
               <a:ext uri="{FF2B5EF4-FFF2-40B4-BE49-F238E27FC236}">
-                <a16:creationId xmlns:a16="http://schemas.microsoft.com/office/drawing/2014/main" id="{B3D7FB5C-4310-954C-9EF8-BE836080327B}"/>
+                <a16:creationId xmlns:a16="http://schemas.microsoft.com/office/drawing/2014/main" id="{2F361537-FA9D-AD46-9B07-5B7CE824D1CF}"/>
               </a:ext>
             </a:extLst>
           </p:cNvPr>
@@ -4081,48 +5207,12 @@
           <a:lstStyle/>
           <a:p>
             <a:r>
+              <a:rPr lang="en-US" dirty="0" err="1"/>
+              <a:t>nEW</a:t>
+            </a:r>
+            <a:r>
               <a:rPr lang="en-US" dirty="0"/>
-              <a:t>Future Enhancements </a:t>
-            </a:r>
-          </a:p>
-        </p:txBody>
-      </p:sp>
-      <p:sp>
-        <p:nvSpPr>
-          <p:cNvPr id="3" name="Content Placeholder 2">
-            <a:extLst>
-              <a:ext uri="{FF2B5EF4-FFF2-40B4-BE49-F238E27FC236}">
-                <a16:creationId xmlns:a16="http://schemas.microsoft.com/office/drawing/2014/main" id="{BB81AC18-2F7E-7D40-B080-42E6AF6AF522}"/>
-              </a:ext>
-            </a:extLst>
-          </p:cNvPr>
-          <p:cNvSpPr>
-            <a:spLocks noGrp="1"/>
-          </p:cNvSpPr>
-          <p:nvPr>
-            <p:ph idx="1"/>
-          </p:nvPr>
-        </p:nvSpPr>
-        <p:spPr/>
-        <p:txBody>
-          <a:bodyPr/>
-          <a:lstStyle/>
-          <a:p>
-            <a:pPr marL="0" indent="0">
-              <a:buNone/>
-            </a:pPr>
-            <a:endParaRPr lang="en-US" dirty="0"/>
-          </a:p>
-          <a:p>
-            <a:r>
-              <a:rPr lang="en-US" dirty="0"/>
-              <a:t>Application can look up crimes around not only by City but also by an specific address given by the user</a:t>
-            </a:r>
-          </a:p>
-          <a:p>
-            <a:r>
-              <a:rPr lang="en-US" dirty="0"/>
-              <a:t>Live alerts- tracks your locations and alerts users in real time </a:t>
+              <a:t> technology used</a:t>
             </a:r>
           </a:p>
         </p:txBody>
@@ -4130,7 +5220,7 @@
     </p:spTree>
     <p:extLst>
       <p:ext uri="{BB962C8B-B14F-4D97-AF65-F5344CB8AC3E}">
-        <p14:creationId xmlns:p14="http://schemas.microsoft.com/office/powerpoint/2010/main" val="3932834931"/>
+        <p14:creationId xmlns:p14="http://schemas.microsoft.com/office/powerpoint/2010/main" val="3100956995"/>
       </p:ext>
     </p:extLst>
   </p:cSld>
@@ -4162,418 +5252,6 @@
           <p:cNvPr id="2" name="Title 1">
             <a:extLst>
               <a:ext uri="{FF2B5EF4-FFF2-40B4-BE49-F238E27FC236}">
-                <a16:creationId xmlns:a16="http://schemas.microsoft.com/office/drawing/2014/main" id="{2F361537-FA9D-AD46-9B07-5B7CE824D1CF}"/>
-              </a:ext>
-            </a:extLst>
-          </p:cNvPr>
-          <p:cNvSpPr>
-            <a:spLocks noGrp="1"/>
-          </p:cNvSpPr>
-          <p:nvPr>
-            <p:ph type="title"/>
-          </p:nvPr>
-        </p:nvSpPr>
-        <p:spPr/>
-        <p:txBody>
-          <a:bodyPr/>
-          <a:lstStyle/>
-          <a:p>
-            <a:r>
-              <a:rPr lang="en-US" dirty="0" err="1"/>
-              <a:t>nEW</a:t>
-            </a:r>
-            <a:r>
-              <a:rPr lang="en-US" dirty="0"/>
-              <a:t> technologies used</a:t>
-            </a:r>
-          </a:p>
-        </p:txBody>
-      </p:sp>
-      <p:grpSp>
-        <p:nvGrpSpPr>
-          <p:cNvPr id="14" name="Group 13">
-            <a:extLst>
-              <a:ext uri="{FF2B5EF4-FFF2-40B4-BE49-F238E27FC236}">
-                <a16:creationId xmlns:a16="http://schemas.microsoft.com/office/drawing/2014/main" id="{CC5819F6-8481-4A1E-B309-15414416C7CE}"/>
-              </a:ext>
-            </a:extLst>
-          </p:cNvPr>
-          <p:cNvGrpSpPr/>
-          <p:nvPr/>
-        </p:nvGrpSpPr>
-        <p:grpSpPr>
-          <a:xfrm>
-            <a:off x="6367899" y="2302048"/>
-            <a:ext cx="1822140" cy="1887530"/>
-            <a:chOff x="4765322" y="3263819"/>
-            <a:chExt cx="2661356" cy="2974328"/>
-          </a:xfrm>
-        </p:grpSpPr>
-        <p:pic>
-          <p:nvPicPr>
-            <p:cNvPr id="6" name="Picture 5">
-              <a:extLst>
-                <a:ext uri="{FF2B5EF4-FFF2-40B4-BE49-F238E27FC236}">
-                  <a16:creationId xmlns:a16="http://schemas.microsoft.com/office/drawing/2014/main" id="{FE162867-291E-44DE-888C-D2F6C5345DC5}"/>
-                </a:ext>
-              </a:extLst>
-            </p:cNvPr>
-            <p:cNvPicPr>
-              <a:picLocks noChangeAspect="1"/>
-            </p:cNvPicPr>
-            <p:nvPr/>
-          </p:nvPicPr>
-          <p:blipFill>
-            <a:blip r:embed="rId2"/>
-            <a:stretch>
-              <a:fillRect/>
-            </a:stretch>
-          </p:blipFill>
-          <p:spPr>
-            <a:xfrm>
-              <a:off x="4765322" y="3263819"/>
-              <a:ext cx="2661356" cy="2566308"/>
-            </a:xfrm>
-            <a:prstGeom prst="rect">
-              <a:avLst/>
-            </a:prstGeom>
-          </p:spPr>
-        </p:pic>
-        <p:sp>
-          <p:nvSpPr>
-            <p:cNvPr id="8" name="TextBox 7">
-              <a:extLst>
-                <a:ext uri="{FF2B5EF4-FFF2-40B4-BE49-F238E27FC236}">
-                  <a16:creationId xmlns:a16="http://schemas.microsoft.com/office/drawing/2014/main" id="{B437F1C4-5F4F-4E54-8ED1-5120ECA35857}"/>
-                </a:ext>
-              </a:extLst>
-            </p:cNvPr>
-            <p:cNvSpPr txBox="1"/>
-            <p:nvPr/>
-          </p:nvSpPr>
-          <p:spPr>
-            <a:xfrm>
-              <a:off x="4765322" y="5868815"/>
-              <a:ext cx="2661356" cy="369332"/>
-            </a:xfrm>
-            <a:prstGeom prst="rect">
-              <a:avLst/>
-            </a:prstGeom>
-            <a:noFill/>
-          </p:spPr>
-          <p:txBody>
-            <a:bodyPr wrap="square" rtlCol="0">
-              <a:spAutoFit/>
-            </a:bodyPr>
-            <a:lstStyle/>
-            <a:p>
-              <a:pPr algn="ctr"/>
-              <a:r>
-                <a:rPr lang="en-US" dirty="0"/>
-                <a:t>Cheerio</a:t>
-              </a:r>
-            </a:p>
-          </p:txBody>
-        </p:sp>
-      </p:grpSp>
-      <p:pic>
-        <p:nvPicPr>
-          <p:cNvPr id="4" name="Picture 3">
-            <a:extLst>
-              <a:ext uri="{FF2B5EF4-FFF2-40B4-BE49-F238E27FC236}">
-                <a16:creationId xmlns:a16="http://schemas.microsoft.com/office/drawing/2014/main" id="{9A9190B6-A89C-4488-B30F-DC51232635BD}"/>
-              </a:ext>
-            </a:extLst>
-          </p:cNvPr>
-          <p:cNvPicPr>
-            <a:picLocks noChangeAspect="1"/>
-          </p:cNvPicPr>
-          <p:nvPr/>
-        </p:nvPicPr>
-        <p:blipFill>
-          <a:blip r:embed="rId3"/>
-          <a:stretch>
-            <a:fillRect/>
-          </a:stretch>
-        </p:blipFill>
-        <p:spPr>
-          <a:xfrm>
-            <a:off x="1975211" y="2302048"/>
-            <a:ext cx="2478164" cy="1628596"/>
-          </a:xfrm>
-          <a:prstGeom prst="rect">
-            <a:avLst/>
-          </a:prstGeom>
-        </p:spPr>
-      </p:pic>
-      <p:sp>
-        <p:nvSpPr>
-          <p:cNvPr id="10" name="TextBox 9">
-            <a:extLst>
-              <a:ext uri="{FF2B5EF4-FFF2-40B4-BE49-F238E27FC236}">
-                <a16:creationId xmlns:a16="http://schemas.microsoft.com/office/drawing/2014/main" id="{947E9A6A-5D24-41A8-8CE3-9FAB92E7A365}"/>
-              </a:ext>
-            </a:extLst>
-          </p:cNvPr>
-          <p:cNvSpPr txBox="1"/>
-          <p:nvPr/>
-        </p:nvSpPr>
-        <p:spPr>
-          <a:xfrm>
-            <a:off x="1975210" y="3930644"/>
-            <a:ext cx="2478164" cy="369332"/>
-          </a:xfrm>
-          <a:prstGeom prst="rect">
-            <a:avLst/>
-          </a:prstGeom>
-          <a:noFill/>
-        </p:spPr>
-        <p:txBody>
-          <a:bodyPr wrap="square" rtlCol="0">
-            <a:spAutoFit/>
-          </a:bodyPr>
-          <a:lstStyle/>
-          <a:p>
-            <a:pPr algn="ctr"/>
-            <a:r>
-              <a:rPr lang="en-US" dirty="0" err="1"/>
-              <a:t>JsonWebToken</a:t>
-            </a:r>
-            <a:endParaRPr lang="en-US" dirty="0"/>
-          </a:p>
-        </p:txBody>
-      </p:sp>
-      <p:pic>
-        <p:nvPicPr>
-          <p:cNvPr id="5" name="Picture 4">
-            <a:extLst>
-              <a:ext uri="{FF2B5EF4-FFF2-40B4-BE49-F238E27FC236}">
-                <a16:creationId xmlns:a16="http://schemas.microsoft.com/office/drawing/2014/main" id="{8726E24E-BB6D-482E-99B6-CAB630186553}"/>
-              </a:ext>
-            </a:extLst>
-          </p:cNvPr>
-          <p:cNvPicPr>
-            <a:picLocks noChangeAspect="1"/>
-          </p:cNvPicPr>
-          <p:nvPr/>
-        </p:nvPicPr>
-        <p:blipFill>
-          <a:blip r:embed="rId4"/>
-          <a:stretch>
-            <a:fillRect/>
-          </a:stretch>
-        </p:blipFill>
-        <p:spPr>
-          <a:xfrm>
-            <a:off x="4453374" y="2298892"/>
-            <a:ext cx="1914526" cy="1628597"/>
-          </a:xfrm>
-          <a:prstGeom prst="rect">
-            <a:avLst/>
-          </a:prstGeom>
-        </p:spPr>
-      </p:pic>
-      <p:sp>
-        <p:nvSpPr>
-          <p:cNvPr id="12" name="TextBox 11">
-            <a:extLst>
-              <a:ext uri="{FF2B5EF4-FFF2-40B4-BE49-F238E27FC236}">
-                <a16:creationId xmlns:a16="http://schemas.microsoft.com/office/drawing/2014/main" id="{0D66315C-A150-4CA9-B081-27C2B53E1C8E}"/>
-              </a:ext>
-            </a:extLst>
-          </p:cNvPr>
-          <p:cNvSpPr txBox="1"/>
-          <p:nvPr/>
-        </p:nvSpPr>
-        <p:spPr>
-          <a:xfrm>
-            <a:off x="4453374" y="3928541"/>
-            <a:ext cx="1914526" cy="369332"/>
-          </a:xfrm>
-          <a:prstGeom prst="rect">
-            <a:avLst/>
-          </a:prstGeom>
-          <a:noFill/>
-        </p:spPr>
-        <p:txBody>
-          <a:bodyPr wrap="square" rtlCol="0">
-            <a:spAutoFit/>
-          </a:bodyPr>
-          <a:lstStyle/>
-          <a:p>
-            <a:pPr algn="ctr"/>
-            <a:r>
-              <a:rPr lang="en-US" dirty="0" err="1"/>
-              <a:t>BCrypt</a:t>
-            </a:r>
-            <a:endParaRPr lang="en-US" dirty="0"/>
-          </a:p>
-        </p:txBody>
-      </p:sp>
-      <p:grpSp>
-        <p:nvGrpSpPr>
-          <p:cNvPr id="16" name="Group 15">
-            <a:extLst>
-              <a:ext uri="{FF2B5EF4-FFF2-40B4-BE49-F238E27FC236}">
-                <a16:creationId xmlns:a16="http://schemas.microsoft.com/office/drawing/2014/main" id="{D7264CEF-379E-4ED7-9684-41F47EEE2C24}"/>
-              </a:ext>
-            </a:extLst>
-          </p:cNvPr>
-          <p:cNvGrpSpPr/>
-          <p:nvPr/>
-        </p:nvGrpSpPr>
-        <p:grpSpPr>
-          <a:xfrm>
-            <a:off x="8190037" y="2302048"/>
-            <a:ext cx="2079065" cy="1998107"/>
-            <a:chOff x="8206237" y="2537176"/>
-            <a:chExt cx="2079064" cy="1998107"/>
-          </a:xfrm>
-        </p:grpSpPr>
-        <p:pic>
-          <p:nvPicPr>
-            <p:cNvPr id="7" name="Picture 6">
-              <a:extLst>
-                <a:ext uri="{FF2B5EF4-FFF2-40B4-BE49-F238E27FC236}">
-                  <a16:creationId xmlns:a16="http://schemas.microsoft.com/office/drawing/2014/main" id="{408C2B67-8CF2-49E9-93E0-A8C778797849}"/>
-                </a:ext>
-              </a:extLst>
-            </p:cNvPr>
-            <p:cNvPicPr>
-              <a:picLocks noChangeAspect="1"/>
-            </p:cNvPicPr>
-            <p:nvPr/>
-          </p:nvPicPr>
-          <p:blipFill>
-            <a:blip r:embed="rId5"/>
-            <a:stretch>
-              <a:fillRect/>
-            </a:stretch>
-          </p:blipFill>
-          <p:spPr>
-            <a:xfrm>
-              <a:off x="8206237" y="2537176"/>
-              <a:ext cx="2079064" cy="1628775"/>
-            </a:xfrm>
-            <a:prstGeom prst="rect">
-              <a:avLst/>
-            </a:prstGeom>
-          </p:spPr>
-        </p:pic>
-        <p:sp>
-          <p:nvSpPr>
-            <p:cNvPr id="15" name="TextBox 14">
-              <a:extLst>
-                <a:ext uri="{FF2B5EF4-FFF2-40B4-BE49-F238E27FC236}">
-                  <a16:creationId xmlns:a16="http://schemas.microsoft.com/office/drawing/2014/main" id="{6993A3CF-3838-4DBD-9CA1-B4A79A86D956}"/>
-                </a:ext>
-              </a:extLst>
-            </p:cNvPr>
-            <p:cNvSpPr txBox="1"/>
-            <p:nvPr/>
-          </p:nvSpPr>
-          <p:spPr>
-            <a:xfrm>
-              <a:off x="8206237" y="4165951"/>
-              <a:ext cx="2079064" cy="369332"/>
-            </a:xfrm>
-            <a:prstGeom prst="rect">
-              <a:avLst/>
-            </a:prstGeom>
-            <a:noFill/>
-          </p:spPr>
-          <p:txBody>
-            <a:bodyPr wrap="square" rtlCol="0">
-              <a:spAutoFit/>
-            </a:bodyPr>
-            <a:lstStyle/>
-            <a:p>
-              <a:pPr algn="ctr"/>
-              <a:r>
-                <a:rPr lang="en-US" dirty="0" err="1"/>
-                <a:t>DotEnv</a:t>
-              </a:r>
-              <a:endParaRPr lang="en-US" dirty="0"/>
-            </a:p>
-          </p:txBody>
-        </p:sp>
-      </p:grpSp>
-      <p:sp>
-        <p:nvSpPr>
-          <p:cNvPr id="17" name="TextBox 16">
-            <a:extLst>
-              <a:ext uri="{FF2B5EF4-FFF2-40B4-BE49-F238E27FC236}">
-                <a16:creationId xmlns:a16="http://schemas.microsoft.com/office/drawing/2014/main" id="{834D4FD3-A454-4A63-9BE3-AA87E61F2625}"/>
-              </a:ext>
-            </a:extLst>
-          </p:cNvPr>
-          <p:cNvSpPr txBox="1"/>
-          <p:nvPr/>
-        </p:nvSpPr>
-        <p:spPr>
-          <a:xfrm>
-            <a:off x="1949054" y="4819581"/>
-            <a:ext cx="8293892" cy="369332"/>
-          </a:xfrm>
-          <a:prstGeom prst="rect">
-            <a:avLst/>
-          </a:prstGeom>
-          <a:noFill/>
-        </p:spPr>
-        <p:txBody>
-          <a:bodyPr wrap="square" rtlCol="0">
-            <a:spAutoFit/>
-          </a:bodyPr>
-          <a:lstStyle/>
-          <a:p>
-            <a:pPr algn="ctr"/>
-            <a:r>
-              <a:rPr lang="en-US" dirty="0"/>
-              <a:t>CORS, Request and Cookie Parser </a:t>
-            </a:r>
-            <a:r>
-              <a:rPr lang="en-US" dirty="0" err="1"/>
-              <a:t>npm</a:t>
-            </a:r>
-            <a:endParaRPr lang="en-US" dirty="0"/>
-          </a:p>
-        </p:txBody>
-      </p:sp>
-    </p:spTree>
-    <p:extLst>
-      <p:ext uri="{BB962C8B-B14F-4D97-AF65-F5344CB8AC3E}">
-        <p14:creationId xmlns:p14="http://schemas.microsoft.com/office/powerpoint/2010/main" val="3100956995"/>
-      </p:ext>
-    </p:extLst>
-  </p:cSld>
-  <p:clrMapOvr>
-    <a:masterClrMapping/>
-  </p:clrMapOvr>
-</p:sld>
-</file>
-
-<file path=ppt/slides/slide7.xml><?xml version="1.0" encoding="utf-8"?>
-<p:sld xmlns:a="http://schemas.openxmlformats.org/drawingml/2006/main" xmlns:r="http://schemas.openxmlformats.org/officeDocument/2006/relationships" xmlns:p="http://schemas.openxmlformats.org/presentationml/2006/main">
-  <p:cSld>
-    <p:spTree>
-      <p:nvGrpSpPr>
-        <p:cNvPr id="1" name=""/>
-        <p:cNvGrpSpPr/>
-        <p:nvPr/>
-      </p:nvGrpSpPr>
-      <p:grpSpPr>
-        <a:xfrm>
-          <a:off x="0" y="0"/>
-          <a:ext cx="0" cy="0"/>
-          <a:chOff x="0" y="0"/>
-          <a:chExt cx="0" cy="0"/>
-        </a:xfrm>
-      </p:grpSpPr>
-      <p:sp>
-        <p:nvSpPr>
-          <p:cNvPr id="2" name="Title 1">
-            <a:extLst>
-              <a:ext uri="{FF2B5EF4-FFF2-40B4-BE49-F238E27FC236}">
                 <a16:creationId xmlns:a16="http://schemas.microsoft.com/office/drawing/2014/main" id="{C5D87C91-64CC-D44A-A664-F0F83EE35161}"/>
               </a:ext>
             </a:extLst>
@@ -4610,7 +5288,7 @@
 </p:sld>
 </file>
 
-<file path=ppt/slides/slide8.xml><?xml version="1.0" encoding="utf-8"?>
+<file path=ppt/slides/slide7.xml><?xml version="1.0" encoding="utf-8"?>
 <p:sld xmlns:a="http://schemas.openxmlformats.org/drawingml/2006/main" xmlns:r="http://schemas.openxmlformats.org/officeDocument/2006/relationships" xmlns:p="http://schemas.openxmlformats.org/presentationml/2006/main">
   <p:cSld>
     <p:spTree>
@@ -4919,4 +5597,299 @@
     </a:ext>
   </a:extLst>
 </a:theme>
+</file>
+
+<file path=ppt/theme/theme2.xml><?xml version="1.0" encoding="utf-8"?>
+<a:theme xmlns:a="http://schemas.openxmlformats.org/drawingml/2006/main" name="Office Theme">
+  <a:themeElements>
+    <a:clrScheme name="Office">
+      <a:dk1>
+        <a:sysClr val="windowText" lastClr="000000"/>
+      </a:dk1>
+      <a:lt1>
+        <a:sysClr val="window" lastClr="FFFFFF"/>
+      </a:lt1>
+      <a:dk2>
+        <a:srgbClr val="44546A"/>
+      </a:dk2>
+      <a:lt2>
+        <a:srgbClr val="E7E6E6"/>
+      </a:lt2>
+      <a:accent1>
+        <a:srgbClr val="4472C4"/>
+      </a:accent1>
+      <a:accent2>
+        <a:srgbClr val="ED7D31"/>
+      </a:accent2>
+      <a:accent3>
+        <a:srgbClr val="A5A5A5"/>
+      </a:accent3>
+      <a:accent4>
+        <a:srgbClr val="FFC000"/>
+      </a:accent4>
+      <a:accent5>
+        <a:srgbClr val="5B9BD5"/>
+      </a:accent5>
+      <a:accent6>
+        <a:srgbClr val="70AD47"/>
+      </a:accent6>
+      <a:hlink>
+        <a:srgbClr val="0563C1"/>
+      </a:hlink>
+      <a:folHlink>
+        <a:srgbClr val="954F72"/>
+      </a:folHlink>
+    </a:clrScheme>
+    <a:fontScheme name="Office">
+      <a:majorFont>
+        <a:latin typeface="Calibri Light" panose="020F0302020204030204"/>
+        <a:ea typeface=""/>
+        <a:cs typeface=""/>
+        <a:font script="Jpan" typeface="游ゴシック Light"/>
+        <a:font script="Hang" typeface="맑은 고딕"/>
+        <a:font script="Hans" typeface="等线 Light"/>
+        <a:font script="Hant" typeface="新細明體"/>
+        <a:font script="Arab" typeface="Times New Roman"/>
+        <a:font script="Hebr" typeface="Times New Roman"/>
+        <a:font script="Thai" typeface="Angsana New"/>
+        <a:font script="Ethi" typeface="Nyala"/>
+        <a:font script="Beng" typeface="Vrinda"/>
+        <a:font script="Gujr" typeface="Shruti"/>
+        <a:font script="Khmr" typeface="MoolBoran"/>
+        <a:font script="Knda" typeface="Tunga"/>
+        <a:font script="Guru" typeface="Raavi"/>
+        <a:font script="Cans" typeface="Euphemia"/>
+        <a:font script="Cher" typeface="Plantagenet Cherokee"/>
+        <a:font script="Yiii" typeface="Microsoft Yi Baiti"/>
+        <a:font script="Tibt" typeface="Microsoft Himalaya"/>
+        <a:font script="Thaa" typeface="MV Boli"/>
+        <a:font script="Deva" typeface="Mangal"/>
+        <a:font script="Telu" typeface="Gautami"/>
+        <a:font script="Taml" typeface="Latha"/>
+        <a:font script="Syrc" typeface="Estrangelo Edessa"/>
+        <a:font script="Orya" typeface="Kalinga"/>
+        <a:font script="Mlym" typeface="Kartika"/>
+        <a:font script="Laoo" typeface="DokChampa"/>
+        <a:font script="Sinh" typeface="Iskoola Pota"/>
+        <a:font script="Mong" typeface="Mongolian Baiti"/>
+        <a:font script="Viet" typeface="Times New Roman"/>
+        <a:font script="Uigh" typeface="Microsoft Uighur"/>
+        <a:font script="Geor" typeface="Sylfaen"/>
+        <a:font script="Armn" typeface="Arial"/>
+        <a:font script="Bugi" typeface="Leelawadee UI"/>
+        <a:font script="Bopo" typeface="Microsoft JhengHei"/>
+        <a:font script="Java" typeface="Javanese Text"/>
+        <a:font script="Lisu" typeface="Segoe UI"/>
+        <a:font script="Mymr" typeface="Myanmar Text"/>
+        <a:font script="Nkoo" typeface="Ebrima"/>
+        <a:font script="Olck" typeface="Nirmala UI"/>
+        <a:font script="Osma" typeface="Ebrima"/>
+        <a:font script="Phag" typeface="Phagspa"/>
+        <a:font script="Syrn" typeface="Estrangelo Edessa"/>
+        <a:font script="Syrj" typeface="Estrangelo Edessa"/>
+        <a:font script="Syre" typeface="Estrangelo Edessa"/>
+        <a:font script="Sora" typeface="Nirmala UI"/>
+        <a:font script="Tale" typeface="Microsoft Tai Le"/>
+        <a:font script="Talu" typeface="Microsoft New Tai Lue"/>
+        <a:font script="Tfng" typeface="Ebrima"/>
+      </a:majorFont>
+      <a:minorFont>
+        <a:latin typeface="Calibri" panose="020F0502020204030204"/>
+        <a:ea typeface=""/>
+        <a:cs typeface=""/>
+        <a:font script="Jpan" typeface="游ゴシック"/>
+        <a:font script="Hang" typeface="맑은 고딕"/>
+        <a:font script="Hans" typeface="等线"/>
+        <a:font script="Hant" typeface="新細明體"/>
+        <a:font script="Arab" typeface="Arial"/>
+        <a:font script="Hebr" typeface="Arial"/>
+        <a:font script="Thai" typeface="Cordia New"/>
+        <a:font script="Ethi" typeface="Nyala"/>
+        <a:font script="Beng" typeface="Vrinda"/>
+        <a:font script="Gujr" typeface="Shruti"/>
+        <a:font script="Khmr" typeface="DaunPenh"/>
+        <a:font script="Knda" typeface="Tunga"/>
+        <a:font script="Guru" typeface="Raavi"/>
+        <a:font script="Cans" typeface="Euphemia"/>
+        <a:font script="Cher" typeface="Plantagenet Cherokee"/>
+        <a:font script="Yiii" typeface="Microsoft Yi Baiti"/>
+        <a:font script="Tibt" typeface="Microsoft Himalaya"/>
+        <a:font script="Thaa" typeface="MV Boli"/>
+        <a:font script="Deva" typeface="Mangal"/>
+        <a:font script="Telu" typeface="Gautami"/>
+        <a:font script="Taml" typeface="Latha"/>
+        <a:font script="Syrc" typeface="Estrangelo Edessa"/>
+        <a:font script="Orya" typeface="Kalinga"/>
+        <a:font script="Mlym" typeface="Kartika"/>
+        <a:font script="Laoo" typeface="DokChampa"/>
+        <a:font script="Sinh" typeface="Iskoola Pota"/>
+        <a:font script="Mong" typeface="Mongolian Baiti"/>
+        <a:font script="Viet" typeface="Arial"/>
+        <a:font script="Uigh" typeface="Microsoft Uighur"/>
+        <a:font script="Geor" typeface="Sylfaen"/>
+        <a:font script="Armn" typeface="Arial"/>
+        <a:font script="Bugi" typeface="Leelawadee UI"/>
+        <a:font script="Bopo" typeface="Microsoft JhengHei"/>
+        <a:font script="Java" typeface="Javanese Text"/>
+        <a:font script="Lisu" typeface="Segoe UI"/>
+        <a:font script="Mymr" typeface="Myanmar Text"/>
+        <a:font script="Nkoo" typeface="Ebrima"/>
+        <a:font script="Olck" typeface="Nirmala UI"/>
+        <a:font script="Osma" typeface="Ebrima"/>
+        <a:font script="Phag" typeface="Phagspa"/>
+        <a:font script="Syrn" typeface="Estrangelo Edessa"/>
+        <a:font script="Syrj" typeface="Estrangelo Edessa"/>
+        <a:font script="Syre" typeface="Estrangelo Edessa"/>
+        <a:font script="Sora" typeface="Nirmala UI"/>
+        <a:font script="Tale" typeface="Microsoft Tai Le"/>
+        <a:font script="Talu" typeface="Microsoft New Tai Lue"/>
+        <a:font script="Tfng" typeface="Ebrima"/>
+      </a:minorFont>
+    </a:fontScheme>
+    <a:fmtScheme name="Office">
+      <a:fillStyleLst>
+        <a:solidFill>
+          <a:schemeClr val="phClr"/>
+        </a:solidFill>
+        <a:gradFill rotWithShape="1">
+          <a:gsLst>
+            <a:gs pos="0">
+              <a:schemeClr val="phClr">
+                <a:lumMod val="110000"/>
+                <a:satMod val="105000"/>
+                <a:tint val="67000"/>
+              </a:schemeClr>
+            </a:gs>
+            <a:gs pos="50000">
+              <a:schemeClr val="phClr">
+                <a:lumMod val="105000"/>
+                <a:satMod val="103000"/>
+                <a:tint val="73000"/>
+              </a:schemeClr>
+            </a:gs>
+            <a:gs pos="100000">
+              <a:schemeClr val="phClr">
+                <a:lumMod val="105000"/>
+                <a:satMod val="109000"/>
+                <a:tint val="81000"/>
+              </a:schemeClr>
+            </a:gs>
+          </a:gsLst>
+          <a:lin ang="5400000" scaled="0"/>
+        </a:gradFill>
+        <a:gradFill rotWithShape="1">
+          <a:gsLst>
+            <a:gs pos="0">
+              <a:schemeClr val="phClr">
+                <a:satMod val="103000"/>
+                <a:lumMod val="102000"/>
+                <a:tint val="94000"/>
+              </a:schemeClr>
+            </a:gs>
+            <a:gs pos="50000">
+              <a:schemeClr val="phClr">
+                <a:satMod val="110000"/>
+                <a:lumMod val="100000"/>
+                <a:shade val="100000"/>
+              </a:schemeClr>
+            </a:gs>
+            <a:gs pos="100000">
+              <a:schemeClr val="phClr">
+                <a:lumMod val="99000"/>
+                <a:satMod val="120000"/>
+                <a:shade val="78000"/>
+              </a:schemeClr>
+            </a:gs>
+          </a:gsLst>
+          <a:lin ang="5400000" scaled="0"/>
+        </a:gradFill>
+      </a:fillStyleLst>
+      <a:lnStyleLst>
+        <a:ln w="6350" cap="flat" cmpd="sng" algn="ctr">
+          <a:solidFill>
+            <a:schemeClr val="phClr"/>
+          </a:solidFill>
+          <a:prstDash val="solid"/>
+          <a:miter lim="800000"/>
+        </a:ln>
+        <a:ln w="12700" cap="flat" cmpd="sng" algn="ctr">
+          <a:solidFill>
+            <a:schemeClr val="phClr"/>
+          </a:solidFill>
+          <a:prstDash val="solid"/>
+          <a:miter lim="800000"/>
+        </a:ln>
+        <a:ln w="19050" cap="flat" cmpd="sng" algn="ctr">
+          <a:solidFill>
+            <a:schemeClr val="phClr"/>
+          </a:solidFill>
+          <a:prstDash val="solid"/>
+          <a:miter lim="800000"/>
+        </a:ln>
+      </a:lnStyleLst>
+      <a:effectStyleLst>
+        <a:effectStyle>
+          <a:effectLst/>
+        </a:effectStyle>
+        <a:effectStyle>
+          <a:effectLst/>
+        </a:effectStyle>
+        <a:effectStyle>
+          <a:effectLst>
+            <a:outerShdw blurRad="57150" dist="19050" dir="5400000" algn="ctr" rotWithShape="0">
+              <a:srgbClr val="000000">
+                <a:alpha val="63000"/>
+              </a:srgbClr>
+            </a:outerShdw>
+          </a:effectLst>
+        </a:effectStyle>
+      </a:effectStyleLst>
+      <a:bgFillStyleLst>
+        <a:solidFill>
+          <a:schemeClr val="phClr"/>
+        </a:solidFill>
+        <a:solidFill>
+          <a:schemeClr val="phClr">
+            <a:tint val="95000"/>
+            <a:satMod val="170000"/>
+          </a:schemeClr>
+        </a:solidFill>
+        <a:gradFill rotWithShape="1">
+          <a:gsLst>
+            <a:gs pos="0">
+              <a:schemeClr val="phClr">
+                <a:tint val="93000"/>
+                <a:satMod val="150000"/>
+                <a:shade val="98000"/>
+                <a:lumMod val="102000"/>
+              </a:schemeClr>
+            </a:gs>
+            <a:gs pos="50000">
+              <a:schemeClr val="phClr">
+                <a:tint val="98000"/>
+                <a:satMod val="130000"/>
+                <a:shade val="90000"/>
+                <a:lumMod val="103000"/>
+              </a:schemeClr>
+            </a:gs>
+            <a:gs pos="100000">
+              <a:schemeClr val="phClr">
+                <a:shade val="63000"/>
+                <a:satMod val="120000"/>
+              </a:schemeClr>
+            </a:gs>
+          </a:gsLst>
+          <a:lin ang="5400000" scaled="0"/>
+        </a:gradFill>
+      </a:bgFillStyleLst>
+    </a:fmtScheme>
+  </a:themeElements>
+  <a:objectDefaults/>
+  <a:extraClrSchemeLst/>
+  <a:extLst>
+    <a:ext uri="{05A4C25C-085E-4340-85A3-A5531E510DB2}">
+      <thm15:themeFamily xmlns:thm15="http://schemas.microsoft.com/office/thememl/2012/main" name="Office Theme" id="{62F939B6-93AF-4DB8-9C6B-D6C7DFDC589F}" vid="{4A3C46E8-61CC-4603-A589-7422A47A8E4A}"/>
+    </a:ext>
+  </a:extLst>
+</a:theme>
 </file>
</xml_diff>

<commit_message>
updated home page and nav
</commit_message>
<xml_diff>
--- a/Project2_Presentation_Material.pptx
+++ b/Project2_Presentation_Material.pptx
@@ -4,15 +4,17 @@
   <p:sldMasterIdLst>
     <p:sldMasterId id="2147483648" r:id="rId1"/>
   </p:sldMasterIdLst>
+  <p:notesMasterIdLst>
+    <p:notesMasterId r:id="rId9"/>
+  </p:notesMasterIdLst>
   <p:sldIdLst>
     <p:sldId id="256" r:id="rId2"/>
-    <p:sldId id="257" r:id="rId3"/>
-    <p:sldId id="258" r:id="rId4"/>
-    <p:sldId id="259" r:id="rId5"/>
-    <p:sldId id="264" r:id="rId6"/>
-    <p:sldId id="260" r:id="rId7"/>
-    <p:sldId id="261" r:id="rId8"/>
-    <p:sldId id="263" r:id="rId9"/>
+    <p:sldId id="258" r:id="rId3"/>
+    <p:sldId id="259" r:id="rId4"/>
+    <p:sldId id="264" r:id="rId5"/>
+    <p:sldId id="260" r:id="rId6"/>
+    <p:sldId id="261" r:id="rId7"/>
+    <p:sldId id="263" r:id="rId8"/>
   </p:sldIdLst>
   <p:sldSz cx="12192000" cy="6858000"/>
   <p:notesSz cx="6858000" cy="9144000"/>
@@ -119,6 +121,442 @@
 </p:presentation>
 </file>
 
+<file path=ppt/notesMasters/notesMaster1.xml><?xml version="1.0" encoding="utf-8"?>
+<p:notesMaster xmlns:a="http://schemas.openxmlformats.org/drawingml/2006/main" xmlns:r="http://schemas.openxmlformats.org/officeDocument/2006/relationships" xmlns:p="http://schemas.openxmlformats.org/presentationml/2006/main">
+  <p:cSld>
+    <p:bg>
+      <p:bgRef idx="1001">
+        <a:schemeClr val="bg1"/>
+      </p:bgRef>
+    </p:bg>
+    <p:spTree>
+      <p:nvGrpSpPr>
+        <p:cNvPr id="1" name=""/>
+        <p:cNvGrpSpPr/>
+        <p:nvPr/>
+      </p:nvGrpSpPr>
+      <p:grpSpPr>
+        <a:xfrm>
+          <a:off x="0" y="0"/>
+          <a:ext cx="0" cy="0"/>
+          <a:chOff x="0" y="0"/>
+          <a:chExt cx="0" cy="0"/>
+        </a:xfrm>
+      </p:grpSpPr>
+      <p:sp>
+        <p:nvSpPr>
+          <p:cNvPr id="2" name="Header Placeholder 1"/>
+          <p:cNvSpPr>
+            <a:spLocks noGrp="1"/>
+          </p:cNvSpPr>
+          <p:nvPr>
+            <p:ph type="hdr" sz="quarter"/>
+          </p:nvPr>
+        </p:nvSpPr>
+        <p:spPr>
+          <a:xfrm>
+            <a:off x="0" y="0"/>
+            <a:ext cx="2971800" cy="458788"/>
+          </a:xfrm>
+          <a:prstGeom prst="rect">
+            <a:avLst/>
+          </a:prstGeom>
+        </p:spPr>
+        <p:txBody>
+          <a:bodyPr vert="horz" lIns="91440" tIns="45720" rIns="91440" bIns="45720" rtlCol="0"/>
+          <a:lstStyle>
+            <a:lvl1pPr algn="l">
+              <a:defRPr sz="1200"/>
+            </a:lvl1pPr>
+          </a:lstStyle>
+          <a:p>
+            <a:endParaRPr lang="en-US"/>
+          </a:p>
+        </p:txBody>
+      </p:sp>
+      <p:sp>
+        <p:nvSpPr>
+          <p:cNvPr id="3" name="Date Placeholder 2"/>
+          <p:cNvSpPr>
+            <a:spLocks noGrp="1"/>
+          </p:cNvSpPr>
+          <p:nvPr>
+            <p:ph type="dt" idx="1"/>
+          </p:nvPr>
+        </p:nvSpPr>
+        <p:spPr>
+          <a:xfrm>
+            <a:off x="3884613" y="0"/>
+            <a:ext cx="2971800" cy="458788"/>
+          </a:xfrm>
+          <a:prstGeom prst="rect">
+            <a:avLst/>
+          </a:prstGeom>
+        </p:spPr>
+        <p:txBody>
+          <a:bodyPr vert="horz" lIns="91440" tIns="45720" rIns="91440" bIns="45720" rtlCol="0"/>
+          <a:lstStyle>
+            <a:lvl1pPr algn="r">
+              <a:defRPr sz="1200"/>
+            </a:lvl1pPr>
+          </a:lstStyle>
+          <a:p>
+            <a:fld id="{A1193E1E-D135-CE4E-9329-B1D8AABA5A14}" type="datetimeFigureOut">
+              <a:rPr lang="en-US" smtClean="0"/>
+              <a:t>1/11/20</a:t>
+            </a:fld>
+            <a:endParaRPr lang="en-US"/>
+          </a:p>
+        </p:txBody>
+      </p:sp>
+      <p:sp>
+        <p:nvSpPr>
+          <p:cNvPr id="4" name="Slide Image Placeholder 3"/>
+          <p:cNvSpPr>
+            <a:spLocks noGrp="1" noRot="1" noChangeAspect="1"/>
+          </p:cNvSpPr>
+          <p:nvPr>
+            <p:ph type="sldImg" idx="2"/>
+          </p:nvPr>
+        </p:nvSpPr>
+        <p:spPr>
+          <a:xfrm>
+            <a:off x="685800" y="1143000"/>
+            <a:ext cx="5486400" cy="3086100"/>
+          </a:xfrm>
+          <a:prstGeom prst="rect">
+            <a:avLst/>
+          </a:prstGeom>
+          <a:noFill/>
+          <a:ln w="12700">
+            <a:solidFill>
+              <a:prstClr val="black"/>
+            </a:solidFill>
+          </a:ln>
+        </p:spPr>
+        <p:txBody>
+          <a:bodyPr vert="horz" lIns="91440" tIns="45720" rIns="91440" bIns="45720" rtlCol="0" anchor="ctr"/>
+          <a:lstStyle/>
+          <a:p>
+            <a:endParaRPr lang="en-US"/>
+          </a:p>
+        </p:txBody>
+      </p:sp>
+      <p:sp>
+        <p:nvSpPr>
+          <p:cNvPr id="5" name="Notes Placeholder 4"/>
+          <p:cNvSpPr>
+            <a:spLocks noGrp="1"/>
+          </p:cNvSpPr>
+          <p:nvPr>
+            <p:ph type="body" sz="quarter" idx="3"/>
+          </p:nvPr>
+        </p:nvSpPr>
+        <p:spPr>
+          <a:xfrm>
+            <a:off x="685800" y="4400550"/>
+            <a:ext cx="5486400" cy="3600450"/>
+          </a:xfrm>
+          <a:prstGeom prst="rect">
+            <a:avLst/>
+          </a:prstGeom>
+        </p:spPr>
+        <p:txBody>
+          <a:bodyPr vert="horz" lIns="91440" tIns="45720" rIns="91440" bIns="45720" rtlCol="0"/>
+          <a:lstStyle/>
+          <a:p>
+            <a:pPr lvl="0"/>
+            <a:r>
+              <a:rPr lang="en-US"/>
+              <a:t>Click to edit Master text styles</a:t>
+            </a:r>
+          </a:p>
+          <a:p>
+            <a:pPr lvl="1"/>
+            <a:r>
+              <a:rPr lang="en-US"/>
+              <a:t>Second level</a:t>
+            </a:r>
+          </a:p>
+          <a:p>
+            <a:pPr lvl="2"/>
+            <a:r>
+              <a:rPr lang="en-US"/>
+              <a:t>Third level</a:t>
+            </a:r>
+          </a:p>
+          <a:p>
+            <a:pPr lvl="3"/>
+            <a:r>
+              <a:rPr lang="en-US"/>
+              <a:t>Fourth level</a:t>
+            </a:r>
+          </a:p>
+          <a:p>
+            <a:pPr lvl="4"/>
+            <a:r>
+              <a:rPr lang="en-US"/>
+              <a:t>Fifth level</a:t>
+            </a:r>
+          </a:p>
+        </p:txBody>
+      </p:sp>
+      <p:sp>
+        <p:nvSpPr>
+          <p:cNvPr id="6" name="Footer Placeholder 5"/>
+          <p:cNvSpPr>
+            <a:spLocks noGrp="1"/>
+          </p:cNvSpPr>
+          <p:nvPr>
+            <p:ph type="ftr" sz="quarter" idx="4"/>
+          </p:nvPr>
+        </p:nvSpPr>
+        <p:spPr>
+          <a:xfrm>
+            <a:off x="0" y="8685213"/>
+            <a:ext cx="2971800" cy="458787"/>
+          </a:xfrm>
+          <a:prstGeom prst="rect">
+            <a:avLst/>
+          </a:prstGeom>
+        </p:spPr>
+        <p:txBody>
+          <a:bodyPr vert="horz" lIns="91440" tIns="45720" rIns="91440" bIns="45720" rtlCol="0" anchor="b"/>
+          <a:lstStyle>
+            <a:lvl1pPr algn="l">
+              <a:defRPr sz="1200"/>
+            </a:lvl1pPr>
+          </a:lstStyle>
+          <a:p>
+            <a:endParaRPr lang="en-US"/>
+          </a:p>
+        </p:txBody>
+      </p:sp>
+      <p:sp>
+        <p:nvSpPr>
+          <p:cNvPr id="7" name="Slide Number Placeholder 6"/>
+          <p:cNvSpPr>
+            <a:spLocks noGrp="1"/>
+          </p:cNvSpPr>
+          <p:nvPr>
+            <p:ph type="sldNum" sz="quarter" idx="5"/>
+          </p:nvPr>
+        </p:nvSpPr>
+        <p:spPr>
+          <a:xfrm>
+            <a:off x="3884613" y="8685213"/>
+            <a:ext cx="2971800" cy="458787"/>
+          </a:xfrm>
+          <a:prstGeom prst="rect">
+            <a:avLst/>
+          </a:prstGeom>
+        </p:spPr>
+        <p:txBody>
+          <a:bodyPr vert="horz" lIns="91440" tIns="45720" rIns="91440" bIns="45720" rtlCol="0" anchor="b"/>
+          <a:lstStyle>
+            <a:lvl1pPr algn="r">
+              <a:defRPr sz="1200"/>
+            </a:lvl1pPr>
+          </a:lstStyle>
+          <a:p>
+            <a:fld id="{8E262D57-DFD1-A444-AE45-6E292DED6AC3}" type="slidenum">
+              <a:rPr lang="en-US" smtClean="0"/>
+              <a:t>‹#›</a:t>
+            </a:fld>
+            <a:endParaRPr lang="en-US"/>
+          </a:p>
+        </p:txBody>
+      </p:sp>
+    </p:spTree>
+    <p:extLst>
+      <p:ext uri="{BB962C8B-B14F-4D97-AF65-F5344CB8AC3E}">
+        <p14:creationId xmlns:p14="http://schemas.microsoft.com/office/powerpoint/2010/main" val="2357967202"/>
+      </p:ext>
+    </p:extLst>
+  </p:cSld>
+  <p:clrMap bg1="lt1" tx1="dk1" bg2="lt2" tx2="dk2" accent1="accent1" accent2="accent2" accent3="accent3" accent4="accent4" accent5="accent5" accent6="accent6" hlink="hlink" folHlink="folHlink"/>
+  <p:notesStyle>
+    <a:lvl1pPr marL="0" algn="l" defTabSz="914400" rtl="0" eaLnBrk="1" latinLnBrk="0" hangingPunct="1">
+      <a:defRPr sz="1200" kern="1200">
+        <a:solidFill>
+          <a:schemeClr val="tx1"/>
+        </a:solidFill>
+        <a:latin typeface="+mn-lt"/>
+        <a:ea typeface="+mn-ea"/>
+        <a:cs typeface="+mn-cs"/>
+      </a:defRPr>
+    </a:lvl1pPr>
+    <a:lvl2pPr marL="457200" algn="l" defTabSz="914400" rtl="0" eaLnBrk="1" latinLnBrk="0" hangingPunct="1">
+      <a:defRPr sz="1200" kern="1200">
+        <a:solidFill>
+          <a:schemeClr val="tx1"/>
+        </a:solidFill>
+        <a:latin typeface="+mn-lt"/>
+        <a:ea typeface="+mn-ea"/>
+        <a:cs typeface="+mn-cs"/>
+      </a:defRPr>
+    </a:lvl2pPr>
+    <a:lvl3pPr marL="914400" algn="l" defTabSz="914400" rtl="0" eaLnBrk="1" latinLnBrk="0" hangingPunct="1">
+      <a:defRPr sz="1200" kern="1200">
+        <a:solidFill>
+          <a:schemeClr val="tx1"/>
+        </a:solidFill>
+        <a:latin typeface="+mn-lt"/>
+        <a:ea typeface="+mn-ea"/>
+        <a:cs typeface="+mn-cs"/>
+      </a:defRPr>
+    </a:lvl3pPr>
+    <a:lvl4pPr marL="1371600" algn="l" defTabSz="914400" rtl="0" eaLnBrk="1" latinLnBrk="0" hangingPunct="1">
+      <a:defRPr sz="1200" kern="1200">
+        <a:solidFill>
+          <a:schemeClr val="tx1"/>
+        </a:solidFill>
+        <a:latin typeface="+mn-lt"/>
+        <a:ea typeface="+mn-ea"/>
+        <a:cs typeface="+mn-cs"/>
+      </a:defRPr>
+    </a:lvl4pPr>
+    <a:lvl5pPr marL="1828800" algn="l" defTabSz="914400" rtl="0" eaLnBrk="1" latinLnBrk="0" hangingPunct="1">
+      <a:defRPr sz="1200" kern="1200">
+        <a:solidFill>
+          <a:schemeClr val="tx1"/>
+        </a:solidFill>
+        <a:latin typeface="+mn-lt"/>
+        <a:ea typeface="+mn-ea"/>
+        <a:cs typeface="+mn-cs"/>
+      </a:defRPr>
+    </a:lvl5pPr>
+    <a:lvl6pPr marL="2286000" algn="l" defTabSz="914400" rtl="0" eaLnBrk="1" latinLnBrk="0" hangingPunct="1">
+      <a:defRPr sz="1200" kern="1200">
+        <a:solidFill>
+          <a:schemeClr val="tx1"/>
+        </a:solidFill>
+        <a:latin typeface="+mn-lt"/>
+        <a:ea typeface="+mn-ea"/>
+        <a:cs typeface="+mn-cs"/>
+      </a:defRPr>
+    </a:lvl6pPr>
+    <a:lvl7pPr marL="2743200" algn="l" defTabSz="914400" rtl="0" eaLnBrk="1" latinLnBrk="0" hangingPunct="1">
+      <a:defRPr sz="1200" kern="1200">
+        <a:solidFill>
+          <a:schemeClr val="tx1"/>
+        </a:solidFill>
+        <a:latin typeface="+mn-lt"/>
+        <a:ea typeface="+mn-ea"/>
+        <a:cs typeface="+mn-cs"/>
+      </a:defRPr>
+    </a:lvl7pPr>
+    <a:lvl8pPr marL="3200400" algn="l" defTabSz="914400" rtl="0" eaLnBrk="1" latinLnBrk="0" hangingPunct="1">
+      <a:defRPr sz="1200" kern="1200">
+        <a:solidFill>
+          <a:schemeClr val="tx1"/>
+        </a:solidFill>
+        <a:latin typeface="+mn-lt"/>
+        <a:ea typeface="+mn-ea"/>
+        <a:cs typeface="+mn-cs"/>
+      </a:defRPr>
+    </a:lvl8pPr>
+    <a:lvl9pPr marL="3657600" algn="l" defTabSz="914400" rtl="0" eaLnBrk="1" latinLnBrk="0" hangingPunct="1">
+      <a:defRPr sz="1200" kern="1200">
+        <a:solidFill>
+          <a:schemeClr val="tx1"/>
+        </a:solidFill>
+        <a:latin typeface="+mn-lt"/>
+        <a:ea typeface="+mn-ea"/>
+        <a:cs typeface="+mn-cs"/>
+      </a:defRPr>
+    </a:lvl9pPr>
+  </p:notesStyle>
+</p:notesMaster>
+</file>
+
+<file path=ppt/notesSlides/notesSlide1.xml><?xml version="1.0" encoding="utf-8"?>
+<p:notes xmlns:a="http://schemas.openxmlformats.org/drawingml/2006/main" xmlns:r="http://schemas.openxmlformats.org/officeDocument/2006/relationships" xmlns:p="http://schemas.openxmlformats.org/presentationml/2006/main">
+  <p:cSld>
+    <p:spTree>
+      <p:nvGrpSpPr>
+        <p:cNvPr id="1" name=""/>
+        <p:cNvGrpSpPr/>
+        <p:nvPr/>
+      </p:nvGrpSpPr>
+      <p:grpSpPr>
+        <a:xfrm>
+          <a:off x="0" y="0"/>
+          <a:ext cx="0" cy="0"/>
+          <a:chOff x="0" y="0"/>
+          <a:chExt cx="0" cy="0"/>
+        </a:xfrm>
+      </p:grpSpPr>
+      <p:sp>
+        <p:nvSpPr>
+          <p:cNvPr id="2" name="Slide Image Placeholder 1"/>
+          <p:cNvSpPr>
+            <a:spLocks noGrp="1" noRot="1" noChangeAspect="1"/>
+          </p:cNvSpPr>
+          <p:nvPr>
+            <p:ph type="sldImg"/>
+          </p:nvPr>
+        </p:nvSpPr>
+        <p:spPr/>
+      </p:sp>
+      <p:sp>
+        <p:nvSpPr>
+          <p:cNvPr id="3" name="Notes Placeholder 2"/>
+          <p:cNvSpPr>
+            <a:spLocks noGrp="1"/>
+          </p:cNvSpPr>
+          <p:nvPr>
+            <p:ph type="body" idx="1"/>
+          </p:nvPr>
+        </p:nvSpPr>
+        <p:spPr/>
+        <p:txBody>
+          <a:bodyPr/>
+          <a:lstStyle/>
+          <a:p>
+            <a:r>
+              <a:rPr lang="en-US" dirty="0"/>
+              <a:t>Mike Stanley will do demo </a:t>
+            </a:r>
+          </a:p>
+        </p:txBody>
+      </p:sp>
+      <p:sp>
+        <p:nvSpPr>
+          <p:cNvPr id="4" name="Slide Number Placeholder 3"/>
+          <p:cNvSpPr>
+            <a:spLocks noGrp="1"/>
+          </p:cNvSpPr>
+          <p:nvPr>
+            <p:ph type="sldNum" sz="quarter" idx="5"/>
+          </p:nvPr>
+        </p:nvSpPr>
+        <p:spPr/>
+        <p:txBody>
+          <a:bodyPr/>
+          <a:lstStyle/>
+          <a:p>
+            <a:fld id="{8E262D57-DFD1-A444-AE45-6E292DED6AC3}" type="slidenum">
+              <a:rPr lang="en-US" smtClean="0"/>
+              <a:t>6</a:t>
+            </a:fld>
+            <a:endParaRPr lang="en-US"/>
+          </a:p>
+        </p:txBody>
+      </p:sp>
+    </p:spTree>
+    <p:extLst>
+      <p:ext uri="{BB962C8B-B14F-4D97-AF65-F5344CB8AC3E}">
+        <p14:creationId xmlns:p14="http://schemas.microsoft.com/office/powerpoint/2010/main" val="3606343212"/>
+      </p:ext>
+    </p:extLst>
+  </p:cSld>
+  <p:clrMapOvr>
+    <a:masterClrMapping/>
+  </p:clrMapOvr>
+</p:notes>
+</file>
+
 <file path=ppt/slideLayouts/slideLayout1.xml><?xml version="1.0" encoding="utf-8"?>
 <p:sldLayout xmlns:a="http://schemas.openxmlformats.org/drawingml/2006/main" xmlns:r="http://schemas.openxmlformats.org/officeDocument/2006/relationships" xmlns:p="http://schemas.openxmlformats.org/presentationml/2006/main" type="title" preserve="1">
   <p:cSld name="Title Slide">
@@ -258,7 +696,7 @@
           <a:p>
             <a:fld id="{48A87A34-81AB-432B-8DAE-1953F412C126}" type="datetimeFigureOut">
               <a:rPr lang="en-US" dirty="0"/>
-              <a:t>1/10/2020</a:t>
+              <a:t>1/11/20</a:t>
             </a:fld>
             <a:endParaRPr lang="en-US" dirty="0"/>
           </a:p>
@@ -464,7 +902,7 @@
           <a:p>
             <a:fld id="{48A87A34-81AB-432B-8DAE-1953F412C126}" type="datetimeFigureOut">
               <a:rPr lang="en-US" dirty="0"/>
-              <a:t>1/10/2020</a:t>
+              <a:t>1/11/20</a:t>
             </a:fld>
             <a:endParaRPr lang="en-US" dirty="0"/>
           </a:p>
@@ -674,7 +1112,7 @@
           <a:p>
             <a:fld id="{48A87A34-81AB-432B-8DAE-1953F412C126}" type="datetimeFigureOut">
               <a:rPr lang="en-US" dirty="0"/>
-              <a:t>1/10/2020</a:t>
+              <a:t>1/11/20</a:t>
             </a:fld>
             <a:endParaRPr lang="en-US" dirty="0"/>
           </a:p>
@@ -870,7 +1308,7 @@
           <a:p>
             <a:fld id="{48A87A34-81AB-432B-8DAE-1953F412C126}" type="datetimeFigureOut">
               <a:rPr lang="en-US" dirty="0"/>
-              <a:t>1/10/2020</a:t>
+              <a:t>1/11/20</a:t>
             </a:fld>
             <a:endParaRPr lang="en-US" dirty="0"/>
           </a:p>
@@ -1144,7 +1582,7 @@
           <a:p>
             <a:fld id="{48A87A34-81AB-432B-8DAE-1953F412C126}" type="datetimeFigureOut">
               <a:rPr lang="en-US" dirty="0"/>
-              <a:t>1/10/2020</a:t>
+              <a:t>1/11/20</a:t>
             </a:fld>
             <a:endParaRPr lang="en-US" dirty="0"/>
           </a:p>
@@ -1407,7 +1845,7 @@
           <a:p>
             <a:fld id="{48A87A34-81AB-432B-8DAE-1953F412C126}" type="datetimeFigureOut">
               <a:rPr lang="en-US" dirty="0"/>
-              <a:t>1/10/2020</a:t>
+              <a:t>1/11/20</a:t>
             </a:fld>
             <a:endParaRPr lang="en-US" dirty="0"/>
           </a:p>
@@ -1818,7 +2256,7 @@
           <a:p>
             <a:fld id="{48A87A34-81AB-432B-8DAE-1953F412C126}" type="datetimeFigureOut">
               <a:rPr lang="en-US" dirty="0"/>
-              <a:t>1/10/2020</a:t>
+              <a:t>1/11/20</a:t>
             </a:fld>
             <a:endParaRPr lang="en-US" dirty="0"/>
           </a:p>
@@ -1962,7 +2400,7 @@
           <a:p>
             <a:fld id="{48A87A34-81AB-432B-8DAE-1953F412C126}" type="datetimeFigureOut">
               <a:rPr lang="en-US" dirty="0"/>
-              <a:t>1/10/2020</a:t>
+              <a:t>1/11/20</a:t>
             </a:fld>
             <a:endParaRPr lang="en-US" dirty="0"/>
           </a:p>
@@ -2083,7 +2521,7 @@
           <a:p>
             <a:fld id="{48A87A34-81AB-432B-8DAE-1953F412C126}" type="datetimeFigureOut">
               <a:rPr lang="en-US" dirty="0"/>
-              <a:t>1/10/2020</a:t>
+              <a:t>1/11/20</a:t>
             </a:fld>
             <a:endParaRPr lang="en-US" dirty="0"/>
           </a:p>
@@ -2329,7 +2767,7 @@
           <a:p>
             <a:fld id="{48A87A34-81AB-432B-8DAE-1953F412C126}" type="datetimeFigureOut">
               <a:rPr lang="en-US" dirty="0"/>
-              <a:t>1/10/2020</a:t>
+              <a:t>1/11/20</a:t>
             </a:fld>
             <a:endParaRPr lang="en-US" dirty="0"/>
           </a:p>
@@ -2770,7 +3208,7 @@
             <a:fld id="{48A87A34-81AB-432B-8DAE-1953F412C126}" type="datetimeFigureOut">
               <a:rPr lang="en-US" dirty="0"/>
               <a:pPr/>
-              <a:t>1/10/2020</a:t>
+              <a:t>1/11/20</a:t>
             </a:fld>
             <a:endParaRPr lang="en-US" dirty="0"/>
           </a:p>
@@ -3093,7 +3531,7 @@
             <a:fld id="{48A87A34-81AB-432B-8DAE-1953F412C126}" type="datetimeFigureOut">
               <a:rPr lang="en-US" dirty="0"/>
               <a:pPr/>
-              <a:t>1/10/2020</a:t>
+              <a:t>1/11/20</a:t>
             </a:fld>
             <a:endParaRPr lang="en-US" dirty="0"/>
           </a:p>
@@ -3561,6 +3999,30 @@
 <file path=ppt/slides/slide1.xml><?xml version="1.0" encoding="utf-8"?>
 <p:sld xmlns:a="http://schemas.openxmlformats.org/drawingml/2006/main" xmlns:r="http://schemas.openxmlformats.org/officeDocument/2006/relationships" xmlns:p="http://schemas.openxmlformats.org/presentationml/2006/main">
   <p:cSld>
+    <p:bg>
+      <p:bgPr>
+        <a:gradFill rotWithShape="1">
+          <a:gsLst>
+            <a:gs pos="0">
+              <a:schemeClr val="bg2">
+                <a:tint val="94000"/>
+                <a:satMod val="80000"/>
+                <a:lumMod val="106000"/>
+              </a:schemeClr>
+            </a:gs>
+            <a:gs pos="100000">
+              <a:schemeClr val="bg2">
+                <a:shade val="80000"/>
+              </a:schemeClr>
+            </a:gs>
+          </a:gsLst>
+          <a:path path="circle">
+            <a:fillToRect l="50000" t="50000" r="50000" b="50000"/>
+          </a:path>
+        </a:gradFill>
+        <a:effectLst/>
+      </p:bgPr>
+    </p:bg>
     <p:spTree>
       <p:nvGrpSpPr>
         <p:cNvPr id="1" name=""/>
@@ -3575,36 +4037,553 @@
           <a:chExt cx="0" cy="0"/>
         </a:xfrm>
       </p:grpSpPr>
-      <p:sp>
-        <p:nvSpPr>
-          <p:cNvPr id="2" name="Title 1">
+      <p:sp useBgFill="1">
+        <p:nvSpPr>
+          <p:cNvPr id="7" name="Rectangle 6">
             <a:extLst>
               <a:ext uri="{FF2B5EF4-FFF2-40B4-BE49-F238E27FC236}">
-                <a16:creationId xmlns:a16="http://schemas.microsoft.com/office/drawing/2014/main" id="{C5D87C91-64CC-D44A-A664-F0F83EE35161}"/>
+                <a16:creationId xmlns:a16="http://schemas.microsoft.com/office/drawing/2014/main" id="{1BF0792A-0F2B-4A2E-AB38-0A4F18A3072D}"/>
+              </a:ext>
+              <a:ext uri="{C183D7F6-B498-43B3-948B-1728B52AA6E4}">
+                <adec:decorative xmlns:adec="http://schemas.microsoft.com/office/drawing/2017/decorative" val="1"/>
               </a:ext>
             </a:extLst>
           </p:cNvPr>
           <p:cNvSpPr>
-            <a:spLocks noGrp="1"/>
-          </p:cNvSpPr>
-          <p:nvPr>
-            <p:ph type="ctrTitle"/>
-          </p:nvPr>
-        </p:nvSpPr>
-        <p:spPr/>
-        <p:txBody>
-          <a:bodyPr/>
-          <a:lstStyle/>
-          <a:p>
-            <a:r>
-              <a:rPr lang="en-US" dirty="0">
-                <a:latin typeface="Cooper Black" panose="0208090404030B020404" pitchFamily="18" charset="0"/>
-              </a:rPr>
-              <a:t>Look out</a:t>
-            </a:r>
-          </a:p>
-        </p:txBody>
-      </p:sp>
+            <a:spLocks noGrp="1" noRot="1" noChangeAspect="1" noMove="1" noResize="1" noEditPoints="1" noAdjustHandles="1" noChangeArrowheads="1" noChangeShapeType="1" noTextEdit="1"/>
+          </p:cNvSpPr>
+          <p:nvPr>
+            <p:extLst>
+              <p:ext uri="{386F3935-93C4-4BCD-93E2-E3B085C9AB24}">
+                <p16:designElem xmlns:p16="http://schemas.microsoft.com/office/powerpoint/2015/main" val="1"/>
+              </p:ext>
+            </p:extLst>
+          </p:nvPr>
+        </p:nvSpPr>
+        <p:spPr>
+          <a:xfrm>
+            <a:off x="2" y="0"/>
+            <a:ext cx="12191695" cy="6858000"/>
+          </a:xfrm>
+          <a:prstGeom prst="rect">
+            <a:avLst/>
+          </a:prstGeom>
+          <a:ln>
+            <a:noFill/>
+          </a:ln>
+        </p:spPr>
+        <p:style>
+          <a:lnRef idx="2">
+            <a:schemeClr val="accent1">
+              <a:shade val="50000"/>
+            </a:schemeClr>
+          </a:lnRef>
+          <a:fillRef idx="1">
+            <a:schemeClr val="accent1"/>
+          </a:fillRef>
+          <a:effectRef idx="0">
+            <a:schemeClr val="accent1"/>
+          </a:effectRef>
+          <a:fontRef idx="minor">
+            <a:schemeClr val="lt1"/>
+          </a:fontRef>
+        </p:style>
+        <p:txBody>
+          <a:bodyPr rtlCol="0" anchor="ctr"/>
+          <a:lstStyle/>
+          <a:p>
+            <a:pPr algn="ctr"/>
+            <a:endParaRPr lang="en-US"/>
+          </a:p>
+        </p:txBody>
+      </p:sp>
+      <p:sp>
+        <p:nvSpPr>
+          <p:cNvPr id="9" name="Rectangle 8">
+            <a:extLst>
+              <a:ext uri="{FF2B5EF4-FFF2-40B4-BE49-F238E27FC236}">
+                <a16:creationId xmlns:a16="http://schemas.microsoft.com/office/drawing/2014/main" id="{F57DB18D-C2F1-4C8C-8808-9C01ECE6834E}"/>
+              </a:ext>
+              <a:ext uri="{C183D7F6-B498-43B3-948B-1728B52AA6E4}">
+                <adec:decorative xmlns:adec="http://schemas.microsoft.com/office/drawing/2017/decorative" val="1"/>
+              </a:ext>
+            </a:extLst>
+          </p:cNvPr>
+          <p:cNvSpPr>
+            <a:spLocks noGrp="1" noRot="1" noChangeAspect="1" noMove="1" noResize="1" noEditPoints="1" noAdjustHandles="1" noChangeArrowheads="1" noChangeShapeType="1" noTextEdit="1"/>
+          </p:cNvSpPr>
+          <p:nvPr>
+            <p:extLst>
+              <p:ext uri="{386F3935-93C4-4BCD-93E2-E3B085C9AB24}">
+                <p16:designElem xmlns:p16="http://schemas.microsoft.com/office/powerpoint/2015/main" val="1"/>
+              </p:ext>
+            </p:extLst>
+          </p:nvPr>
+        </p:nvSpPr>
+        <p:spPr>
+          <a:xfrm>
+            <a:off x="0" y="2019476"/>
+            <a:ext cx="12192000" cy="4105941"/>
+          </a:xfrm>
+          <a:prstGeom prst="rect">
+            <a:avLst/>
+          </a:prstGeom>
+          <a:gradFill flip="none" rotWithShape="1">
+            <a:gsLst>
+              <a:gs pos="0">
+                <a:schemeClr val="bg2">
+                  <a:alpha val="0"/>
+                </a:schemeClr>
+              </a:gs>
+              <a:gs pos="100000">
+                <a:schemeClr val="bg2"/>
+              </a:gs>
+            </a:gsLst>
+            <a:lin ang="5400000" scaled="0"/>
+            <a:tileRect/>
+          </a:gradFill>
+          <a:ln>
+            <a:noFill/>
+          </a:ln>
+        </p:spPr>
+        <p:style>
+          <a:lnRef idx="2">
+            <a:schemeClr val="accent1">
+              <a:shade val="50000"/>
+            </a:schemeClr>
+          </a:lnRef>
+          <a:fillRef idx="1">
+            <a:schemeClr val="accent1"/>
+          </a:fillRef>
+          <a:effectRef idx="0">
+            <a:schemeClr val="accent1"/>
+          </a:effectRef>
+          <a:fontRef idx="minor">
+            <a:schemeClr val="lt1"/>
+          </a:fontRef>
+        </p:style>
+        <p:txBody>
+          <a:bodyPr rtlCol="0" anchor="ctr"/>
+          <a:lstStyle/>
+          <a:p>
+            <a:pPr lvl="0" algn="ctr"/>
+            <a:endParaRPr lang="en-US"/>
+          </a:p>
+        </p:txBody>
+      </p:sp>
+      <p:grpSp>
+        <p:nvGrpSpPr>
+          <p:cNvPr id="11" name="Group 10">
+            <a:extLst>
+              <a:ext uri="{FF2B5EF4-FFF2-40B4-BE49-F238E27FC236}">
+                <a16:creationId xmlns:a16="http://schemas.microsoft.com/office/drawing/2014/main" id="{E5D935FA-3336-4941-9214-E250A5727F40}"/>
+              </a:ext>
+              <a:ext uri="{C183D7F6-B498-43B3-948B-1728B52AA6E4}">
+                <adec:decorative xmlns:adec="http://schemas.microsoft.com/office/drawing/2017/decorative" val="1"/>
+              </a:ext>
+            </a:extLst>
+          </p:cNvPr>
+          <p:cNvGrpSpPr>
+            <a:grpSpLocks noGrp="1" noUngrp="1" noRot="1" noChangeAspect="1" noMove="1" noResize="1"/>
+          </p:cNvGrpSpPr>
+          <p:nvPr>
+            <p:extLst>
+              <p:ext uri="{386F3935-93C4-4BCD-93E2-E3B085C9AB24}">
+                <p16:designElem xmlns:p16="http://schemas.microsoft.com/office/powerpoint/2015/main" val="1"/>
+              </p:ext>
+            </p:extLst>
+          </p:nvPr>
+        </p:nvGrpSpPr>
+        <p:grpSpPr>
+          <a:xfrm>
+            <a:off x="1445671" y="644327"/>
+            <a:ext cx="9299965" cy="4811366"/>
+            <a:chOff x="7639235" y="600024"/>
+            <a:chExt cx="3898557" cy="6878929"/>
+          </a:xfrm>
+        </p:grpSpPr>
+        <p:sp>
+          <p:nvSpPr>
+            <p:cNvPr id="12" name="Rectangle 11">
+              <a:extLst>
+                <a:ext uri="{FF2B5EF4-FFF2-40B4-BE49-F238E27FC236}">
+                  <a16:creationId xmlns:a16="http://schemas.microsoft.com/office/drawing/2014/main" id="{45D9E2ED-FF90-4200-A7EE-6D41D6526F27}"/>
+                </a:ext>
+                <a:ext uri="{C183D7F6-B498-43B3-948B-1728B52AA6E4}">
+                  <adec:decorative xmlns:adec="http://schemas.microsoft.com/office/drawing/2017/decorative" val="1"/>
+                </a:ext>
+              </a:extLst>
+            </p:cNvPr>
+            <p:cNvSpPr/>
+            <p:nvPr>
+              <p:extLst>
+                <p:ext uri="{386F3935-93C4-4BCD-93E2-E3B085C9AB24}">
+                  <p16:designElem xmlns:p16="http://schemas.microsoft.com/office/powerpoint/2015/main" val="1"/>
+                </p:ext>
+              </p:extLst>
+            </p:nvPr>
+          </p:nvSpPr>
+          <p:spPr>
+            <a:xfrm>
+              <a:off x="7639235" y="600024"/>
+              <a:ext cx="3898557" cy="6878929"/>
+            </a:xfrm>
+            <a:prstGeom prst="rect">
+              <a:avLst/>
+            </a:prstGeom>
+            <a:gradFill>
+              <a:gsLst>
+                <a:gs pos="0">
+                  <a:srgbClr val="000001"/>
+                </a:gs>
+                <a:gs pos="100000">
+                  <a:srgbClr val="191919"/>
+                </a:gs>
+              </a:gsLst>
+            </a:gradFill>
+            <a:ln w="76200" cmpd="sng">
+              <a:noFill/>
+              <a:miter lim="800000"/>
+            </a:ln>
+            <a:effectLst>
+              <a:outerShdw blurRad="127000" dist="228600" dir="4740000" sx="98000" sy="98000" algn="tl" rotWithShape="0">
+                <a:srgbClr val="000000">
+                  <a:alpha val="34000"/>
+                </a:srgbClr>
+              </a:outerShdw>
+            </a:effectLst>
+            <a:scene3d>
+              <a:camera prst="orthographicFront"/>
+              <a:lightRig rig="threePt" dir="t"/>
+            </a:scene3d>
+            <a:sp3d>
+              <a:bevelT w="152400" h="50800" prst="softRound"/>
+            </a:sp3d>
+          </p:spPr>
+          <p:style>
+            <a:lnRef idx="1">
+              <a:schemeClr val="accent1"/>
+            </a:lnRef>
+            <a:fillRef idx="3">
+              <a:schemeClr val="accent1"/>
+            </a:fillRef>
+            <a:effectRef idx="2">
+              <a:schemeClr val="accent1"/>
+            </a:effectRef>
+            <a:fontRef idx="minor">
+              <a:schemeClr val="lt1"/>
+            </a:fontRef>
+          </p:style>
+          <p:txBody>
+            <a:bodyPr rtlCol="0" anchor="ctr"/>
+            <a:lstStyle/>
+            <a:p>
+              <a:pPr algn="ctr"/>
+              <a:endParaRPr lang="en-US"/>
+            </a:p>
+          </p:txBody>
+        </p:sp>
+        <p:sp>
+          <p:nvSpPr>
+            <p:cNvPr id="13" name="Rectangle 12">
+              <a:extLst>
+                <a:ext uri="{FF2B5EF4-FFF2-40B4-BE49-F238E27FC236}">
+                  <a16:creationId xmlns:a16="http://schemas.microsoft.com/office/drawing/2014/main" id="{3A4BEB8D-68AD-4314-8A2B-F8DC85A5301F}"/>
+                </a:ext>
+                <a:ext uri="{C183D7F6-B498-43B3-948B-1728B52AA6E4}">
+                  <adec:decorative xmlns:adec="http://schemas.microsoft.com/office/drawing/2017/decorative" val="1"/>
+                </a:ext>
+              </a:extLst>
+            </p:cNvPr>
+            <p:cNvSpPr/>
+            <p:nvPr>
+              <p:extLst>
+                <p:ext uri="{386F3935-93C4-4BCD-93E2-E3B085C9AB24}">
+                  <p16:designElem xmlns:p16="http://schemas.microsoft.com/office/powerpoint/2015/main" val="1"/>
+                </p:ext>
+              </p:extLst>
+            </p:nvPr>
+          </p:nvSpPr>
+          <p:spPr>
+            <a:xfrm>
+              <a:off x="7770263" y="1062693"/>
+              <a:ext cx="3635738" cy="5954752"/>
+            </a:xfrm>
+            <a:prstGeom prst="rect">
+              <a:avLst/>
+            </a:prstGeom>
+            <a:gradFill>
+              <a:gsLst>
+                <a:gs pos="0">
+                  <a:srgbClr val="DADADA"/>
+                </a:gs>
+                <a:gs pos="100000">
+                  <a:srgbClr val="FFFFFE"/>
+                </a:gs>
+              </a:gsLst>
+              <a:lin ang="16200000" scaled="0"/>
+            </a:gradFill>
+            <a:ln w="50800" cmpd="sng">
+              <a:solidFill>
+                <a:srgbClr val="191919"/>
+              </a:solidFill>
+              <a:miter lim="800000"/>
+            </a:ln>
+            <a:effectLst>
+              <a:innerShdw blurRad="63500" dist="88900" dir="14100000">
+                <a:srgbClr val="000000">
+                  <a:alpha val="30000"/>
+                </a:srgbClr>
+              </a:innerShdw>
+            </a:effectLst>
+            <a:scene3d>
+              <a:camera prst="orthographicFront"/>
+              <a:lightRig rig="threePt" dir="t"/>
+            </a:scene3d>
+            <a:sp3d>
+              <a:bevelT prst="relaxedInset"/>
+            </a:sp3d>
+          </p:spPr>
+          <p:style>
+            <a:lnRef idx="1">
+              <a:schemeClr val="accent1"/>
+            </a:lnRef>
+            <a:fillRef idx="3">
+              <a:schemeClr val="accent1"/>
+            </a:fillRef>
+            <a:effectRef idx="2">
+              <a:schemeClr val="accent1"/>
+            </a:effectRef>
+            <a:fontRef idx="minor">
+              <a:schemeClr val="lt1"/>
+            </a:fontRef>
+          </p:style>
+          <p:txBody>
+            <a:bodyPr rtlCol="0" anchor="ctr"/>
+            <a:lstStyle/>
+            <a:p>
+              <a:pPr algn="ctr"/>
+              <a:endParaRPr lang="en-US"/>
+            </a:p>
+          </p:txBody>
+        </p:sp>
+      </p:grpSp>
+      <p:cxnSp>
+        <p:nvCxnSpPr>
+          <p:cNvPr id="15" name="Straight Connector 14">
+            <a:extLst>
+              <a:ext uri="{FF2B5EF4-FFF2-40B4-BE49-F238E27FC236}">
+                <a16:creationId xmlns:a16="http://schemas.microsoft.com/office/drawing/2014/main" id="{87F797D1-251E-41FE-9FF8-AD487DEF28AC}"/>
+              </a:ext>
+              <a:ext uri="{C183D7F6-B498-43B3-948B-1728B52AA6E4}">
+                <adec:decorative xmlns:adec="http://schemas.microsoft.com/office/drawing/2017/decorative" val="1"/>
+              </a:ext>
+            </a:extLst>
+          </p:cNvPr>
+          <p:cNvCxnSpPr>
+            <a:cxnSpLocks noGrp="1" noRot="1" noChangeAspect="1" noMove="1" noResize="1" noEditPoints="1" noAdjustHandles="1" noChangeArrowheads="1" noChangeShapeType="1"/>
+          </p:cNvCxnSpPr>
+          <p:nvPr>
+            <p:extLst>
+              <p:ext uri="{386F3935-93C4-4BCD-93E2-E3B085C9AB24}">
+                <p16:designElem xmlns:p16="http://schemas.microsoft.com/office/powerpoint/2015/main" val="1"/>
+              </p:ext>
+            </p:extLst>
+          </p:nvPr>
+        </p:nvCxnSpPr>
+        <p:spPr>
+          <a:xfrm>
+            <a:off x="2391407" y="1416139"/>
+            <a:ext cx="7405874" cy="0"/>
+          </a:xfrm>
+          <a:prstGeom prst="line">
+            <a:avLst/>
+          </a:prstGeom>
+          <a:ln w="31750"/>
+        </p:spPr>
+        <p:style>
+          <a:lnRef idx="3">
+            <a:schemeClr val="accent1"/>
+          </a:lnRef>
+          <a:fillRef idx="0">
+            <a:schemeClr val="accent1"/>
+          </a:fillRef>
+          <a:effectRef idx="2">
+            <a:schemeClr val="accent1"/>
+          </a:effectRef>
+          <a:fontRef idx="minor">
+            <a:schemeClr val="tx1"/>
+          </a:fontRef>
+        </p:style>
+      </p:cxnSp>
+      <p:cxnSp>
+        <p:nvCxnSpPr>
+          <p:cNvPr id="17" name="Straight Connector 16">
+            <a:extLst>
+              <a:ext uri="{FF2B5EF4-FFF2-40B4-BE49-F238E27FC236}">
+                <a16:creationId xmlns:a16="http://schemas.microsoft.com/office/drawing/2014/main" id="{09A0CE28-0E59-4F4D-9855-8A8DCE9A8EFE}"/>
+              </a:ext>
+              <a:ext uri="{C183D7F6-B498-43B3-948B-1728B52AA6E4}">
+                <adec:decorative xmlns:adec="http://schemas.microsoft.com/office/drawing/2017/decorative" val="1"/>
+              </a:ext>
+            </a:extLst>
+          </p:cNvPr>
+          <p:cNvCxnSpPr>
+            <a:cxnSpLocks noGrp="1" noRot="1" noChangeAspect="1" noMove="1" noResize="1" noEditPoints="1" noAdjustHandles="1" noChangeArrowheads="1" noChangeShapeType="1"/>
+          </p:cNvCxnSpPr>
+          <p:nvPr>
+            <p:extLst>
+              <p:ext uri="{386F3935-93C4-4BCD-93E2-E3B085C9AB24}">
+                <p16:designElem xmlns:p16="http://schemas.microsoft.com/office/powerpoint/2015/main" val="1"/>
+              </p:ext>
+            </p:extLst>
+          </p:nvPr>
+        </p:nvCxnSpPr>
+        <p:spPr>
+          <a:xfrm>
+            <a:off x="2391407" y="4285341"/>
+            <a:ext cx="7405874" cy="0"/>
+          </a:xfrm>
+          <a:prstGeom prst="line">
+            <a:avLst/>
+          </a:prstGeom>
+          <a:ln w="31750"/>
+        </p:spPr>
+        <p:style>
+          <a:lnRef idx="3">
+            <a:schemeClr val="accent1"/>
+          </a:lnRef>
+          <a:fillRef idx="0">
+            <a:schemeClr val="accent1"/>
+          </a:fillRef>
+          <a:effectRef idx="2">
+            <a:schemeClr val="accent1"/>
+          </a:effectRef>
+          <a:fontRef idx="minor">
+            <a:schemeClr val="tx1"/>
+          </a:fontRef>
+        </p:style>
+      </p:cxnSp>
+      <p:pic>
+        <p:nvPicPr>
+          <p:cNvPr id="19" name="Picture 18">
+            <a:extLst>
+              <a:ext uri="{FF2B5EF4-FFF2-40B4-BE49-F238E27FC236}">
+                <a16:creationId xmlns:a16="http://schemas.microsoft.com/office/drawing/2014/main" id="{75CC23F7-9F20-4C4B-8608-BD4DE9728FA5}"/>
+              </a:ext>
+              <a:ext uri="{C183D7F6-B498-43B3-948B-1728B52AA6E4}">
+                <adec:decorative xmlns:adec="http://schemas.microsoft.com/office/drawing/2017/decorative" val="1"/>
+              </a:ext>
+            </a:extLst>
+          </p:cNvPr>
+          <p:cNvPicPr>
+            <a:picLocks noGrp="1" noRot="1" noChangeAspect="1" noMove="1" noResize="1" noEditPoints="1" noAdjustHandles="1" noChangeArrowheads="1" noChangeShapeType="1" noCrop="1"/>
+          </p:cNvPicPr>
+          <p:nvPr>
+            <p:extLst>
+              <p:ext uri="{386F3935-93C4-4BCD-93E2-E3B085C9AB24}">
+                <p16:designElem xmlns:p16="http://schemas.microsoft.com/office/powerpoint/2015/main" val="1"/>
+              </p:ext>
+            </p:extLst>
+          </p:nvPr>
+        </p:nvPicPr>
+        <p:blipFill rotWithShape="1">
+          <a:blip r:embed="rId2">
+            <a:extLst>
+              <a:ext uri="{28A0092B-C50C-407E-A947-70E740481C1C}">
+                <a14:useLocalDpi xmlns:a14="http://schemas.microsoft.com/office/drawing/2010/main" val="0"/>
+              </a:ext>
+            </a:extLst>
+          </a:blip>
+          <a:srcRect t="1538" b="-1538"/>
+          <a:stretch/>
+        </p:blipFill>
+        <p:spPr bwMode="black">
+          <a:xfrm>
+            <a:off x="0" y="6126480"/>
+            <a:ext cx="12192000" cy="742950"/>
+          </a:xfrm>
+          <a:prstGeom prst="rect">
+            <a:avLst/>
+          </a:prstGeom>
+        </p:spPr>
+      </p:pic>
+      <p:sp>
+        <p:nvSpPr>
+          <p:cNvPr id="5" name="Rectangle 4">
+            <a:extLst>
+              <a:ext uri="{FF2B5EF4-FFF2-40B4-BE49-F238E27FC236}">
+                <a16:creationId xmlns:a16="http://schemas.microsoft.com/office/drawing/2014/main" id="{7F043B42-1F43-6343-AA72-EA16B34C85FF}"/>
+              </a:ext>
+            </a:extLst>
+          </p:cNvPr>
+          <p:cNvSpPr/>
+          <p:nvPr/>
+        </p:nvSpPr>
+        <p:spPr>
+          <a:xfrm>
+            <a:off x="1603513" y="696272"/>
+            <a:ext cx="8814485" cy="4502026"/>
+          </a:xfrm>
+          <a:prstGeom prst="rect">
+            <a:avLst/>
+          </a:prstGeom>
+        </p:spPr>
+        <p:style>
+          <a:lnRef idx="2">
+            <a:schemeClr val="dk1">
+              <a:shade val="50000"/>
+            </a:schemeClr>
+          </a:lnRef>
+          <a:fillRef idx="1">
+            <a:schemeClr val="dk1"/>
+          </a:fillRef>
+          <a:effectRef idx="0">
+            <a:schemeClr val="dk1"/>
+          </a:effectRef>
+          <a:fontRef idx="minor">
+            <a:schemeClr val="lt1"/>
+          </a:fontRef>
+        </p:style>
+        <p:txBody>
+          <a:bodyPr rtlCol="0" anchor="ctr"/>
+          <a:lstStyle/>
+          <a:p>
+            <a:pPr algn="ctr"/>
+            <a:endParaRPr lang="en-US"/>
+          </a:p>
+        </p:txBody>
+      </p:sp>
+      <p:pic>
+        <p:nvPicPr>
+          <p:cNvPr id="8" name="Picture 7" descr="A picture containing drawing&#10;&#10;Description automatically generated">
+            <a:extLst>
+              <a:ext uri="{FF2B5EF4-FFF2-40B4-BE49-F238E27FC236}">
+                <a16:creationId xmlns:a16="http://schemas.microsoft.com/office/drawing/2014/main" id="{EB06F86A-56CD-6547-AB6D-51042BA8966E}"/>
+              </a:ext>
+            </a:extLst>
+          </p:cNvPr>
+          <p:cNvPicPr>
+            <a:picLocks noChangeAspect="1"/>
+          </p:cNvPicPr>
+          <p:nvPr/>
+        </p:nvPicPr>
+        <p:blipFill>
+          <a:blip r:embed="rId3"/>
+          <a:stretch>
+            <a:fillRect/>
+          </a:stretch>
+        </p:blipFill>
+        <p:spPr>
+          <a:xfrm>
+            <a:off x="3308989" y="727779"/>
+            <a:ext cx="5574021" cy="4371471"/>
+          </a:xfrm>
+          <a:prstGeom prst="rect">
+            <a:avLst/>
+          </a:prstGeom>
+        </p:spPr>
+      </p:pic>
     </p:spTree>
     <p:extLst>
       <p:ext uri="{BB962C8B-B14F-4D97-AF65-F5344CB8AC3E}">
@@ -3640,7 +4619,7 @@
           <p:cNvPr id="2" name="Title 1">
             <a:extLst>
               <a:ext uri="{FF2B5EF4-FFF2-40B4-BE49-F238E27FC236}">
-                <a16:creationId xmlns:a16="http://schemas.microsoft.com/office/drawing/2014/main" id="{D076A2A3-141C-7A45-8FBC-02EFA3577BF6}"/>
+                <a16:creationId xmlns:a16="http://schemas.microsoft.com/office/drawing/2014/main" id="{B345F55A-A4AC-DD45-B364-046A1FECDCF3}"/>
               </a:ext>
             </a:extLst>
           </p:cNvPr>
@@ -3658,73 +4637,309 @@
           <a:p>
             <a:r>
               <a:rPr lang="en-US" dirty="0"/>
-              <a:t>Agenda</a:t>
-            </a:r>
-          </a:p>
-        </p:txBody>
-      </p:sp>
-      <p:sp>
-        <p:nvSpPr>
-          <p:cNvPr id="3" name="Content Placeholder 2">
+              <a:t>Team members</a:t>
+            </a:r>
+          </a:p>
+        </p:txBody>
+      </p:sp>
+      <p:grpSp>
+        <p:nvGrpSpPr>
+          <p:cNvPr id="23" name="Group 22">
             <a:extLst>
               <a:ext uri="{FF2B5EF4-FFF2-40B4-BE49-F238E27FC236}">
-                <a16:creationId xmlns:a16="http://schemas.microsoft.com/office/drawing/2014/main" id="{D2638019-A83E-7441-A16B-AF6523B1D40A}"/>
+                <a16:creationId xmlns:a16="http://schemas.microsoft.com/office/drawing/2014/main" id="{AFAB6A22-1ED7-8E44-BD01-0F9275D3FD49}"/>
               </a:ext>
             </a:extLst>
           </p:cNvPr>
-          <p:cNvSpPr>
-            <a:spLocks noGrp="1"/>
-          </p:cNvSpPr>
-          <p:nvPr>
-            <p:ph idx="1"/>
-          </p:nvPr>
-        </p:nvSpPr>
-        <p:spPr/>
-        <p:txBody>
-          <a:bodyPr/>
-          <a:lstStyle/>
-          <a:p>
-            <a:r>
-              <a:rPr lang="en-US" dirty="0"/>
-              <a:t>Team Members</a:t>
-            </a:r>
-          </a:p>
-          <a:p>
-            <a:r>
-              <a:rPr lang="en-US" dirty="0"/>
-              <a:t>Proposal</a:t>
-            </a:r>
-          </a:p>
-          <a:p>
-            <a:r>
-              <a:rPr lang="en-US" dirty="0"/>
-              <a:t>Future Enhancements</a:t>
-            </a:r>
-          </a:p>
-          <a:p>
-            <a:r>
-              <a:rPr lang="en-US" dirty="0"/>
-              <a:t>New Technology Used</a:t>
-            </a:r>
-          </a:p>
-          <a:p>
-            <a:r>
-              <a:rPr lang="en-US" dirty="0"/>
-              <a:t>System Demo</a:t>
-            </a:r>
-          </a:p>
-          <a:p>
-            <a:r>
-              <a:rPr lang="en-US" dirty="0"/>
-              <a:t>Q&amp;A</a:t>
-            </a:r>
-          </a:p>
-        </p:txBody>
-      </p:sp>
+          <p:cNvGrpSpPr/>
+          <p:nvPr/>
+        </p:nvGrpSpPr>
+        <p:grpSpPr>
+          <a:xfrm>
+            <a:off x="849209" y="2320098"/>
+            <a:ext cx="10493582" cy="2865159"/>
+            <a:chOff x="163307" y="2510550"/>
+            <a:chExt cx="11867860" cy="3150818"/>
+          </a:xfrm>
+        </p:grpSpPr>
+        <p:sp>
+          <p:nvSpPr>
+            <p:cNvPr id="4" name="TextBox 3">
+              <a:extLst>
+                <a:ext uri="{FF2B5EF4-FFF2-40B4-BE49-F238E27FC236}">
+                  <a16:creationId xmlns:a16="http://schemas.microsoft.com/office/drawing/2014/main" id="{715A414B-25CF-5645-AD07-0532CCD5E679}"/>
+                </a:ext>
+              </a:extLst>
+            </p:cNvPr>
+            <p:cNvSpPr txBox="1"/>
+            <p:nvPr/>
+          </p:nvSpPr>
+          <p:spPr>
+            <a:xfrm>
+              <a:off x="444414" y="5287618"/>
+              <a:ext cx="2014330" cy="369332"/>
+            </a:xfrm>
+            <a:prstGeom prst="rect">
+              <a:avLst/>
+            </a:prstGeom>
+            <a:noFill/>
+          </p:spPr>
+          <p:txBody>
+            <a:bodyPr wrap="square" rtlCol="0">
+              <a:spAutoFit/>
+            </a:bodyPr>
+            <a:lstStyle/>
+            <a:p>
+              <a:pPr algn="ctr"/>
+              <a:r>
+                <a:rPr lang="en-US" dirty="0"/>
+                <a:t>Mike Stanley</a:t>
+              </a:r>
+            </a:p>
+          </p:txBody>
+        </p:sp>
+        <p:sp>
+          <p:nvSpPr>
+            <p:cNvPr id="5" name="TextBox 4">
+              <a:extLst>
+                <a:ext uri="{FF2B5EF4-FFF2-40B4-BE49-F238E27FC236}">
+                  <a16:creationId xmlns:a16="http://schemas.microsoft.com/office/drawing/2014/main" id="{5A727AE0-29F5-4E4D-8D99-B21EE1A037AD}"/>
+                </a:ext>
+              </a:extLst>
+            </p:cNvPr>
+            <p:cNvSpPr txBox="1"/>
+            <p:nvPr/>
+          </p:nvSpPr>
+          <p:spPr>
+            <a:xfrm>
+              <a:off x="9643935" y="5287618"/>
+              <a:ext cx="2014330" cy="369332"/>
+            </a:xfrm>
+            <a:prstGeom prst="rect">
+              <a:avLst/>
+            </a:prstGeom>
+            <a:noFill/>
+          </p:spPr>
+          <p:txBody>
+            <a:bodyPr wrap="square" rtlCol="0">
+              <a:spAutoFit/>
+            </a:bodyPr>
+            <a:lstStyle/>
+            <a:p>
+              <a:pPr algn="ctr"/>
+              <a:r>
+                <a:rPr lang="en-US" dirty="0"/>
+                <a:t>Mark Sterrenberg </a:t>
+              </a:r>
+            </a:p>
+          </p:txBody>
+        </p:sp>
+        <p:sp>
+          <p:nvSpPr>
+            <p:cNvPr id="6" name="TextBox 5">
+              <a:extLst>
+                <a:ext uri="{FF2B5EF4-FFF2-40B4-BE49-F238E27FC236}">
+                  <a16:creationId xmlns:a16="http://schemas.microsoft.com/office/drawing/2014/main" id="{44FFA5F2-B2AD-0149-8624-9C71A01E2444}"/>
+                </a:ext>
+              </a:extLst>
+            </p:cNvPr>
+            <p:cNvSpPr txBox="1"/>
+            <p:nvPr/>
+          </p:nvSpPr>
+          <p:spPr>
+            <a:xfrm>
+              <a:off x="3392385" y="5292036"/>
+              <a:ext cx="2405734" cy="369332"/>
+            </a:xfrm>
+            <a:prstGeom prst="rect">
+              <a:avLst/>
+            </a:prstGeom>
+            <a:noFill/>
+          </p:spPr>
+          <p:txBody>
+            <a:bodyPr wrap="square" rtlCol="0">
+              <a:spAutoFit/>
+            </a:bodyPr>
+            <a:lstStyle/>
+            <a:p>
+              <a:pPr algn="ctr"/>
+              <a:r>
+                <a:rPr lang="en-US" dirty="0"/>
+                <a:t>Jessica </a:t>
+              </a:r>
+              <a:r>
+                <a:rPr lang="en-US" dirty="0" err="1"/>
+                <a:t>Hoxworth</a:t>
+              </a:r>
+              <a:endParaRPr lang="en-US" dirty="0"/>
+            </a:p>
+          </p:txBody>
+        </p:sp>
+        <p:sp>
+          <p:nvSpPr>
+            <p:cNvPr id="7" name="TextBox 6">
+              <a:extLst>
+                <a:ext uri="{FF2B5EF4-FFF2-40B4-BE49-F238E27FC236}">
+                  <a16:creationId xmlns:a16="http://schemas.microsoft.com/office/drawing/2014/main" id="{7CF2DECF-96D5-A84F-8C77-9D796A1AACFE}"/>
+                </a:ext>
+              </a:extLst>
+            </p:cNvPr>
+            <p:cNvSpPr txBox="1"/>
+            <p:nvPr/>
+          </p:nvSpPr>
+          <p:spPr>
+            <a:xfrm>
+              <a:off x="6393883" y="5287618"/>
+              <a:ext cx="2553120" cy="369332"/>
+            </a:xfrm>
+            <a:prstGeom prst="rect">
+              <a:avLst/>
+            </a:prstGeom>
+            <a:noFill/>
+          </p:spPr>
+          <p:txBody>
+            <a:bodyPr wrap="square" rtlCol="0">
+              <a:spAutoFit/>
+            </a:bodyPr>
+            <a:lstStyle/>
+            <a:p>
+              <a:pPr algn="ctr"/>
+              <a:r>
+                <a:rPr lang="en-US" dirty="0"/>
+                <a:t>Anthony </a:t>
+              </a:r>
+              <a:r>
+                <a:rPr lang="en-US" dirty="0" err="1"/>
+                <a:t>Pricer</a:t>
+              </a:r>
+              <a:endParaRPr lang="en-US" dirty="0"/>
+            </a:p>
+          </p:txBody>
+        </p:sp>
+        <p:pic>
+          <p:nvPicPr>
+            <p:cNvPr id="16" name="Picture 15" descr="A person wearing a suit and tie&#10;&#10;Description automatically generated">
+              <a:extLst>
+                <a:ext uri="{FF2B5EF4-FFF2-40B4-BE49-F238E27FC236}">
+                  <a16:creationId xmlns:a16="http://schemas.microsoft.com/office/drawing/2014/main" id="{E6BE8AF6-9FE2-A247-B7D0-3A342F77A0B5}"/>
+                </a:ext>
+              </a:extLst>
+            </p:cNvPr>
+            <p:cNvPicPr>
+              <a:picLocks noChangeAspect="1"/>
+            </p:cNvPicPr>
+            <p:nvPr/>
+          </p:nvPicPr>
+          <p:blipFill rotWithShape="1">
+            <a:blip r:embed="rId2"/>
+            <a:srcRect/>
+            <a:stretch/>
+          </p:blipFill>
+          <p:spPr>
+            <a:xfrm>
+              <a:off x="163307" y="2527484"/>
+              <a:ext cx="2743200" cy="2743200"/>
+            </a:xfrm>
+            <a:prstGeom prst="rect">
+              <a:avLst/>
+            </a:prstGeom>
+          </p:spPr>
+        </p:pic>
+        <p:pic>
+          <p:nvPicPr>
+            <p:cNvPr id="18" name="Picture 17" descr="A person wearing a red shirt&#10;&#10;Description automatically generated">
+              <a:extLst>
+                <a:ext uri="{FF2B5EF4-FFF2-40B4-BE49-F238E27FC236}">
+                  <a16:creationId xmlns:a16="http://schemas.microsoft.com/office/drawing/2014/main" id="{EBB36758-17D0-2A47-B26A-929834386818}"/>
+                </a:ext>
+              </a:extLst>
+            </p:cNvPr>
+            <p:cNvPicPr>
+              <a:picLocks noChangeAspect="1"/>
+            </p:cNvPicPr>
+            <p:nvPr/>
+          </p:nvPicPr>
+          <p:blipFill>
+            <a:blip r:embed="rId3"/>
+            <a:stretch>
+              <a:fillRect/>
+            </a:stretch>
+          </p:blipFill>
+          <p:spPr>
+            <a:xfrm>
+              <a:off x="3113586" y="2527484"/>
+              <a:ext cx="2963333" cy="2760134"/>
+            </a:xfrm>
+            <a:prstGeom prst="rect">
+              <a:avLst/>
+            </a:prstGeom>
+          </p:spPr>
+        </p:pic>
+        <p:pic>
+          <p:nvPicPr>
+            <p:cNvPr id="20" name="Picture 19" descr="A person smiling for the camera&#10;&#10;Description automatically generated">
+              <a:extLst>
+                <a:ext uri="{FF2B5EF4-FFF2-40B4-BE49-F238E27FC236}">
+                  <a16:creationId xmlns:a16="http://schemas.microsoft.com/office/drawing/2014/main" id="{241E1DF7-2B7D-3B4E-9F31-566580A03D1E}"/>
+                </a:ext>
+              </a:extLst>
+            </p:cNvPr>
+            <p:cNvPicPr>
+              <a:picLocks noChangeAspect="1"/>
+            </p:cNvPicPr>
+            <p:nvPr/>
+          </p:nvPicPr>
+          <p:blipFill>
+            <a:blip r:embed="rId4"/>
+            <a:stretch>
+              <a:fillRect/>
+            </a:stretch>
+          </p:blipFill>
+          <p:spPr>
+            <a:xfrm>
+              <a:off x="6283998" y="2527484"/>
+              <a:ext cx="2779956" cy="2743200"/>
+            </a:xfrm>
+            <a:prstGeom prst="rect">
+              <a:avLst/>
+            </a:prstGeom>
+          </p:spPr>
+        </p:pic>
+        <p:pic>
+          <p:nvPicPr>
+            <p:cNvPr id="22" name="Picture 21" descr="A person eating a donut&#10;&#10;Description automatically generated">
+              <a:extLst>
+                <a:ext uri="{FF2B5EF4-FFF2-40B4-BE49-F238E27FC236}">
+                  <a16:creationId xmlns:a16="http://schemas.microsoft.com/office/drawing/2014/main" id="{DF5AE518-17AF-B44A-953B-4C505FE715E8}"/>
+                </a:ext>
+              </a:extLst>
+            </p:cNvPr>
+            <p:cNvPicPr>
+              <a:picLocks noChangeAspect="1"/>
+            </p:cNvPicPr>
+            <p:nvPr/>
+          </p:nvPicPr>
+          <p:blipFill>
+            <a:blip r:embed="rId5"/>
+            <a:stretch>
+              <a:fillRect/>
+            </a:stretch>
+          </p:blipFill>
+          <p:spPr>
+            <a:xfrm>
+              <a:off x="9271033" y="2510550"/>
+              <a:ext cx="2760134" cy="2760134"/>
+            </a:xfrm>
+            <a:prstGeom prst="rect">
+              <a:avLst/>
+            </a:prstGeom>
+          </p:spPr>
+        </p:pic>
+      </p:grpSp>
     </p:spTree>
     <p:extLst>
       <p:ext uri="{BB962C8B-B14F-4D97-AF65-F5344CB8AC3E}">
-        <p14:creationId xmlns:p14="http://schemas.microsoft.com/office/powerpoint/2010/main" val="1162590351"/>
+        <p14:creationId xmlns:p14="http://schemas.microsoft.com/office/powerpoint/2010/main" val="652506924"/>
       </p:ext>
     </p:extLst>
   </p:cSld>
@@ -3756,7 +4971,7 @@
           <p:cNvPr id="2" name="Title 1">
             <a:extLst>
               <a:ext uri="{FF2B5EF4-FFF2-40B4-BE49-F238E27FC236}">
-                <a16:creationId xmlns:a16="http://schemas.microsoft.com/office/drawing/2014/main" id="{B345F55A-A4AC-DD45-B364-046A1FECDCF3}"/>
+                <a16:creationId xmlns:a16="http://schemas.microsoft.com/office/drawing/2014/main" id="{B3D7FB5C-4310-954C-9EF8-BE836080327B}"/>
               </a:ext>
             </a:extLst>
           </p:cNvPr>
@@ -3774,169 +4989,59 @@
           <a:p>
             <a:r>
               <a:rPr lang="en-US" dirty="0"/>
-              <a:t>Team members</a:t>
-            </a:r>
-          </a:p>
-        </p:txBody>
-      </p:sp>
-      <p:sp>
-        <p:nvSpPr>
-          <p:cNvPr id="4" name="TextBox 3">
+              <a:t>proposal</a:t>
+            </a:r>
+          </a:p>
+        </p:txBody>
+      </p:sp>
+      <p:sp>
+        <p:nvSpPr>
+          <p:cNvPr id="3" name="Content Placeholder 2">
             <a:extLst>
               <a:ext uri="{FF2B5EF4-FFF2-40B4-BE49-F238E27FC236}">
-                <a16:creationId xmlns:a16="http://schemas.microsoft.com/office/drawing/2014/main" id="{715A414B-25CF-5645-AD07-0532CCD5E679}"/>
+                <a16:creationId xmlns:a16="http://schemas.microsoft.com/office/drawing/2014/main" id="{BB81AC18-2F7E-7D40-B080-42E6AF6AF522}"/>
               </a:ext>
             </a:extLst>
           </p:cNvPr>
-          <p:cNvSpPr txBox="1"/>
-          <p:nvPr/>
+          <p:cNvSpPr>
+            <a:spLocks noGrp="1"/>
+          </p:cNvSpPr>
+          <p:nvPr>
+            <p:ph idx="1"/>
+          </p:nvPr>
         </p:nvSpPr>
         <p:spPr>
           <a:xfrm>
-            <a:off x="444414" y="5287619"/>
-            <a:ext cx="2014330" cy="369332"/>
+            <a:off x="1451579" y="2951921"/>
+            <a:ext cx="9603275" cy="954157"/>
           </a:xfrm>
-          <a:prstGeom prst="rect">
-            <a:avLst/>
-          </a:prstGeom>
-          <a:noFill/>
         </p:spPr>
         <p:txBody>
-          <a:bodyPr wrap="square" rtlCol="0">
-            <a:spAutoFit/>
-          </a:bodyPr>
-          <a:lstStyle/>
-          <a:p>
-            <a:pPr algn="ctr"/>
+          <a:bodyPr/>
+          <a:lstStyle/>
+          <a:p>
+            <a:pPr marL="0" indent="0">
+              <a:buNone/>
+            </a:pPr>
             <a:r>
               <a:rPr lang="en-US" dirty="0"/>
-              <a:t>Mike Stanley</a:t>
-            </a:r>
-          </a:p>
-        </p:txBody>
-      </p:sp>
-      <p:sp>
-        <p:nvSpPr>
-          <p:cNvPr id="5" name="TextBox 4">
-            <a:extLst>
-              <a:ext uri="{FF2B5EF4-FFF2-40B4-BE49-F238E27FC236}">
-                <a16:creationId xmlns:a16="http://schemas.microsoft.com/office/drawing/2014/main" id="{5A727AE0-29F5-4E4D-8D99-B21EE1A037AD}"/>
-              </a:ext>
-            </a:extLst>
-          </p:cNvPr>
-          <p:cNvSpPr txBox="1"/>
-          <p:nvPr/>
-        </p:nvSpPr>
-        <p:spPr>
-          <a:xfrm>
-            <a:off x="3507274" y="5287619"/>
-            <a:ext cx="2014330" cy="369332"/>
-          </a:xfrm>
-          <a:prstGeom prst="rect">
-            <a:avLst/>
-          </a:prstGeom>
-          <a:noFill/>
-        </p:spPr>
-        <p:txBody>
-          <a:bodyPr wrap="square" rtlCol="0">
-            <a:spAutoFit/>
-          </a:bodyPr>
-          <a:lstStyle/>
-          <a:p>
-            <a:pPr algn="ctr"/>
+              <a:t>A crime lookup application that allows users to </a:t>
+            </a:r>
+            <a:r>
+              <a:rPr lang="en-US"/>
+              <a:t>search for crimes </a:t>
+            </a:r>
             <a:r>
               <a:rPr lang="en-US" dirty="0"/>
-              <a:t>Mark Sterrenberg </a:t>
-            </a:r>
-          </a:p>
-        </p:txBody>
-      </p:sp>
-      <p:sp>
-        <p:nvSpPr>
-          <p:cNvPr id="6" name="TextBox 5">
-            <a:extLst>
-              <a:ext uri="{FF2B5EF4-FFF2-40B4-BE49-F238E27FC236}">
-                <a16:creationId xmlns:a16="http://schemas.microsoft.com/office/drawing/2014/main" id="{44FFA5F2-B2AD-0149-8624-9C71A01E2444}"/>
-              </a:ext>
-            </a:extLst>
-          </p:cNvPr>
-          <p:cNvSpPr txBox="1"/>
-          <p:nvPr/>
-        </p:nvSpPr>
-        <p:spPr>
-          <a:xfrm>
-            <a:off x="6570134" y="5292037"/>
-            <a:ext cx="2405734" cy="369332"/>
-          </a:xfrm>
-          <a:prstGeom prst="rect">
-            <a:avLst/>
-          </a:prstGeom>
-          <a:noFill/>
-        </p:spPr>
-        <p:txBody>
-          <a:bodyPr wrap="square" rtlCol="0">
-            <a:spAutoFit/>
-          </a:bodyPr>
-          <a:lstStyle/>
-          <a:p>
-            <a:pPr algn="ctr"/>
-            <a:r>
-              <a:rPr lang="en-US" dirty="0"/>
-              <a:t>Jessica </a:t>
-            </a:r>
-            <a:r>
-              <a:rPr lang="en-US" dirty="0" err="1"/>
-              <a:t>Hoxworth</a:t>
-            </a:r>
-            <a:endParaRPr lang="en-US" dirty="0"/>
-          </a:p>
-        </p:txBody>
-      </p:sp>
-      <p:sp>
-        <p:nvSpPr>
-          <p:cNvPr id="7" name="TextBox 6">
-            <a:extLst>
-              <a:ext uri="{FF2B5EF4-FFF2-40B4-BE49-F238E27FC236}">
-                <a16:creationId xmlns:a16="http://schemas.microsoft.com/office/drawing/2014/main" id="{7CF2DECF-96D5-A84F-8C77-9D796A1AACFE}"/>
-              </a:ext>
-            </a:extLst>
-          </p:cNvPr>
-          <p:cNvSpPr txBox="1"/>
-          <p:nvPr/>
-        </p:nvSpPr>
-        <p:spPr>
-          <a:xfrm>
-            <a:off x="9313197" y="5287619"/>
-            <a:ext cx="2553120" cy="369332"/>
-          </a:xfrm>
-          <a:prstGeom prst="rect">
-            <a:avLst/>
-          </a:prstGeom>
-          <a:noFill/>
-        </p:spPr>
-        <p:txBody>
-          <a:bodyPr wrap="square" rtlCol="0">
-            <a:spAutoFit/>
-          </a:bodyPr>
-          <a:lstStyle/>
-          <a:p>
-            <a:pPr algn="ctr"/>
-            <a:r>
-              <a:rPr lang="en-US" dirty="0"/>
-              <a:t>Anthony </a:t>
-            </a:r>
-            <a:r>
-              <a:rPr lang="en-US" dirty="0" err="1"/>
-              <a:t>Pricer</a:t>
-            </a:r>
-            <a:endParaRPr lang="en-US" dirty="0"/>
+              <a:t>that have occurred near their area</a:t>
+            </a:r>
           </a:p>
         </p:txBody>
       </p:sp>
     </p:spTree>
     <p:extLst>
       <p:ext uri="{BB962C8B-B14F-4D97-AF65-F5344CB8AC3E}">
-        <p14:creationId xmlns:p14="http://schemas.microsoft.com/office/powerpoint/2010/main" val="652506924"/>
+        <p14:creationId xmlns:p14="http://schemas.microsoft.com/office/powerpoint/2010/main" val="971274011"/>
       </p:ext>
     </p:extLst>
   </p:cSld>
@@ -3986,7 +5091,7 @@
           <a:p>
             <a:r>
               <a:rPr lang="en-US" dirty="0"/>
-              <a:t>proposal</a:t>
+              <a:t>Future enhancements</a:t>
             </a:r>
           </a:p>
         </p:txBody>
@@ -4007,24 +5112,45 @@
             <p:ph idx="1"/>
           </p:nvPr>
         </p:nvSpPr>
-        <p:spPr>
-          <a:xfrm>
-            <a:off x="1451579" y="2857822"/>
-            <a:ext cx="9603275" cy="1899776"/>
-          </a:xfrm>
-        </p:spPr>
-        <p:txBody>
-          <a:bodyPr>
-            <a:normAutofit/>
-          </a:bodyPr>
-          <a:lstStyle/>
-          <a:p>
-            <a:pPr marL="0" indent="0" algn="ctr">
-              <a:buNone/>
-            </a:pPr>
-            <a:r>
-              <a:rPr lang="en-US" sz="3200" dirty="0"/>
-              <a:t>Our team wanted to create a Crime Lookup Application that allows users to search by location crimes that have/are occurring near them</a:t>
+        <p:spPr/>
+        <p:txBody>
+          <a:bodyPr/>
+          <a:lstStyle/>
+          <a:p>
+            <a:r>
+              <a:rPr lang="en-US" dirty="0"/>
+              <a:t>Be able to access crime information real-time so viewers could see crimes</a:t>
+            </a:r>
+          </a:p>
+          <a:p>
+            <a:r>
+              <a:rPr lang="en-US" dirty="0"/>
+              <a:t>Add more security protocols surrounding API-keys and a person’s </a:t>
+            </a:r>
+            <a:r>
+              <a:rPr lang="en-US" dirty="0" err="1"/>
+              <a:t>mysql</a:t>
+            </a:r>
+            <a:r>
+              <a:rPr lang="en-US" dirty="0"/>
+              <a:t> credentials to ensure that if someone accidentally commits their credentials they are protected from malicious use </a:t>
+            </a:r>
+          </a:p>
+          <a:p>
+            <a:r>
+              <a:rPr lang="en-US" dirty="0"/>
+              <a:t>Adding ways to communicate with local law enforcement, emergency services, </a:t>
+            </a:r>
+            <a:r>
+              <a:rPr lang="en-US" dirty="0" err="1"/>
+              <a:t>etc</a:t>
+            </a:r>
+            <a:endParaRPr lang="en-US" dirty="0"/>
+          </a:p>
+          <a:p>
+            <a:r>
+              <a:rPr lang="en-US" dirty="0"/>
+              <a:t>Adding social media profiles and potential login to application via social media </a:t>
             </a:r>
           </a:p>
         </p:txBody>
@@ -4032,7 +5158,7 @@
     </p:spTree>
     <p:extLst>
       <p:ext uri="{BB962C8B-B14F-4D97-AF65-F5344CB8AC3E}">
-        <p14:creationId xmlns:p14="http://schemas.microsoft.com/office/powerpoint/2010/main" val="971274011"/>
+        <p14:creationId xmlns:p14="http://schemas.microsoft.com/office/powerpoint/2010/main" val="4174293239"/>
       </p:ext>
     </p:extLst>
   </p:cSld>
@@ -4064,7 +5190,7 @@
           <p:cNvPr id="2" name="Title 1">
             <a:extLst>
               <a:ext uri="{FF2B5EF4-FFF2-40B4-BE49-F238E27FC236}">
-                <a16:creationId xmlns:a16="http://schemas.microsoft.com/office/drawing/2014/main" id="{B3D7FB5C-4310-954C-9EF8-BE836080327B}"/>
+                <a16:creationId xmlns:a16="http://schemas.microsoft.com/office/drawing/2014/main" id="{2F361537-FA9D-AD46-9B07-5B7CE824D1CF}"/>
               </a:ext>
             </a:extLst>
           </p:cNvPr>
@@ -4081,48 +5207,12 @@
           <a:lstStyle/>
           <a:p>
             <a:r>
+              <a:rPr lang="en-US" dirty="0" err="1"/>
+              <a:t>nEW</a:t>
+            </a:r>
+            <a:r>
               <a:rPr lang="en-US" dirty="0"/>
-              <a:t>Future Enhancements </a:t>
-            </a:r>
-          </a:p>
-        </p:txBody>
-      </p:sp>
-      <p:sp>
-        <p:nvSpPr>
-          <p:cNvPr id="3" name="Content Placeholder 2">
-            <a:extLst>
-              <a:ext uri="{FF2B5EF4-FFF2-40B4-BE49-F238E27FC236}">
-                <a16:creationId xmlns:a16="http://schemas.microsoft.com/office/drawing/2014/main" id="{BB81AC18-2F7E-7D40-B080-42E6AF6AF522}"/>
-              </a:ext>
-            </a:extLst>
-          </p:cNvPr>
-          <p:cNvSpPr>
-            <a:spLocks noGrp="1"/>
-          </p:cNvSpPr>
-          <p:nvPr>
-            <p:ph idx="1"/>
-          </p:nvPr>
-        </p:nvSpPr>
-        <p:spPr/>
-        <p:txBody>
-          <a:bodyPr/>
-          <a:lstStyle/>
-          <a:p>
-            <a:pPr marL="0" indent="0">
-              <a:buNone/>
-            </a:pPr>
-            <a:endParaRPr lang="en-US" dirty="0"/>
-          </a:p>
-          <a:p>
-            <a:r>
-              <a:rPr lang="en-US" dirty="0"/>
-              <a:t>Application can look up crimes around not only by City but also by an specific address given by the user</a:t>
-            </a:r>
-          </a:p>
-          <a:p>
-            <a:r>
-              <a:rPr lang="en-US" dirty="0"/>
-              <a:t>Live alerts- tracks your locations and alerts users in real time </a:t>
+              <a:t> technology used</a:t>
             </a:r>
           </a:p>
         </p:txBody>
@@ -4130,7 +5220,7 @@
     </p:spTree>
     <p:extLst>
       <p:ext uri="{BB962C8B-B14F-4D97-AF65-F5344CB8AC3E}">
-        <p14:creationId xmlns:p14="http://schemas.microsoft.com/office/powerpoint/2010/main" val="3932834931"/>
+        <p14:creationId xmlns:p14="http://schemas.microsoft.com/office/powerpoint/2010/main" val="3100956995"/>
       </p:ext>
     </p:extLst>
   </p:cSld>
@@ -4162,418 +5252,6 @@
           <p:cNvPr id="2" name="Title 1">
             <a:extLst>
               <a:ext uri="{FF2B5EF4-FFF2-40B4-BE49-F238E27FC236}">
-                <a16:creationId xmlns:a16="http://schemas.microsoft.com/office/drawing/2014/main" id="{2F361537-FA9D-AD46-9B07-5B7CE824D1CF}"/>
-              </a:ext>
-            </a:extLst>
-          </p:cNvPr>
-          <p:cNvSpPr>
-            <a:spLocks noGrp="1"/>
-          </p:cNvSpPr>
-          <p:nvPr>
-            <p:ph type="title"/>
-          </p:nvPr>
-        </p:nvSpPr>
-        <p:spPr/>
-        <p:txBody>
-          <a:bodyPr/>
-          <a:lstStyle/>
-          <a:p>
-            <a:r>
-              <a:rPr lang="en-US" dirty="0" err="1"/>
-              <a:t>nEW</a:t>
-            </a:r>
-            <a:r>
-              <a:rPr lang="en-US" dirty="0"/>
-              <a:t> technologies used</a:t>
-            </a:r>
-          </a:p>
-        </p:txBody>
-      </p:sp>
-      <p:grpSp>
-        <p:nvGrpSpPr>
-          <p:cNvPr id="14" name="Group 13">
-            <a:extLst>
-              <a:ext uri="{FF2B5EF4-FFF2-40B4-BE49-F238E27FC236}">
-                <a16:creationId xmlns:a16="http://schemas.microsoft.com/office/drawing/2014/main" id="{CC5819F6-8481-4A1E-B309-15414416C7CE}"/>
-              </a:ext>
-            </a:extLst>
-          </p:cNvPr>
-          <p:cNvGrpSpPr/>
-          <p:nvPr/>
-        </p:nvGrpSpPr>
-        <p:grpSpPr>
-          <a:xfrm>
-            <a:off x="6367899" y="2302048"/>
-            <a:ext cx="1822140" cy="1887530"/>
-            <a:chOff x="4765322" y="3263819"/>
-            <a:chExt cx="2661356" cy="2974328"/>
-          </a:xfrm>
-        </p:grpSpPr>
-        <p:pic>
-          <p:nvPicPr>
-            <p:cNvPr id="6" name="Picture 5">
-              <a:extLst>
-                <a:ext uri="{FF2B5EF4-FFF2-40B4-BE49-F238E27FC236}">
-                  <a16:creationId xmlns:a16="http://schemas.microsoft.com/office/drawing/2014/main" id="{FE162867-291E-44DE-888C-D2F6C5345DC5}"/>
-                </a:ext>
-              </a:extLst>
-            </p:cNvPr>
-            <p:cNvPicPr>
-              <a:picLocks noChangeAspect="1"/>
-            </p:cNvPicPr>
-            <p:nvPr/>
-          </p:nvPicPr>
-          <p:blipFill>
-            <a:blip r:embed="rId2"/>
-            <a:stretch>
-              <a:fillRect/>
-            </a:stretch>
-          </p:blipFill>
-          <p:spPr>
-            <a:xfrm>
-              <a:off x="4765322" y="3263819"/>
-              <a:ext cx="2661356" cy="2566308"/>
-            </a:xfrm>
-            <a:prstGeom prst="rect">
-              <a:avLst/>
-            </a:prstGeom>
-          </p:spPr>
-        </p:pic>
-        <p:sp>
-          <p:nvSpPr>
-            <p:cNvPr id="8" name="TextBox 7">
-              <a:extLst>
-                <a:ext uri="{FF2B5EF4-FFF2-40B4-BE49-F238E27FC236}">
-                  <a16:creationId xmlns:a16="http://schemas.microsoft.com/office/drawing/2014/main" id="{B437F1C4-5F4F-4E54-8ED1-5120ECA35857}"/>
-                </a:ext>
-              </a:extLst>
-            </p:cNvPr>
-            <p:cNvSpPr txBox="1"/>
-            <p:nvPr/>
-          </p:nvSpPr>
-          <p:spPr>
-            <a:xfrm>
-              <a:off x="4765322" y="5868815"/>
-              <a:ext cx="2661356" cy="369332"/>
-            </a:xfrm>
-            <a:prstGeom prst="rect">
-              <a:avLst/>
-            </a:prstGeom>
-            <a:noFill/>
-          </p:spPr>
-          <p:txBody>
-            <a:bodyPr wrap="square" rtlCol="0">
-              <a:spAutoFit/>
-            </a:bodyPr>
-            <a:lstStyle/>
-            <a:p>
-              <a:pPr algn="ctr"/>
-              <a:r>
-                <a:rPr lang="en-US" dirty="0"/>
-                <a:t>Cheerio</a:t>
-              </a:r>
-            </a:p>
-          </p:txBody>
-        </p:sp>
-      </p:grpSp>
-      <p:pic>
-        <p:nvPicPr>
-          <p:cNvPr id="4" name="Picture 3">
-            <a:extLst>
-              <a:ext uri="{FF2B5EF4-FFF2-40B4-BE49-F238E27FC236}">
-                <a16:creationId xmlns:a16="http://schemas.microsoft.com/office/drawing/2014/main" id="{9A9190B6-A89C-4488-B30F-DC51232635BD}"/>
-              </a:ext>
-            </a:extLst>
-          </p:cNvPr>
-          <p:cNvPicPr>
-            <a:picLocks noChangeAspect="1"/>
-          </p:cNvPicPr>
-          <p:nvPr/>
-        </p:nvPicPr>
-        <p:blipFill>
-          <a:blip r:embed="rId3"/>
-          <a:stretch>
-            <a:fillRect/>
-          </a:stretch>
-        </p:blipFill>
-        <p:spPr>
-          <a:xfrm>
-            <a:off x="1975211" y="2302048"/>
-            <a:ext cx="2478164" cy="1628596"/>
-          </a:xfrm>
-          <a:prstGeom prst="rect">
-            <a:avLst/>
-          </a:prstGeom>
-        </p:spPr>
-      </p:pic>
-      <p:sp>
-        <p:nvSpPr>
-          <p:cNvPr id="10" name="TextBox 9">
-            <a:extLst>
-              <a:ext uri="{FF2B5EF4-FFF2-40B4-BE49-F238E27FC236}">
-                <a16:creationId xmlns:a16="http://schemas.microsoft.com/office/drawing/2014/main" id="{947E9A6A-5D24-41A8-8CE3-9FAB92E7A365}"/>
-              </a:ext>
-            </a:extLst>
-          </p:cNvPr>
-          <p:cNvSpPr txBox="1"/>
-          <p:nvPr/>
-        </p:nvSpPr>
-        <p:spPr>
-          <a:xfrm>
-            <a:off x="1975210" y="3930644"/>
-            <a:ext cx="2478164" cy="369332"/>
-          </a:xfrm>
-          <a:prstGeom prst="rect">
-            <a:avLst/>
-          </a:prstGeom>
-          <a:noFill/>
-        </p:spPr>
-        <p:txBody>
-          <a:bodyPr wrap="square" rtlCol="0">
-            <a:spAutoFit/>
-          </a:bodyPr>
-          <a:lstStyle/>
-          <a:p>
-            <a:pPr algn="ctr"/>
-            <a:r>
-              <a:rPr lang="en-US" dirty="0" err="1"/>
-              <a:t>JsonWebToken</a:t>
-            </a:r>
-            <a:endParaRPr lang="en-US" dirty="0"/>
-          </a:p>
-        </p:txBody>
-      </p:sp>
-      <p:pic>
-        <p:nvPicPr>
-          <p:cNvPr id="5" name="Picture 4">
-            <a:extLst>
-              <a:ext uri="{FF2B5EF4-FFF2-40B4-BE49-F238E27FC236}">
-                <a16:creationId xmlns:a16="http://schemas.microsoft.com/office/drawing/2014/main" id="{8726E24E-BB6D-482E-99B6-CAB630186553}"/>
-              </a:ext>
-            </a:extLst>
-          </p:cNvPr>
-          <p:cNvPicPr>
-            <a:picLocks noChangeAspect="1"/>
-          </p:cNvPicPr>
-          <p:nvPr/>
-        </p:nvPicPr>
-        <p:blipFill>
-          <a:blip r:embed="rId4"/>
-          <a:stretch>
-            <a:fillRect/>
-          </a:stretch>
-        </p:blipFill>
-        <p:spPr>
-          <a:xfrm>
-            <a:off x="4453374" y="2298892"/>
-            <a:ext cx="1914526" cy="1628597"/>
-          </a:xfrm>
-          <a:prstGeom prst="rect">
-            <a:avLst/>
-          </a:prstGeom>
-        </p:spPr>
-      </p:pic>
-      <p:sp>
-        <p:nvSpPr>
-          <p:cNvPr id="12" name="TextBox 11">
-            <a:extLst>
-              <a:ext uri="{FF2B5EF4-FFF2-40B4-BE49-F238E27FC236}">
-                <a16:creationId xmlns:a16="http://schemas.microsoft.com/office/drawing/2014/main" id="{0D66315C-A150-4CA9-B081-27C2B53E1C8E}"/>
-              </a:ext>
-            </a:extLst>
-          </p:cNvPr>
-          <p:cNvSpPr txBox="1"/>
-          <p:nvPr/>
-        </p:nvSpPr>
-        <p:spPr>
-          <a:xfrm>
-            <a:off x="4453374" y="3928541"/>
-            <a:ext cx="1914526" cy="369332"/>
-          </a:xfrm>
-          <a:prstGeom prst="rect">
-            <a:avLst/>
-          </a:prstGeom>
-          <a:noFill/>
-        </p:spPr>
-        <p:txBody>
-          <a:bodyPr wrap="square" rtlCol="0">
-            <a:spAutoFit/>
-          </a:bodyPr>
-          <a:lstStyle/>
-          <a:p>
-            <a:pPr algn="ctr"/>
-            <a:r>
-              <a:rPr lang="en-US" dirty="0" err="1"/>
-              <a:t>BCrypt</a:t>
-            </a:r>
-            <a:endParaRPr lang="en-US" dirty="0"/>
-          </a:p>
-        </p:txBody>
-      </p:sp>
-      <p:grpSp>
-        <p:nvGrpSpPr>
-          <p:cNvPr id="16" name="Group 15">
-            <a:extLst>
-              <a:ext uri="{FF2B5EF4-FFF2-40B4-BE49-F238E27FC236}">
-                <a16:creationId xmlns:a16="http://schemas.microsoft.com/office/drawing/2014/main" id="{D7264CEF-379E-4ED7-9684-41F47EEE2C24}"/>
-              </a:ext>
-            </a:extLst>
-          </p:cNvPr>
-          <p:cNvGrpSpPr/>
-          <p:nvPr/>
-        </p:nvGrpSpPr>
-        <p:grpSpPr>
-          <a:xfrm>
-            <a:off x="8190037" y="2302048"/>
-            <a:ext cx="2079065" cy="1998107"/>
-            <a:chOff x="8206237" y="2537176"/>
-            <a:chExt cx="2079064" cy="1998107"/>
-          </a:xfrm>
-        </p:grpSpPr>
-        <p:pic>
-          <p:nvPicPr>
-            <p:cNvPr id="7" name="Picture 6">
-              <a:extLst>
-                <a:ext uri="{FF2B5EF4-FFF2-40B4-BE49-F238E27FC236}">
-                  <a16:creationId xmlns:a16="http://schemas.microsoft.com/office/drawing/2014/main" id="{408C2B67-8CF2-49E9-93E0-A8C778797849}"/>
-                </a:ext>
-              </a:extLst>
-            </p:cNvPr>
-            <p:cNvPicPr>
-              <a:picLocks noChangeAspect="1"/>
-            </p:cNvPicPr>
-            <p:nvPr/>
-          </p:nvPicPr>
-          <p:blipFill>
-            <a:blip r:embed="rId5"/>
-            <a:stretch>
-              <a:fillRect/>
-            </a:stretch>
-          </p:blipFill>
-          <p:spPr>
-            <a:xfrm>
-              <a:off x="8206237" y="2537176"/>
-              <a:ext cx="2079064" cy="1628775"/>
-            </a:xfrm>
-            <a:prstGeom prst="rect">
-              <a:avLst/>
-            </a:prstGeom>
-          </p:spPr>
-        </p:pic>
-        <p:sp>
-          <p:nvSpPr>
-            <p:cNvPr id="15" name="TextBox 14">
-              <a:extLst>
-                <a:ext uri="{FF2B5EF4-FFF2-40B4-BE49-F238E27FC236}">
-                  <a16:creationId xmlns:a16="http://schemas.microsoft.com/office/drawing/2014/main" id="{6993A3CF-3838-4DBD-9CA1-B4A79A86D956}"/>
-                </a:ext>
-              </a:extLst>
-            </p:cNvPr>
-            <p:cNvSpPr txBox="1"/>
-            <p:nvPr/>
-          </p:nvSpPr>
-          <p:spPr>
-            <a:xfrm>
-              <a:off x="8206237" y="4165951"/>
-              <a:ext cx="2079064" cy="369332"/>
-            </a:xfrm>
-            <a:prstGeom prst="rect">
-              <a:avLst/>
-            </a:prstGeom>
-            <a:noFill/>
-          </p:spPr>
-          <p:txBody>
-            <a:bodyPr wrap="square" rtlCol="0">
-              <a:spAutoFit/>
-            </a:bodyPr>
-            <a:lstStyle/>
-            <a:p>
-              <a:pPr algn="ctr"/>
-              <a:r>
-                <a:rPr lang="en-US" dirty="0" err="1"/>
-                <a:t>DotEnv</a:t>
-              </a:r>
-              <a:endParaRPr lang="en-US" dirty="0"/>
-            </a:p>
-          </p:txBody>
-        </p:sp>
-      </p:grpSp>
-      <p:sp>
-        <p:nvSpPr>
-          <p:cNvPr id="17" name="TextBox 16">
-            <a:extLst>
-              <a:ext uri="{FF2B5EF4-FFF2-40B4-BE49-F238E27FC236}">
-                <a16:creationId xmlns:a16="http://schemas.microsoft.com/office/drawing/2014/main" id="{834D4FD3-A454-4A63-9BE3-AA87E61F2625}"/>
-              </a:ext>
-            </a:extLst>
-          </p:cNvPr>
-          <p:cNvSpPr txBox="1"/>
-          <p:nvPr/>
-        </p:nvSpPr>
-        <p:spPr>
-          <a:xfrm>
-            <a:off x="1949054" y="4819581"/>
-            <a:ext cx="8293892" cy="369332"/>
-          </a:xfrm>
-          <a:prstGeom prst="rect">
-            <a:avLst/>
-          </a:prstGeom>
-          <a:noFill/>
-        </p:spPr>
-        <p:txBody>
-          <a:bodyPr wrap="square" rtlCol="0">
-            <a:spAutoFit/>
-          </a:bodyPr>
-          <a:lstStyle/>
-          <a:p>
-            <a:pPr algn="ctr"/>
-            <a:r>
-              <a:rPr lang="en-US" dirty="0"/>
-              <a:t>CORS, Request and Cookie Parser </a:t>
-            </a:r>
-            <a:r>
-              <a:rPr lang="en-US" dirty="0" err="1"/>
-              <a:t>npm</a:t>
-            </a:r>
-            <a:endParaRPr lang="en-US" dirty="0"/>
-          </a:p>
-        </p:txBody>
-      </p:sp>
-    </p:spTree>
-    <p:extLst>
-      <p:ext uri="{BB962C8B-B14F-4D97-AF65-F5344CB8AC3E}">
-        <p14:creationId xmlns:p14="http://schemas.microsoft.com/office/powerpoint/2010/main" val="3100956995"/>
-      </p:ext>
-    </p:extLst>
-  </p:cSld>
-  <p:clrMapOvr>
-    <a:masterClrMapping/>
-  </p:clrMapOvr>
-</p:sld>
-</file>
-
-<file path=ppt/slides/slide7.xml><?xml version="1.0" encoding="utf-8"?>
-<p:sld xmlns:a="http://schemas.openxmlformats.org/drawingml/2006/main" xmlns:r="http://schemas.openxmlformats.org/officeDocument/2006/relationships" xmlns:p="http://schemas.openxmlformats.org/presentationml/2006/main">
-  <p:cSld>
-    <p:spTree>
-      <p:nvGrpSpPr>
-        <p:cNvPr id="1" name=""/>
-        <p:cNvGrpSpPr/>
-        <p:nvPr/>
-      </p:nvGrpSpPr>
-      <p:grpSpPr>
-        <a:xfrm>
-          <a:off x="0" y="0"/>
-          <a:ext cx="0" cy="0"/>
-          <a:chOff x="0" y="0"/>
-          <a:chExt cx="0" cy="0"/>
-        </a:xfrm>
-      </p:grpSpPr>
-      <p:sp>
-        <p:nvSpPr>
-          <p:cNvPr id="2" name="Title 1">
-            <a:extLst>
-              <a:ext uri="{FF2B5EF4-FFF2-40B4-BE49-F238E27FC236}">
                 <a16:creationId xmlns:a16="http://schemas.microsoft.com/office/drawing/2014/main" id="{C5D87C91-64CC-D44A-A664-F0F83EE35161}"/>
               </a:ext>
             </a:extLst>
@@ -4610,7 +5288,7 @@
 </p:sld>
 </file>
 
-<file path=ppt/slides/slide8.xml><?xml version="1.0" encoding="utf-8"?>
+<file path=ppt/slides/slide7.xml><?xml version="1.0" encoding="utf-8"?>
 <p:sld xmlns:a="http://schemas.openxmlformats.org/drawingml/2006/main" xmlns:r="http://schemas.openxmlformats.org/officeDocument/2006/relationships" xmlns:p="http://schemas.openxmlformats.org/presentationml/2006/main">
   <p:cSld>
     <p:spTree>
@@ -4919,4 +5597,299 @@
     </a:ext>
   </a:extLst>
 </a:theme>
+</file>
+
+<file path=ppt/theme/theme2.xml><?xml version="1.0" encoding="utf-8"?>
+<a:theme xmlns:a="http://schemas.openxmlformats.org/drawingml/2006/main" name="Office Theme">
+  <a:themeElements>
+    <a:clrScheme name="Office">
+      <a:dk1>
+        <a:sysClr val="windowText" lastClr="000000"/>
+      </a:dk1>
+      <a:lt1>
+        <a:sysClr val="window" lastClr="FFFFFF"/>
+      </a:lt1>
+      <a:dk2>
+        <a:srgbClr val="44546A"/>
+      </a:dk2>
+      <a:lt2>
+        <a:srgbClr val="E7E6E6"/>
+      </a:lt2>
+      <a:accent1>
+        <a:srgbClr val="4472C4"/>
+      </a:accent1>
+      <a:accent2>
+        <a:srgbClr val="ED7D31"/>
+      </a:accent2>
+      <a:accent3>
+        <a:srgbClr val="A5A5A5"/>
+      </a:accent3>
+      <a:accent4>
+        <a:srgbClr val="FFC000"/>
+      </a:accent4>
+      <a:accent5>
+        <a:srgbClr val="5B9BD5"/>
+      </a:accent5>
+      <a:accent6>
+        <a:srgbClr val="70AD47"/>
+      </a:accent6>
+      <a:hlink>
+        <a:srgbClr val="0563C1"/>
+      </a:hlink>
+      <a:folHlink>
+        <a:srgbClr val="954F72"/>
+      </a:folHlink>
+    </a:clrScheme>
+    <a:fontScheme name="Office">
+      <a:majorFont>
+        <a:latin typeface="Calibri Light" panose="020F0302020204030204"/>
+        <a:ea typeface=""/>
+        <a:cs typeface=""/>
+        <a:font script="Jpan" typeface="游ゴシック Light"/>
+        <a:font script="Hang" typeface="맑은 고딕"/>
+        <a:font script="Hans" typeface="等线 Light"/>
+        <a:font script="Hant" typeface="新細明體"/>
+        <a:font script="Arab" typeface="Times New Roman"/>
+        <a:font script="Hebr" typeface="Times New Roman"/>
+        <a:font script="Thai" typeface="Angsana New"/>
+        <a:font script="Ethi" typeface="Nyala"/>
+        <a:font script="Beng" typeface="Vrinda"/>
+        <a:font script="Gujr" typeface="Shruti"/>
+        <a:font script="Khmr" typeface="MoolBoran"/>
+        <a:font script="Knda" typeface="Tunga"/>
+        <a:font script="Guru" typeface="Raavi"/>
+        <a:font script="Cans" typeface="Euphemia"/>
+        <a:font script="Cher" typeface="Plantagenet Cherokee"/>
+        <a:font script="Yiii" typeface="Microsoft Yi Baiti"/>
+        <a:font script="Tibt" typeface="Microsoft Himalaya"/>
+        <a:font script="Thaa" typeface="MV Boli"/>
+        <a:font script="Deva" typeface="Mangal"/>
+        <a:font script="Telu" typeface="Gautami"/>
+        <a:font script="Taml" typeface="Latha"/>
+        <a:font script="Syrc" typeface="Estrangelo Edessa"/>
+        <a:font script="Orya" typeface="Kalinga"/>
+        <a:font script="Mlym" typeface="Kartika"/>
+        <a:font script="Laoo" typeface="DokChampa"/>
+        <a:font script="Sinh" typeface="Iskoola Pota"/>
+        <a:font script="Mong" typeface="Mongolian Baiti"/>
+        <a:font script="Viet" typeface="Times New Roman"/>
+        <a:font script="Uigh" typeface="Microsoft Uighur"/>
+        <a:font script="Geor" typeface="Sylfaen"/>
+        <a:font script="Armn" typeface="Arial"/>
+        <a:font script="Bugi" typeface="Leelawadee UI"/>
+        <a:font script="Bopo" typeface="Microsoft JhengHei"/>
+        <a:font script="Java" typeface="Javanese Text"/>
+        <a:font script="Lisu" typeface="Segoe UI"/>
+        <a:font script="Mymr" typeface="Myanmar Text"/>
+        <a:font script="Nkoo" typeface="Ebrima"/>
+        <a:font script="Olck" typeface="Nirmala UI"/>
+        <a:font script="Osma" typeface="Ebrima"/>
+        <a:font script="Phag" typeface="Phagspa"/>
+        <a:font script="Syrn" typeface="Estrangelo Edessa"/>
+        <a:font script="Syrj" typeface="Estrangelo Edessa"/>
+        <a:font script="Syre" typeface="Estrangelo Edessa"/>
+        <a:font script="Sora" typeface="Nirmala UI"/>
+        <a:font script="Tale" typeface="Microsoft Tai Le"/>
+        <a:font script="Talu" typeface="Microsoft New Tai Lue"/>
+        <a:font script="Tfng" typeface="Ebrima"/>
+      </a:majorFont>
+      <a:minorFont>
+        <a:latin typeface="Calibri" panose="020F0502020204030204"/>
+        <a:ea typeface=""/>
+        <a:cs typeface=""/>
+        <a:font script="Jpan" typeface="游ゴシック"/>
+        <a:font script="Hang" typeface="맑은 고딕"/>
+        <a:font script="Hans" typeface="等线"/>
+        <a:font script="Hant" typeface="新細明體"/>
+        <a:font script="Arab" typeface="Arial"/>
+        <a:font script="Hebr" typeface="Arial"/>
+        <a:font script="Thai" typeface="Cordia New"/>
+        <a:font script="Ethi" typeface="Nyala"/>
+        <a:font script="Beng" typeface="Vrinda"/>
+        <a:font script="Gujr" typeface="Shruti"/>
+        <a:font script="Khmr" typeface="DaunPenh"/>
+        <a:font script="Knda" typeface="Tunga"/>
+        <a:font script="Guru" typeface="Raavi"/>
+        <a:font script="Cans" typeface="Euphemia"/>
+        <a:font script="Cher" typeface="Plantagenet Cherokee"/>
+        <a:font script="Yiii" typeface="Microsoft Yi Baiti"/>
+        <a:font script="Tibt" typeface="Microsoft Himalaya"/>
+        <a:font script="Thaa" typeface="MV Boli"/>
+        <a:font script="Deva" typeface="Mangal"/>
+        <a:font script="Telu" typeface="Gautami"/>
+        <a:font script="Taml" typeface="Latha"/>
+        <a:font script="Syrc" typeface="Estrangelo Edessa"/>
+        <a:font script="Orya" typeface="Kalinga"/>
+        <a:font script="Mlym" typeface="Kartika"/>
+        <a:font script="Laoo" typeface="DokChampa"/>
+        <a:font script="Sinh" typeface="Iskoola Pota"/>
+        <a:font script="Mong" typeface="Mongolian Baiti"/>
+        <a:font script="Viet" typeface="Arial"/>
+        <a:font script="Uigh" typeface="Microsoft Uighur"/>
+        <a:font script="Geor" typeface="Sylfaen"/>
+        <a:font script="Armn" typeface="Arial"/>
+        <a:font script="Bugi" typeface="Leelawadee UI"/>
+        <a:font script="Bopo" typeface="Microsoft JhengHei"/>
+        <a:font script="Java" typeface="Javanese Text"/>
+        <a:font script="Lisu" typeface="Segoe UI"/>
+        <a:font script="Mymr" typeface="Myanmar Text"/>
+        <a:font script="Nkoo" typeface="Ebrima"/>
+        <a:font script="Olck" typeface="Nirmala UI"/>
+        <a:font script="Osma" typeface="Ebrima"/>
+        <a:font script="Phag" typeface="Phagspa"/>
+        <a:font script="Syrn" typeface="Estrangelo Edessa"/>
+        <a:font script="Syrj" typeface="Estrangelo Edessa"/>
+        <a:font script="Syre" typeface="Estrangelo Edessa"/>
+        <a:font script="Sora" typeface="Nirmala UI"/>
+        <a:font script="Tale" typeface="Microsoft Tai Le"/>
+        <a:font script="Talu" typeface="Microsoft New Tai Lue"/>
+        <a:font script="Tfng" typeface="Ebrima"/>
+      </a:minorFont>
+    </a:fontScheme>
+    <a:fmtScheme name="Office">
+      <a:fillStyleLst>
+        <a:solidFill>
+          <a:schemeClr val="phClr"/>
+        </a:solidFill>
+        <a:gradFill rotWithShape="1">
+          <a:gsLst>
+            <a:gs pos="0">
+              <a:schemeClr val="phClr">
+                <a:lumMod val="110000"/>
+                <a:satMod val="105000"/>
+                <a:tint val="67000"/>
+              </a:schemeClr>
+            </a:gs>
+            <a:gs pos="50000">
+              <a:schemeClr val="phClr">
+                <a:lumMod val="105000"/>
+                <a:satMod val="103000"/>
+                <a:tint val="73000"/>
+              </a:schemeClr>
+            </a:gs>
+            <a:gs pos="100000">
+              <a:schemeClr val="phClr">
+                <a:lumMod val="105000"/>
+                <a:satMod val="109000"/>
+                <a:tint val="81000"/>
+              </a:schemeClr>
+            </a:gs>
+          </a:gsLst>
+          <a:lin ang="5400000" scaled="0"/>
+        </a:gradFill>
+        <a:gradFill rotWithShape="1">
+          <a:gsLst>
+            <a:gs pos="0">
+              <a:schemeClr val="phClr">
+                <a:satMod val="103000"/>
+                <a:lumMod val="102000"/>
+                <a:tint val="94000"/>
+              </a:schemeClr>
+            </a:gs>
+            <a:gs pos="50000">
+              <a:schemeClr val="phClr">
+                <a:satMod val="110000"/>
+                <a:lumMod val="100000"/>
+                <a:shade val="100000"/>
+              </a:schemeClr>
+            </a:gs>
+            <a:gs pos="100000">
+              <a:schemeClr val="phClr">
+                <a:lumMod val="99000"/>
+                <a:satMod val="120000"/>
+                <a:shade val="78000"/>
+              </a:schemeClr>
+            </a:gs>
+          </a:gsLst>
+          <a:lin ang="5400000" scaled="0"/>
+        </a:gradFill>
+      </a:fillStyleLst>
+      <a:lnStyleLst>
+        <a:ln w="6350" cap="flat" cmpd="sng" algn="ctr">
+          <a:solidFill>
+            <a:schemeClr val="phClr"/>
+          </a:solidFill>
+          <a:prstDash val="solid"/>
+          <a:miter lim="800000"/>
+        </a:ln>
+        <a:ln w="12700" cap="flat" cmpd="sng" algn="ctr">
+          <a:solidFill>
+            <a:schemeClr val="phClr"/>
+          </a:solidFill>
+          <a:prstDash val="solid"/>
+          <a:miter lim="800000"/>
+        </a:ln>
+        <a:ln w="19050" cap="flat" cmpd="sng" algn="ctr">
+          <a:solidFill>
+            <a:schemeClr val="phClr"/>
+          </a:solidFill>
+          <a:prstDash val="solid"/>
+          <a:miter lim="800000"/>
+        </a:ln>
+      </a:lnStyleLst>
+      <a:effectStyleLst>
+        <a:effectStyle>
+          <a:effectLst/>
+        </a:effectStyle>
+        <a:effectStyle>
+          <a:effectLst/>
+        </a:effectStyle>
+        <a:effectStyle>
+          <a:effectLst>
+            <a:outerShdw blurRad="57150" dist="19050" dir="5400000" algn="ctr" rotWithShape="0">
+              <a:srgbClr val="000000">
+                <a:alpha val="63000"/>
+              </a:srgbClr>
+            </a:outerShdw>
+          </a:effectLst>
+        </a:effectStyle>
+      </a:effectStyleLst>
+      <a:bgFillStyleLst>
+        <a:solidFill>
+          <a:schemeClr val="phClr"/>
+        </a:solidFill>
+        <a:solidFill>
+          <a:schemeClr val="phClr">
+            <a:tint val="95000"/>
+            <a:satMod val="170000"/>
+          </a:schemeClr>
+        </a:solidFill>
+        <a:gradFill rotWithShape="1">
+          <a:gsLst>
+            <a:gs pos="0">
+              <a:schemeClr val="phClr">
+                <a:tint val="93000"/>
+                <a:satMod val="150000"/>
+                <a:shade val="98000"/>
+                <a:lumMod val="102000"/>
+              </a:schemeClr>
+            </a:gs>
+            <a:gs pos="50000">
+              <a:schemeClr val="phClr">
+                <a:tint val="98000"/>
+                <a:satMod val="130000"/>
+                <a:shade val="90000"/>
+                <a:lumMod val="103000"/>
+              </a:schemeClr>
+            </a:gs>
+            <a:gs pos="100000">
+              <a:schemeClr val="phClr">
+                <a:shade val="63000"/>
+                <a:satMod val="120000"/>
+              </a:schemeClr>
+            </a:gs>
+          </a:gsLst>
+          <a:lin ang="5400000" scaled="0"/>
+        </a:gradFill>
+      </a:bgFillStyleLst>
+    </a:fmtScheme>
+  </a:themeElements>
+  <a:objectDefaults/>
+  <a:extraClrSchemeLst/>
+  <a:extLst>
+    <a:ext uri="{05A4C25C-085E-4340-85A3-A5531E510DB2}">
+      <thm15:themeFamily xmlns:thm15="http://schemas.microsoft.com/office/thememl/2012/main" name="Office Theme" id="{62F939B6-93AF-4DB8-9C6B-D6C7DFDC589F}" vid="{4A3C46E8-61CC-4603-A589-7422A47A8E4A}"/>
+    </a:ext>
+  </a:extLst>
+</a:theme>
 </file>
</xml_diff>

<commit_message>
Uploading completed powerpoint with all slides finished for presentation on Tuesday
</commit_message>
<xml_diff>
--- a/Project2_Presentation_Material.pptx
+++ b/Project2_Presentation_Material.pptx
@@ -203,7 +203,7 @@
           <a:p>
             <a:fld id="{A1193E1E-D135-CE4E-9329-B1D8AABA5A14}" type="datetimeFigureOut">
               <a:rPr lang="en-US" smtClean="0"/>
-              <a:t>1/11/20</a:t>
+              <a:t>1/13/2020</a:t>
             </a:fld>
             <a:endParaRPr lang="en-US"/>
           </a:p>
@@ -696,7 +696,7 @@
           <a:p>
             <a:fld id="{48A87A34-81AB-432B-8DAE-1953F412C126}" type="datetimeFigureOut">
               <a:rPr lang="en-US" dirty="0"/>
-              <a:t>1/11/20</a:t>
+              <a:t>1/13/2020</a:t>
             </a:fld>
             <a:endParaRPr lang="en-US" dirty="0"/>
           </a:p>
@@ -902,7 +902,7 @@
           <a:p>
             <a:fld id="{48A87A34-81AB-432B-8DAE-1953F412C126}" type="datetimeFigureOut">
               <a:rPr lang="en-US" dirty="0"/>
-              <a:t>1/11/20</a:t>
+              <a:t>1/13/2020</a:t>
             </a:fld>
             <a:endParaRPr lang="en-US" dirty="0"/>
           </a:p>
@@ -1112,7 +1112,7 @@
           <a:p>
             <a:fld id="{48A87A34-81AB-432B-8DAE-1953F412C126}" type="datetimeFigureOut">
               <a:rPr lang="en-US" dirty="0"/>
-              <a:t>1/11/20</a:t>
+              <a:t>1/13/2020</a:t>
             </a:fld>
             <a:endParaRPr lang="en-US" dirty="0"/>
           </a:p>
@@ -1308,7 +1308,7 @@
           <a:p>
             <a:fld id="{48A87A34-81AB-432B-8DAE-1953F412C126}" type="datetimeFigureOut">
               <a:rPr lang="en-US" dirty="0"/>
-              <a:t>1/11/20</a:t>
+              <a:t>1/13/2020</a:t>
             </a:fld>
             <a:endParaRPr lang="en-US" dirty="0"/>
           </a:p>
@@ -1582,7 +1582,7 @@
           <a:p>
             <a:fld id="{48A87A34-81AB-432B-8DAE-1953F412C126}" type="datetimeFigureOut">
               <a:rPr lang="en-US" dirty="0"/>
-              <a:t>1/11/20</a:t>
+              <a:t>1/13/2020</a:t>
             </a:fld>
             <a:endParaRPr lang="en-US" dirty="0"/>
           </a:p>
@@ -1845,7 +1845,7 @@
           <a:p>
             <a:fld id="{48A87A34-81AB-432B-8DAE-1953F412C126}" type="datetimeFigureOut">
               <a:rPr lang="en-US" dirty="0"/>
-              <a:t>1/11/20</a:t>
+              <a:t>1/13/2020</a:t>
             </a:fld>
             <a:endParaRPr lang="en-US" dirty="0"/>
           </a:p>
@@ -2256,7 +2256,7 @@
           <a:p>
             <a:fld id="{48A87A34-81AB-432B-8DAE-1953F412C126}" type="datetimeFigureOut">
               <a:rPr lang="en-US" dirty="0"/>
-              <a:t>1/11/20</a:t>
+              <a:t>1/13/2020</a:t>
             </a:fld>
             <a:endParaRPr lang="en-US" dirty="0"/>
           </a:p>
@@ -2400,7 +2400,7 @@
           <a:p>
             <a:fld id="{48A87A34-81AB-432B-8DAE-1953F412C126}" type="datetimeFigureOut">
               <a:rPr lang="en-US" dirty="0"/>
-              <a:t>1/11/20</a:t>
+              <a:t>1/13/2020</a:t>
             </a:fld>
             <a:endParaRPr lang="en-US" dirty="0"/>
           </a:p>
@@ -2521,7 +2521,7 @@
           <a:p>
             <a:fld id="{48A87A34-81AB-432B-8DAE-1953F412C126}" type="datetimeFigureOut">
               <a:rPr lang="en-US" dirty="0"/>
-              <a:t>1/11/20</a:t>
+              <a:t>1/13/2020</a:t>
             </a:fld>
             <a:endParaRPr lang="en-US" dirty="0"/>
           </a:p>
@@ -2767,7 +2767,7 @@
           <a:p>
             <a:fld id="{48A87A34-81AB-432B-8DAE-1953F412C126}" type="datetimeFigureOut">
               <a:rPr lang="en-US" dirty="0"/>
-              <a:t>1/11/20</a:t>
+              <a:t>1/13/2020</a:t>
             </a:fld>
             <a:endParaRPr lang="en-US" dirty="0"/>
           </a:p>
@@ -3208,7 +3208,7 @@
             <a:fld id="{48A87A34-81AB-432B-8DAE-1953F412C126}" type="datetimeFigureOut">
               <a:rPr lang="en-US" dirty="0"/>
               <a:pPr/>
-              <a:t>1/11/20</a:t>
+              <a:t>1/13/2020</a:t>
             </a:fld>
             <a:endParaRPr lang="en-US" dirty="0"/>
           </a:p>
@@ -3531,7 +3531,7 @@
             <a:fld id="{48A87A34-81AB-432B-8DAE-1953F412C126}" type="datetimeFigureOut">
               <a:rPr lang="en-US" dirty="0"/>
               <a:pPr/>
-              <a:t>1/11/20</a:t>
+              <a:t>1/13/2020</a:t>
             </a:fld>
             <a:endParaRPr lang="en-US" dirty="0"/>
           </a:p>
@@ -4594,6 +4594,18 @@
   <p:clrMapOvr>
     <a:masterClrMapping/>
   </p:clrMapOvr>
+  <mc:AlternateContent xmlns:mc="http://schemas.openxmlformats.org/markup-compatibility/2006">
+    <mc:Choice xmlns:p14="http://schemas.microsoft.com/office/powerpoint/2010/main" Requires="p14">
+      <p:transition spd="med" p14:dur="700">
+        <p:fade/>
+      </p:transition>
+    </mc:Choice>
+    <mc:Fallback>
+      <p:transition spd="med">
+        <p:fade/>
+      </p:transition>
+    </mc:Fallback>
+  </mc:AlternateContent>
 </p:sld>
 </file>
 
@@ -4946,6 +4958,18 @@
   <p:clrMapOvr>
     <a:masterClrMapping/>
   </p:clrMapOvr>
+  <mc:AlternateContent xmlns:mc="http://schemas.openxmlformats.org/markup-compatibility/2006">
+    <mc:Choice xmlns:p14="http://schemas.microsoft.com/office/powerpoint/2010/main" Requires="p14">
+      <p:transition spd="med" p14:dur="700">
+        <p:fade/>
+      </p:transition>
+    </mc:Choice>
+    <mc:Fallback>
+      <p:transition spd="med">
+        <p:fade/>
+      </p:transition>
+    </mc:Fallback>
+  </mc:AlternateContent>
 </p:sld>
 </file>
 
@@ -5048,6 +5072,18 @@
   <p:clrMapOvr>
     <a:masterClrMapping/>
   </p:clrMapOvr>
+  <mc:AlternateContent xmlns:mc="http://schemas.openxmlformats.org/markup-compatibility/2006">
+    <mc:Choice xmlns:p14="http://schemas.microsoft.com/office/powerpoint/2010/main" Requires="p14">
+      <p:transition spd="med" p14:dur="700">
+        <p:fade/>
+      </p:transition>
+    </mc:Choice>
+    <mc:Fallback>
+      <p:transition spd="med">
+        <p:fade/>
+      </p:transition>
+    </mc:Fallback>
+  </mc:AlternateContent>
 </p:sld>
 </file>
 
@@ -5165,6 +5201,18 @@
   <p:clrMapOvr>
     <a:masterClrMapping/>
   </p:clrMapOvr>
+  <mc:AlternateContent xmlns:mc="http://schemas.openxmlformats.org/markup-compatibility/2006">
+    <mc:Choice xmlns:p14="http://schemas.microsoft.com/office/powerpoint/2010/main" Requires="p14">
+      <p:transition spd="med" p14:dur="700">
+        <p:fade/>
+      </p:transition>
+    </mc:Choice>
+    <mc:Fallback>
+      <p:transition spd="med">
+        <p:fade/>
+      </p:transition>
+    </mc:Fallback>
+  </mc:AlternateContent>
 </p:sld>
 </file>
 
@@ -5217,6 +5265,356 @@
           </a:p>
         </p:txBody>
       </p:sp>
+      <p:grpSp>
+        <p:nvGrpSpPr>
+          <p:cNvPr id="3" name="Group 2">
+            <a:extLst>
+              <a:ext uri="{FF2B5EF4-FFF2-40B4-BE49-F238E27FC236}">
+                <a16:creationId xmlns:a16="http://schemas.microsoft.com/office/drawing/2014/main" id="{03A56B14-5CBE-4FC9-92BF-5AF2FBC4FC85}"/>
+              </a:ext>
+            </a:extLst>
+          </p:cNvPr>
+          <p:cNvGrpSpPr/>
+          <p:nvPr/>
+        </p:nvGrpSpPr>
+        <p:grpSpPr>
+          <a:xfrm>
+            <a:off x="6367899" y="2302048"/>
+            <a:ext cx="1822140" cy="1887530"/>
+            <a:chOff x="4765322" y="3263819"/>
+            <a:chExt cx="2661356" cy="2974328"/>
+          </a:xfrm>
+        </p:grpSpPr>
+        <p:pic>
+          <p:nvPicPr>
+            <p:cNvPr id="4" name="Picture 3">
+              <a:extLst>
+                <a:ext uri="{FF2B5EF4-FFF2-40B4-BE49-F238E27FC236}">
+                  <a16:creationId xmlns:a16="http://schemas.microsoft.com/office/drawing/2014/main" id="{3FB5F522-DD41-4A8F-AAB3-3969CC8542BB}"/>
+                </a:ext>
+              </a:extLst>
+            </p:cNvPr>
+            <p:cNvPicPr>
+              <a:picLocks noChangeAspect="1"/>
+            </p:cNvPicPr>
+            <p:nvPr/>
+          </p:nvPicPr>
+          <p:blipFill>
+            <a:blip r:embed="rId2"/>
+            <a:stretch>
+              <a:fillRect/>
+            </a:stretch>
+          </p:blipFill>
+          <p:spPr>
+            <a:xfrm>
+              <a:off x="4765322" y="3263819"/>
+              <a:ext cx="2661356" cy="2566308"/>
+            </a:xfrm>
+            <a:prstGeom prst="rect">
+              <a:avLst/>
+            </a:prstGeom>
+          </p:spPr>
+        </p:pic>
+        <p:sp>
+          <p:nvSpPr>
+            <p:cNvPr id="5" name="TextBox 4">
+              <a:extLst>
+                <a:ext uri="{FF2B5EF4-FFF2-40B4-BE49-F238E27FC236}">
+                  <a16:creationId xmlns:a16="http://schemas.microsoft.com/office/drawing/2014/main" id="{A23F9DC6-3B9B-446E-BECB-886D3FF7583E}"/>
+                </a:ext>
+              </a:extLst>
+            </p:cNvPr>
+            <p:cNvSpPr txBox="1"/>
+            <p:nvPr/>
+          </p:nvSpPr>
+          <p:spPr>
+            <a:xfrm>
+              <a:off x="4765322" y="5868815"/>
+              <a:ext cx="2661356" cy="369332"/>
+            </a:xfrm>
+            <a:prstGeom prst="rect">
+              <a:avLst/>
+            </a:prstGeom>
+            <a:noFill/>
+          </p:spPr>
+          <p:txBody>
+            <a:bodyPr wrap="square" rtlCol="0">
+              <a:spAutoFit/>
+            </a:bodyPr>
+            <a:lstStyle/>
+            <a:p>
+              <a:pPr algn="ctr"/>
+              <a:r>
+                <a:rPr lang="en-US" dirty="0"/>
+                <a:t>Cheerio</a:t>
+              </a:r>
+            </a:p>
+          </p:txBody>
+        </p:sp>
+      </p:grpSp>
+      <p:pic>
+        <p:nvPicPr>
+          <p:cNvPr id="6" name="Picture 5">
+            <a:extLst>
+              <a:ext uri="{FF2B5EF4-FFF2-40B4-BE49-F238E27FC236}">
+                <a16:creationId xmlns:a16="http://schemas.microsoft.com/office/drawing/2014/main" id="{FEEA7A9C-9EE7-4B2D-84EF-0EE5AF4F7DA4}"/>
+              </a:ext>
+            </a:extLst>
+          </p:cNvPr>
+          <p:cNvPicPr>
+            <a:picLocks noChangeAspect="1"/>
+          </p:cNvPicPr>
+          <p:nvPr/>
+        </p:nvPicPr>
+        <p:blipFill>
+          <a:blip r:embed="rId3"/>
+          <a:stretch>
+            <a:fillRect/>
+          </a:stretch>
+        </p:blipFill>
+        <p:spPr>
+          <a:xfrm>
+            <a:off x="1975211" y="2302048"/>
+            <a:ext cx="2478164" cy="1628596"/>
+          </a:xfrm>
+          <a:prstGeom prst="rect">
+            <a:avLst/>
+          </a:prstGeom>
+        </p:spPr>
+      </p:pic>
+      <p:sp>
+        <p:nvSpPr>
+          <p:cNvPr id="7" name="TextBox 6">
+            <a:extLst>
+              <a:ext uri="{FF2B5EF4-FFF2-40B4-BE49-F238E27FC236}">
+                <a16:creationId xmlns:a16="http://schemas.microsoft.com/office/drawing/2014/main" id="{0842D819-0426-4915-B247-2BB8AC8144AB}"/>
+              </a:ext>
+            </a:extLst>
+          </p:cNvPr>
+          <p:cNvSpPr txBox="1"/>
+          <p:nvPr/>
+        </p:nvSpPr>
+        <p:spPr>
+          <a:xfrm>
+            <a:off x="1975210" y="3930644"/>
+            <a:ext cx="2478164" cy="369332"/>
+          </a:xfrm>
+          <a:prstGeom prst="rect">
+            <a:avLst/>
+          </a:prstGeom>
+          <a:noFill/>
+        </p:spPr>
+        <p:txBody>
+          <a:bodyPr wrap="square" rtlCol="0">
+            <a:spAutoFit/>
+          </a:bodyPr>
+          <a:lstStyle/>
+          <a:p>
+            <a:pPr algn="ctr"/>
+            <a:r>
+              <a:rPr lang="en-US" dirty="0" err="1"/>
+              <a:t>JsonWebToken</a:t>
+            </a:r>
+            <a:endParaRPr lang="en-US" dirty="0"/>
+          </a:p>
+        </p:txBody>
+      </p:sp>
+      <p:pic>
+        <p:nvPicPr>
+          <p:cNvPr id="8" name="Picture 7">
+            <a:extLst>
+              <a:ext uri="{FF2B5EF4-FFF2-40B4-BE49-F238E27FC236}">
+                <a16:creationId xmlns:a16="http://schemas.microsoft.com/office/drawing/2014/main" id="{B0008EFA-5D0B-4BF7-9032-FF5D8D7B67A9}"/>
+              </a:ext>
+            </a:extLst>
+          </p:cNvPr>
+          <p:cNvPicPr>
+            <a:picLocks noChangeAspect="1"/>
+          </p:cNvPicPr>
+          <p:nvPr/>
+        </p:nvPicPr>
+        <p:blipFill>
+          <a:blip r:embed="rId4"/>
+          <a:stretch>
+            <a:fillRect/>
+          </a:stretch>
+        </p:blipFill>
+        <p:spPr>
+          <a:xfrm>
+            <a:off x="4453374" y="2298892"/>
+            <a:ext cx="1914526" cy="1628597"/>
+          </a:xfrm>
+          <a:prstGeom prst="rect">
+            <a:avLst/>
+          </a:prstGeom>
+        </p:spPr>
+      </p:pic>
+      <p:sp>
+        <p:nvSpPr>
+          <p:cNvPr id="9" name="TextBox 8">
+            <a:extLst>
+              <a:ext uri="{FF2B5EF4-FFF2-40B4-BE49-F238E27FC236}">
+                <a16:creationId xmlns:a16="http://schemas.microsoft.com/office/drawing/2014/main" id="{665DA1D6-FE9F-4B78-809A-F75DD4544F44}"/>
+              </a:ext>
+            </a:extLst>
+          </p:cNvPr>
+          <p:cNvSpPr txBox="1"/>
+          <p:nvPr/>
+        </p:nvSpPr>
+        <p:spPr>
+          <a:xfrm>
+            <a:off x="4453374" y="3928541"/>
+            <a:ext cx="1914526" cy="369332"/>
+          </a:xfrm>
+          <a:prstGeom prst="rect">
+            <a:avLst/>
+          </a:prstGeom>
+          <a:noFill/>
+        </p:spPr>
+        <p:txBody>
+          <a:bodyPr wrap="square" rtlCol="0">
+            <a:spAutoFit/>
+          </a:bodyPr>
+          <a:lstStyle/>
+          <a:p>
+            <a:pPr algn="ctr"/>
+            <a:r>
+              <a:rPr lang="en-US" dirty="0" err="1"/>
+              <a:t>BCrypt</a:t>
+            </a:r>
+            <a:endParaRPr lang="en-US" dirty="0"/>
+          </a:p>
+        </p:txBody>
+      </p:sp>
+      <p:grpSp>
+        <p:nvGrpSpPr>
+          <p:cNvPr id="10" name="Group 9">
+            <a:extLst>
+              <a:ext uri="{FF2B5EF4-FFF2-40B4-BE49-F238E27FC236}">
+                <a16:creationId xmlns:a16="http://schemas.microsoft.com/office/drawing/2014/main" id="{D860DE4F-AEEE-461A-9D51-D8BDD9794058}"/>
+              </a:ext>
+            </a:extLst>
+          </p:cNvPr>
+          <p:cNvGrpSpPr/>
+          <p:nvPr/>
+        </p:nvGrpSpPr>
+        <p:grpSpPr>
+          <a:xfrm>
+            <a:off x="8190037" y="2302048"/>
+            <a:ext cx="2079065" cy="1998107"/>
+            <a:chOff x="8206237" y="2537176"/>
+            <a:chExt cx="2079064" cy="1998107"/>
+          </a:xfrm>
+        </p:grpSpPr>
+        <p:pic>
+          <p:nvPicPr>
+            <p:cNvPr id="11" name="Picture 10">
+              <a:extLst>
+                <a:ext uri="{FF2B5EF4-FFF2-40B4-BE49-F238E27FC236}">
+                  <a16:creationId xmlns:a16="http://schemas.microsoft.com/office/drawing/2014/main" id="{2809337A-D277-4665-AB7F-C5782F33F36B}"/>
+                </a:ext>
+              </a:extLst>
+            </p:cNvPr>
+            <p:cNvPicPr>
+              <a:picLocks noChangeAspect="1"/>
+            </p:cNvPicPr>
+            <p:nvPr/>
+          </p:nvPicPr>
+          <p:blipFill>
+            <a:blip r:embed="rId5"/>
+            <a:stretch>
+              <a:fillRect/>
+            </a:stretch>
+          </p:blipFill>
+          <p:spPr>
+            <a:xfrm>
+              <a:off x="8206237" y="2537176"/>
+              <a:ext cx="2079064" cy="1628775"/>
+            </a:xfrm>
+            <a:prstGeom prst="rect">
+              <a:avLst/>
+            </a:prstGeom>
+          </p:spPr>
+        </p:pic>
+        <p:sp>
+          <p:nvSpPr>
+            <p:cNvPr id="12" name="TextBox 11">
+              <a:extLst>
+                <a:ext uri="{FF2B5EF4-FFF2-40B4-BE49-F238E27FC236}">
+                  <a16:creationId xmlns:a16="http://schemas.microsoft.com/office/drawing/2014/main" id="{E1ACDDC6-1E14-4123-90BF-A4228A4DA265}"/>
+                </a:ext>
+              </a:extLst>
+            </p:cNvPr>
+            <p:cNvSpPr txBox="1"/>
+            <p:nvPr/>
+          </p:nvSpPr>
+          <p:spPr>
+            <a:xfrm>
+              <a:off x="8206237" y="4165951"/>
+              <a:ext cx="2079064" cy="369332"/>
+            </a:xfrm>
+            <a:prstGeom prst="rect">
+              <a:avLst/>
+            </a:prstGeom>
+            <a:noFill/>
+          </p:spPr>
+          <p:txBody>
+            <a:bodyPr wrap="square" rtlCol="0">
+              <a:spAutoFit/>
+            </a:bodyPr>
+            <a:lstStyle/>
+            <a:p>
+              <a:pPr algn="ctr"/>
+              <a:r>
+                <a:rPr lang="en-US" dirty="0" err="1"/>
+                <a:t>DotEnv</a:t>
+              </a:r>
+              <a:endParaRPr lang="en-US" dirty="0"/>
+            </a:p>
+          </p:txBody>
+        </p:sp>
+      </p:grpSp>
+      <p:sp>
+        <p:nvSpPr>
+          <p:cNvPr id="13" name="TextBox 12">
+            <a:extLst>
+              <a:ext uri="{FF2B5EF4-FFF2-40B4-BE49-F238E27FC236}">
+                <a16:creationId xmlns:a16="http://schemas.microsoft.com/office/drawing/2014/main" id="{FBD785F9-42E5-47B4-9FF6-16B9ACBA6BBC}"/>
+              </a:ext>
+            </a:extLst>
+          </p:cNvPr>
+          <p:cNvSpPr txBox="1"/>
+          <p:nvPr/>
+        </p:nvSpPr>
+        <p:spPr>
+          <a:xfrm>
+            <a:off x="1949054" y="4819581"/>
+            <a:ext cx="8293892" cy="369332"/>
+          </a:xfrm>
+          <a:prstGeom prst="rect">
+            <a:avLst/>
+          </a:prstGeom>
+          <a:noFill/>
+        </p:spPr>
+        <p:txBody>
+          <a:bodyPr wrap="square" rtlCol="0">
+            <a:spAutoFit/>
+          </a:bodyPr>
+          <a:lstStyle/>
+          <a:p>
+            <a:pPr algn="ctr"/>
+            <a:r>
+              <a:rPr lang="en-US" dirty="0"/>
+              <a:t>CORS, Request and Cookie Parser </a:t>
+            </a:r>
+            <a:r>
+              <a:rPr lang="en-US" dirty="0" err="1"/>
+              <a:t>npm</a:t>
+            </a:r>
+            <a:endParaRPr lang="en-US" dirty="0"/>
+          </a:p>
+        </p:txBody>
+      </p:sp>
     </p:spTree>
     <p:extLst>
       <p:ext uri="{BB962C8B-B14F-4D97-AF65-F5344CB8AC3E}">
@@ -5227,6 +5625,18 @@
   <p:clrMapOvr>
     <a:masterClrMapping/>
   </p:clrMapOvr>
+  <mc:AlternateContent xmlns:mc="http://schemas.openxmlformats.org/markup-compatibility/2006">
+    <mc:Choice xmlns:p14="http://schemas.microsoft.com/office/powerpoint/2010/main" Requires="p14">
+      <p:transition spd="med" p14:dur="700">
+        <p:fade/>
+      </p:transition>
+    </mc:Choice>
+    <mc:Fallback>
+      <p:transition spd="med">
+        <p:fade/>
+      </p:transition>
+    </mc:Fallback>
+  </mc:AlternateContent>
 </p:sld>
 </file>
 
@@ -5285,6 +5695,18 @@
   <p:clrMapOvr>
     <a:masterClrMapping/>
   </p:clrMapOvr>
+  <mc:AlternateContent xmlns:mc="http://schemas.openxmlformats.org/markup-compatibility/2006">
+    <mc:Choice xmlns:p14="http://schemas.microsoft.com/office/powerpoint/2010/main" Requires="p14">
+      <p:transition spd="med" p14:dur="700">
+        <p:fade/>
+      </p:transition>
+    </mc:Choice>
+    <mc:Fallback>
+      <p:transition spd="med">
+        <p:fade/>
+      </p:transition>
+    </mc:Fallback>
+  </mc:AlternateContent>
 </p:sld>
 </file>
 
@@ -5343,6 +5765,18 @@
   <p:clrMapOvr>
     <a:masterClrMapping/>
   </p:clrMapOvr>
+  <mc:AlternateContent xmlns:mc="http://schemas.openxmlformats.org/markup-compatibility/2006">
+    <mc:Choice xmlns:p14="http://schemas.microsoft.com/office/powerpoint/2010/main" Requires="p14">
+      <p:transition spd="med" p14:dur="700">
+        <p:fade/>
+      </p:transition>
+    </mc:Choice>
+    <mc:Fallback>
+      <p:transition spd="med">
+        <p:fade/>
+      </p:transition>
+    </mc:Fallback>
+  </mc:AlternateContent>
 </p:sld>
 </file>
 

</xml_diff>

<commit_message>
Adding updated presentation with the correct slides
One note is that cheerio and .env was used for the project but were later replaced with handlebars and other technology. That is shown on the slide "new technology used"
</commit_message>
<xml_diff>
--- a/Project2_Presentation_Material.pptx
+++ b/Project2_Presentation_Material.pptx
@@ -5,16 +5,19 @@
     <p:sldMasterId id="2147483648" r:id="rId1"/>
   </p:sldMasterIdLst>
   <p:notesMasterIdLst>
-    <p:notesMasterId r:id="rId9"/>
+    <p:notesMasterId r:id="rId12"/>
   </p:notesMasterIdLst>
   <p:sldIdLst>
     <p:sldId id="256" r:id="rId2"/>
     <p:sldId id="258" r:id="rId3"/>
     <p:sldId id="259" r:id="rId4"/>
-    <p:sldId id="264" r:id="rId5"/>
-    <p:sldId id="260" r:id="rId6"/>
-    <p:sldId id="261" r:id="rId7"/>
-    <p:sldId id="263" r:id="rId8"/>
+    <p:sldId id="266" r:id="rId5"/>
+    <p:sldId id="265" r:id="rId6"/>
+    <p:sldId id="260" r:id="rId7"/>
+    <p:sldId id="267" r:id="rId8"/>
+    <p:sldId id="264" r:id="rId9"/>
+    <p:sldId id="261" r:id="rId10"/>
+    <p:sldId id="263" r:id="rId11"/>
   </p:sldIdLst>
   <p:sldSz cx="12192000" cy="6858000"/>
   <p:notesSz cx="6858000" cy="9144000"/>
@@ -203,7 +206,7 @@
           <a:p>
             <a:fld id="{A1193E1E-D135-CE4E-9329-B1D8AABA5A14}" type="datetimeFigureOut">
               <a:rPr lang="en-US" smtClean="0"/>
-              <a:t>1/13/2020</a:t>
+              <a:t>1/14/20</a:t>
             </a:fld>
             <a:endParaRPr lang="en-US"/>
           </a:p>
@@ -538,7 +541,7 @@
           <a:p>
             <a:fld id="{8E262D57-DFD1-A444-AE45-6E292DED6AC3}" type="slidenum">
               <a:rPr lang="en-US" smtClean="0"/>
-              <a:t>6</a:t>
+              <a:t>9</a:t>
             </a:fld>
             <a:endParaRPr lang="en-US"/>
           </a:p>
@@ -696,7 +699,7 @@
           <a:p>
             <a:fld id="{48A87A34-81AB-432B-8DAE-1953F412C126}" type="datetimeFigureOut">
               <a:rPr lang="en-US" dirty="0"/>
-              <a:t>1/13/2020</a:t>
+              <a:t>1/14/20</a:t>
             </a:fld>
             <a:endParaRPr lang="en-US" dirty="0"/>
           </a:p>
@@ -902,7 +905,7 @@
           <a:p>
             <a:fld id="{48A87A34-81AB-432B-8DAE-1953F412C126}" type="datetimeFigureOut">
               <a:rPr lang="en-US" dirty="0"/>
-              <a:t>1/13/2020</a:t>
+              <a:t>1/14/20</a:t>
             </a:fld>
             <a:endParaRPr lang="en-US" dirty="0"/>
           </a:p>
@@ -1112,7 +1115,7 @@
           <a:p>
             <a:fld id="{48A87A34-81AB-432B-8DAE-1953F412C126}" type="datetimeFigureOut">
               <a:rPr lang="en-US" dirty="0"/>
-              <a:t>1/13/2020</a:t>
+              <a:t>1/14/20</a:t>
             </a:fld>
             <a:endParaRPr lang="en-US" dirty="0"/>
           </a:p>
@@ -1308,7 +1311,7 @@
           <a:p>
             <a:fld id="{48A87A34-81AB-432B-8DAE-1953F412C126}" type="datetimeFigureOut">
               <a:rPr lang="en-US" dirty="0"/>
-              <a:t>1/13/2020</a:t>
+              <a:t>1/14/20</a:t>
             </a:fld>
             <a:endParaRPr lang="en-US" dirty="0"/>
           </a:p>
@@ -1582,7 +1585,7 @@
           <a:p>
             <a:fld id="{48A87A34-81AB-432B-8DAE-1953F412C126}" type="datetimeFigureOut">
               <a:rPr lang="en-US" dirty="0"/>
-              <a:t>1/13/2020</a:t>
+              <a:t>1/14/20</a:t>
             </a:fld>
             <a:endParaRPr lang="en-US" dirty="0"/>
           </a:p>
@@ -1845,7 +1848,7 @@
           <a:p>
             <a:fld id="{48A87A34-81AB-432B-8DAE-1953F412C126}" type="datetimeFigureOut">
               <a:rPr lang="en-US" dirty="0"/>
-              <a:t>1/13/2020</a:t>
+              <a:t>1/14/20</a:t>
             </a:fld>
             <a:endParaRPr lang="en-US" dirty="0"/>
           </a:p>
@@ -2256,7 +2259,7 @@
           <a:p>
             <a:fld id="{48A87A34-81AB-432B-8DAE-1953F412C126}" type="datetimeFigureOut">
               <a:rPr lang="en-US" dirty="0"/>
-              <a:t>1/13/2020</a:t>
+              <a:t>1/14/20</a:t>
             </a:fld>
             <a:endParaRPr lang="en-US" dirty="0"/>
           </a:p>
@@ -2400,7 +2403,7 @@
           <a:p>
             <a:fld id="{48A87A34-81AB-432B-8DAE-1953F412C126}" type="datetimeFigureOut">
               <a:rPr lang="en-US" dirty="0"/>
-              <a:t>1/13/2020</a:t>
+              <a:t>1/14/20</a:t>
             </a:fld>
             <a:endParaRPr lang="en-US" dirty="0"/>
           </a:p>
@@ -2521,7 +2524,7 @@
           <a:p>
             <a:fld id="{48A87A34-81AB-432B-8DAE-1953F412C126}" type="datetimeFigureOut">
               <a:rPr lang="en-US" dirty="0"/>
-              <a:t>1/13/2020</a:t>
+              <a:t>1/14/20</a:t>
             </a:fld>
             <a:endParaRPr lang="en-US" dirty="0"/>
           </a:p>
@@ -2767,7 +2770,7 @@
           <a:p>
             <a:fld id="{48A87A34-81AB-432B-8DAE-1953F412C126}" type="datetimeFigureOut">
               <a:rPr lang="en-US" dirty="0"/>
-              <a:t>1/13/2020</a:t>
+              <a:t>1/14/20</a:t>
             </a:fld>
             <a:endParaRPr lang="en-US" dirty="0"/>
           </a:p>
@@ -3208,7 +3211,7 @@
             <a:fld id="{48A87A34-81AB-432B-8DAE-1953F412C126}" type="datetimeFigureOut">
               <a:rPr lang="en-US" dirty="0"/>
               <a:pPr/>
-              <a:t>1/13/2020</a:t>
+              <a:t>1/14/20</a:t>
             </a:fld>
             <a:endParaRPr lang="en-US" dirty="0"/>
           </a:p>
@@ -3531,7 +3534,7 @@
             <a:fld id="{48A87A34-81AB-432B-8DAE-1953F412C126}" type="datetimeFigureOut">
               <a:rPr lang="en-US" dirty="0"/>
               <a:pPr/>
-              <a:t>1/13/2020</a:t>
+              <a:t>1/14/20</a:t>
             </a:fld>
             <a:endParaRPr lang="en-US" dirty="0"/>
           </a:p>
@@ -4594,13 +4597,83 @@
   <p:clrMapOvr>
     <a:masterClrMapping/>
   </p:clrMapOvr>
-  <mc:AlternateContent xmlns:mc="http://schemas.openxmlformats.org/markup-compatibility/2006">
-    <mc:Choice xmlns:p14="http://schemas.microsoft.com/office/powerpoint/2010/main" Requires="p14">
+  <mc:AlternateContent xmlns:mc="http://schemas.openxmlformats.org/markup-compatibility/2006" xmlns:p14="http://schemas.microsoft.com/office/powerpoint/2010/main">
+    <mc:Choice Requires="p14">
       <p:transition spd="med" p14:dur="700">
         <p:fade/>
       </p:transition>
     </mc:Choice>
-    <mc:Fallback>
+    <mc:Fallback xmlns="">
+      <p:transition spd="med">
+        <p:fade/>
+      </p:transition>
+    </mc:Fallback>
+  </mc:AlternateContent>
+</p:sld>
+</file>
+
+<file path=ppt/slides/slide10.xml><?xml version="1.0" encoding="utf-8"?>
+<p:sld xmlns:a="http://schemas.openxmlformats.org/drawingml/2006/main" xmlns:r="http://schemas.openxmlformats.org/officeDocument/2006/relationships" xmlns:p="http://schemas.openxmlformats.org/presentationml/2006/main">
+  <p:cSld>
+    <p:spTree>
+      <p:nvGrpSpPr>
+        <p:cNvPr id="1" name=""/>
+        <p:cNvGrpSpPr/>
+        <p:nvPr/>
+      </p:nvGrpSpPr>
+      <p:grpSpPr>
+        <a:xfrm>
+          <a:off x="0" y="0"/>
+          <a:ext cx="0" cy="0"/>
+          <a:chOff x="0" y="0"/>
+          <a:chExt cx="0" cy="0"/>
+        </a:xfrm>
+      </p:grpSpPr>
+      <p:sp>
+        <p:nvSpPr>
+          <p:cNvPr id="2" name="Title 1">
+            <a:extLst>
+              <a:ext uri="{FF2B5EF4-FFF2-40B4-BE49-F238E27FC236}">
+                <a16:creationId xmlns:a16="http://schemas.microsoft.com/office/drawing/2014/main" id="{C5D87C91-64CC-D44A-A664-F0F83EE35161}"/>
+              </a:ext>
+            </a:extLst>
+          </p:cNvPr>
+          <p:cNvSpPr>
+            <a:spLocks noGrp="1"/>
+          </p:cNvSpPr>
+          <p:nvPr>
+            <p:ph type="ctrTitle"/>
+          </p:nvPr>
+        </p:nvSpPr>
+        <p:spPr/>
+        <p:txBody>
+          <a:bodyPr/>
+          <a:lstStyle/>
+          <a:p>
+            <a:r>
+              <a:rPr lang="en-US" dirty="0"/>
+              <a:t>Questions?</a:t>
+            </a:r>
+          </a:p>
+        </p:txBody>
+      </p:sp>
+    </p:spTree>
+    <p:extLst>
+      <p:ext uri="{BB962C8B-B14F-4D97-AF65-F5344CB8AC3E}">
+        <p14:creationId xmlns:p14="http://schemas.microsoft.com/office/powerpoint/2010/main" val="4256489261"/>
+      </p:ext>
+    </p:extLst>
+  </p:cSld>
+  <p:clrMapOvr>
+    <a:masterClrMapping/>
+  </p:clrMapOvr>
+  <mc:AlternateContent xmlns:mc="http://schemas.openxmlformats.org/markup-compatibility/2006" xmlns:p14="http://schemas.microsoft.com/office/powerpoint/2010/main">
+    <mc:Choice Requires="p14">
+      <p:transition spd="med" p14:dur="700">
+        <p:fade/>
+      </p:transition>
+    </mc:Choice>
+    <mc:Fallback xmlns="">
       <p:transition spd="med">
         <p:fade/>
       </p:transition>
@@ -4958,13 +5031,13 @@
   <p:clrMapOvr>
     <a:masterClrMapping/>
   </p:clrMapOvr>
-  <mc:AlternateContent xmlns:mc="http://schemas.openxmlformats.org/markup-compatibility/2006">
-    <mc:Choice xmlns:p14="http://schemas.microsoft.com/office/powerpoint/2010/main" Requires="p14">
+  <mc:AlternateContent xmlns:mc="http://schemas.openxmlformats.org/markup-compatibility/2006" xmlns:p14="http://schemas.microsoft.com/office/powerpoint/2010/main">
+    <mc:Choice Requires="p14">
       <p:transition spd="med" p14:dur="700">
         <p:fade/>
       </p:transition>
     </mc:Choice>
-    <mc:Fallback>
+    <mc:Fallback xmlns="">
       <p:transition spd="med">
         <p:fade/>
       </p:transition>
@@ -5013,7 +5086,7 @@
           <a:p>
             <a:r>
               <a:rPr lang="en-US" dirty="0"/>
-              <a:t>proposal</a:t>
+              <a:t>Motivation </a:t>
             </a:r>
           </a:p>
         </p:txBody>
@@ -5041,23 +5114,17 @@
           </a:xfrm>
         </p:spPr>
         <p:txBody>
-          <a:bodyPr/>
-          <a:lstStyle/>
-          <a:p>
-            <a:pPr marL="0" indent="0">
+          <a:bodyPr>
+            <a:noAutofit/>
+          </a:bodyPr>
+          <a:lstStyle/>
+          <a:p>
+            <a:pPr marL="0" indent="0" algn="ctr">
               <a:buNone/>
             </a:pPr>
             <a:r>
-              <a:rPr lang="en-US" dirty="0"/>
-              <a:t>A crime lookup application that allows users to </a:t>
-            </a:r>
-            <a:r>
-              <a:rPr lang="en-US"/>
-              <a:t>search for crimes </a:t>
-            </a:r>
-            <a:r>
-              <a:rPr lang="en-US" dirty="0"/>
-              <a:t>that have occurred near their area</a:t>
+              <a:rPr lang="en-US" sz="3000" dirty="0"/>
+              <a:t>A crime lookup application that allows users to search for crimes that have occurred near their area. We found many websites with the functionality but were not mobile responsive or converted into an application</a:t>
             </a:r>
           </a:p>
         </p:txBody>
@@ -5072,13 +5139,13 @@
   <p:clrMapOvr>
     <a:masterClrMapping/>
   </p:clrMapOvr>
-  <mc:AlternateContent xmlns:mc="http://schemas.openxmlformats.org/markup-compatibility/2006">
-    <mc:Choice xmlns:p14="http://schemas.microsoft.com/office/powerpoint/2010/main" Requires="p14">
+  <mc:AlternateContent xmlns:mc="http://schemas.openxmlformats.org/markup-compatibility/2006" xmlns:p14="http://schemas.microsoft.com/office/powerpoint/2010/main">
+    <mc:Choice Requires="p14">
       <p:transition spd="med" p14:dur="700">
         <p:fade/>
       </p:transition>
     </mc:Choice>
-    <mc:Fallback>
+    <mc:Fallback xmlns="">
       <p:transition spd="med">
         <p:fade/>
       </p:transition>
@@ -5109,6 +5176,97 @@
           <p:cNvPr id="2" name="Title 1">
             <a:extLst>
               <a:ext uri="{FF2B5EF4-FFF2-40B4-BE49-F238E27FC236}">
+                <a16:creationId xmlns:a16="http://schemas.microsoft.com/office/drawing/2014/main" id="{55E3BB2A-074D-6C42-B739-685CBCAA6F24}"/>
+              </a:ext>
+            </a:extLst>
+          </p:cNvPr>
+          <p:cNvSpPr>
+            <a:spLocks noGrp="1"/>
+          </p:cNvSpPr>
+          <p:nvPr>
+            <p:ph type="title"/>
+          </p:nvPr>
+        </p:nvSpPr>
+        <p:spPr/>
+        <p:txBody>
+          <a:bodyPr/>
+          <a:lstStyle/>
+          <a:p>
+            <a:r>
+              <a:rPr lang="en-US" dirty="0"/>
+              <a:t>End result	</a:t>
+            </a:r>
+          </a:p>
+        </p:txBody>
+      </p:sp>
+      <p:sp>
+        <p:nvSpPr>
+          <p:cNvPr id="3" name="Content Placeholder 2">
+            <a:extLst>
+              <a:ext uri="{FF2B5EF4-FFF2-40B4-BE49-F238E27FC236}">
+                <a16:creationId xmlns:a16="http://schemas.microsoft.com/office/drawing/2014/main" id="{047D8CB9-FDF5-2F41-AB79-A324AB0047FA}"/>
+              </a:ext>
+            </a:extLst>
+          </p:cNvPr>
+          <p:cNvSpPr>
+            <a:spLocks noGrp="1"/>
+          </p:cNvSpPr>
+          <p:nvPr>
+            <p:ph idx="1"/>
+          </p:nvPr>
+        </p:nvSpPr>
+        <p:spPr/>
+        <p:txBody>
+          <a:bodyPr>
+            <a:normAutofit/>
+          </a:bodyPr>
+          <a:lstStyle/>
+          <a:p>
+            <a:pPr marL="0" indent="0" algn="ctr">
+              <a:buNone/>
+            </a:pPr>
+            <a:r>
+              <a:rPr lang="en-US" sz="3600" dirty="0"/>
+              <a:t>A mobile responsive application that allows users to see crimes in their immediate area</a:t>
+            </a:r>
+          </a:p>
+        </p:txBody>
+      </p:sp>
+    </p:spTree>
+    <p:extLst>
+      <p:ext uri="{BB962C8B-B14F-4D97-AF65-F5344CB8AC3E}">
+        <p14:creationId xmlns:p14="http://schemas.microsoft.com/office/powerpoint/2010/main" val="2457109653"/>
+      </p:ext>
+    </p:extLst>
+  </p:cSld>
+  <p:clrMapOvr>
+    <a:masterClrMapping/>
+  </p:clrMapOvr>
+</p:sld>
+</file>
+
+<file path=ppt/slides/slide5.xml><?xml version="1.0" encoding="utf-8"?>
+<p:sld xmlns:a="http://schemas.openxmlformats.org/drawingml/2006/main" xmlns:r="http://schemas.openxmlformats.org/officeDocument/2006/relationships" xmlns:p="http://schemas.openxmlformats.org/presentationml/2006/main">
+  <p:cSld>
+    <p:spTree>
+      <p:nvGrpSpPr>
+        <p:cNvPr id="1" name=""/>
+        <p:cNvGrpSpPr/>
+        <p:nvPr/>
+      </p:nvGrpSpPr>
+      <p:grpSpPr>
+        <a:xfrm>
+          <a:off x="0" y="0"/>
+          <a:ext cx="0" cy="0"/>
+          <a:chOff x="0" y="0"/>
+          <a:chExt cx="0" cy="0"/>
+        </a:xfrm>
+      </p:grpSpPr>
+      <p:sp>
+        <p:nvSpPr>
+          <p:cNvPr id="2" name="Title 1">
+            <a:extLst>
+              <a:ext uri="{FF2B5EF4-FFF2-40B4-BE49-F238E27FC236}">
                 <a16:creationId xmlns:a16="http://schemas.microsoft.com/office/drawing/2014/main" id="{B3D7FB5C-4310-954C-9EF8-BE836080327B}"/>
               </a:ext>
             </a:extLst>
@@ -5127,7 +5285,7 @@
           <a:p>
             <a:r>
               <a:rPr lang="en-US" dirty="0"/>
-              <a:t>Future enhancements</a:t>
+              <a:t>Individual responsibilities</a:t>
             </a:r>
           </a:p>
         </p:txBody>
@@ -5148,66 +5306,69 @@
             <p:ph idx="1"/>
           </p:nvPr>
         </p:nvSpPr>
-        <p:spPr/>
-        <p:txBody>
-          <a:bodyPr/>
-          <a:lstStyle/>
-          <a:p>
+        <p:spPr>
+          <a:xfrm>
+            <a:off x="1451578" y="2203775"/>
+            <a:ext cx="9603275" cy="4016916"/>
+          </a:xfrm>
+        </p:spPr>
+        <p:txBody>
+          <a:bodyPr>
+            <a:normAutofit/>
+          </a:bodyPr>
+          <a:lstStyle/>
+          <a:p>
+            <a:pPr marL="0" indent="0">
+              <a:buNone/>
+            </a:pPr>
             <a:r>
               <a:rPr lang="en-US" dirty="0"/>
-              <a:t>Be able to access crime information real-time so viewers could see crimes</a:t>
+              <a:t>Mike </a:t>
             </a:r>
           </a:p>
           <a:p>
             <a:r>
               <a:rPr lang="en-US" dirty="0"/>
-              <a:t>Add more security protocols surrounding API-keys and a person’s </a:t>
-            </a:r>
-            <a:r>
-              <a:rPr lang="en-US" dirty="0" err="1"/>
-              <a:t>mysql</a:t>
-            </a:r>
+              <a:t>Worked primarily on the backend and some front-end functionality with regards to social media</a:t>
+            </a:r>
+          </a:p>
+          <a:p>
+            <a:pPr marL="0" indent="0">
+              <a:buNone/>
+            </a:pPr>
             <a:r>
               <a:rPr lang="en-US" dirty="0"/>
-              <a:t> credentials to ensure that if someone accidentally commits their credentials they are protected from malicious use </a:t>
+              <a:t>Mark, Anthony and Jessica</a:t>
             </a:r>
           </a:p>
           <a:p>
             <a:r>
               <a:rPr lang="en-US" dirty="0"/>
-              <a:t>Adding ways to communicate with local law enforcement, emergency services, </a:t>
-            </a:r>
-            <a:r>
-              <a:rPr lang="en-US" dirty="0" err="1"/>
-              <a:t>etc</a:t>
-            </a:r>
+              <a:t>Focused primarily on implementing the User interface and drafting up the presentation materials</a:t>
+            </a:r>
+          </a:p>
+          <a:p>
             <a:endParaRPr lang="en-US" dirty="0"/>
-          </a:p>
-          <a:p>
-            <a:r>
-              <a:rPr lang="en-US" dirty="0"/>
-              <a:t>Adding social media profiles and potential login to application via social media </a:t>
-            </a:r>
           </a:p>
         </p:txBody>
       </p:sp>
     </p:spTree>
     <p:extLst>
       <p:ext uri="{BB962C8B-B14F-4D97-AF65-F5344CB8AC3E}">
-        <p14:creationId xmlns:p14="http://schemas.microsoft.com/office/powerpoint/2010/main" val="4174293239"/>
+        <p14:creationId xmlns:p14="http://schemas.microsoft.com/office/powerpoint/2010/main" val="3487008802"/>
       </p:ext>
     </p:extLst>
   </p:cSld>
   <p:clrMapOvr>
     <a:masterClrMapping/>
   </p:clrMapOvr>
-  <mc:AlternateContent xmlns:mc="http://schemas.openxmlformats.org/markup-compatibility/2006">
-    <mc:Choice xmlns:p14="http://schemas.microsoft.com/office/powerpoint/2010/main" Requires="p14">
+  <mc:AlternateContent xmlns:mc="http://schemas.openxmlformats.org/markup-compatibility/2006" xmlns:p14="http://schemas.microsoft.com/office/powerpoint/2010/main">
+    <mc:Choice Requires="p14">
       <p:transition spd="med" p14:dur="700">
         <p:fade/>
       </p:transition>
     </mc:Choice>
-    <mc:Fallback>
+    <mc:Fallback xmlns="">
       <p:transition spd="med">
         <p:fade/>
       </p:transition>
@@ -5216,7 +5377,7 @@
 </p:sld>
 </file>
 
-<file path=ppt/slides/slide5.xml><?xml version="1.0" encoding="utf-8"?>
+<file path=ppt/slides/slide6.xml><?xml version="1.0" encoding="utf-8"?>
 <p:sld xmlns:a="http://schemas.openxmlformats.org/drawingml/2006/main" xmlns:r="http://schemas.openxmlformats.org/officeDocument/2006/relationships" xmlns:p="http://schemas.openxmlformats.org/presentationml/2006/main">
   <p:cSld>
     <p:spTree>
@@ -5605,7 +5766,7 @@
             <a:pPr algn="ctr"/>
             <a:r>
               <a:rPr lang="en-US" dirty="0"/>
-              <a:t>CORS, Request and Cookie Parser </a:t>
+              <a:t>Photoshop, handlebars, CORS, Request and Cookie Parser </a:t>
             </a:r>
             <a:r>
               <a:rPr lang="en-US" dirty="0" err="1"/>
@@ -5625,83 +5786,13 @@
   <p:clrMapOvr>
     <a:masterClrMapping/>
   </p:clrMapOvr>
-  <mc:AlternateContent xmlns:mc="http://schemas.openxmlformats.org/markup-compatibility/2006">
-    <mc:Choice xmlns:p14="http://schemas.microsoft.com/office/powerpoint/2010/main" Requires="p14">
+  <mc:AlternateContent xmlns:mc="http://schemas.openxmlformats.org/markup-compatibility/2006" xmlns:p14="http://schemas.microsoft.com/office/powerpoint/2010/main">
+    <mc:Choice Requires="p14">
       <p:transition spd="med" p14:dur="700">
         <p:fade/>
       </p:transition>
     </mc:Choice>
-    <mc:Fallback>
-      <p:transition spd="med">
-        <p:fade/>
-      </p:transition>
-    </mc:Fallback>
-  </mc:AlternateContent>
-</p:sld>
-</file>
-
-<file path=ppt/slides/slide6.xml><?xml version="1.0" encoding="utf-8"?>
-<p:sld xmlns:a="http://schemas.openxmlformats.org/drawingml/2006/main" xmlns:r="http://schemas.openxmlformats.org/officeDocument/2006/relationships" xmlns:p="http://schemas.openxmlformats.org/presentationml/2006/main">
-  <p:cSld>
-    <p:spTree>
-      <p:nvGrpSpPr>
-        <p:cNvPr id="1" name=""/>
-        <p:cNvGrpSpPr/>
-        <p:nvPr/>
-      </p:nvGrpSpPr>
-      <p:grpSpPr>
-        <a:xfrm>
-          <a:off x="0" y="0"/>
-          <a:ext cx="0" cy="0"/>
-          <a:chOff x="0" y="0"/>
-          <a:chExt cx="0" cy="0"/>
-        </a:xfrm>
-      </p:grpSpPr>
-      <p:sp>
-        <p:nvSpPr>
-          <p:cNvPr id="2" name="Title 1">
-            <a:extLst>
-              <a:ext uri="{FF2B5EF4-FFF2-40B4-BE49-F238E27FC236}">
-                <a16:creationId xmlns:a16="http://schemas.microsoft.com/office/drawing/2014/main" id="{C5D87C91-64CC-D44A-A664-F0F83EE35161}"/>
-              </a:ext>
-            </a:extLst>
-          </p:cNvPr>
-          <p:cNvSpPr>
-            <a:spLocks noGrp="1"/>
-          </p:cNvSpPr>
-          <p:nvPr>
-            <p:ph type="ctrTitle"/>
-          </p:nvPr>
-        </p:nvSpPr>
-        <p:spPr/>
-        <p:txBody>
-          <a:bodyPr/>
-          <a:lstStyle/>
-          <a:p>
-            <a:r>
-              <a:rPr lang="en-US" dirty="0"/>
-              <a:t>System demo</a:t>
-            </a:r>
-          </a:p>
-        </p:txBody>
-      </p:sp>
-    </p:spTree>
-    <p:extLst>
-      <p:ext uri="{BB962C8B-B14F-4D97-AF65-F5344CB8AC3E}">
-        <p14:creationId xmlns:p14="http://schemas.microsoft.com/office/powerpoint/2010/main" val="4128864021"/>
-      </p:ext>
-    </p:extLst>
-  </p:cSld>
-  <p:clrMapOvr>
-    <a:masterClrMapping/>
-  </p:clrMapOvr>
-  <mc:AlternateContent xmlns:mc="http://schemas.openxmlformats.org/markup-compatibility/2006">
-    <mc:Choice xmlns:p14="http://schemas.microsoft.com/office/powerpoint/2010/main" Requires="p14">
-      <p:transition spd="med" p14:dur="700">
-        <p:fade/>
-      </p:transition>
-    </mc:Choice>
-    <mc:Fallback>
+    <mc:Fallback xmlns="">
       <p:transition spd="med">
         <p:fade/>
       </p:transition>
@@ -5732,7 +5823,7 @@
           <p:cNvPr id="2" name="Title 1">
             <a:extLst>
               <a:ext uri="{FF2B5EF4-FFF2-40B4-BE49-F238E27FC236}">
-                <a16:creationId xmlns:a16="http://schemas.microsoft.com/office/drawing/2014/main" id="{C5D87C91-64CC-D44A-A664-F0F83EE35161}"/>
+                <a16:creationId xmlns:a16="http://schemas.microsoft.com/office/drawing/2014/main" id="{B3D7FB5C-4310-954C-9EF8-BE836080327B}"/>
               </a:ext>
             </a:extLst>
           </p:cNvPr>
@@ -5740,7 +5831,7 @@
             <a:spLocks noGrp="1"/>
           </p:cNvSpPr>
           <p:nvPr>
-            <p:ph type="ctrTitle"/>
+            <p:ph type="title"/>
           </p:nvPr>
         </p:nvSpPr>
         <p:spPr/>
@@ -5750,28 +5841,285 @@
           <a:p>
             <a:r>
               <a:rPr lang="en-US" dirty="0"/>
-              <a:t>Questions?</a:t>
-            </a:r>
+              <a:t>challenges</a:t>
+            </a:r>
+          </a:p>
+        </p:txBody>
+      </p:sp>
+      <p:sp>
+        <p:nvSpPr>
+          <p:cNvPr id="3" name="Content Placeholder 2">
+            <a:extLst>
+              <a:ext uri="{FF2B5EF4-FFF2-40B4-BE49-F238E27FC236}">
+                <a16:creationId xmlns:a16="http://schemas.microsoft.com/office/drawing/2014/main" id="{BB81AC18-2F7E-7D40-B080-42E6AF6AF522}"/>
+              </a:ext>
+            </a:extLst>
+          </p:cNvPr>
+          <p:cNvSpPr>
+            <a:spLocks noGrp="1"/>
+          </p:cNvSpPr>
+          <p:nvPr>
+            <p:ph idx="1"/>
+          </p:nvPr>
+        </p:nvSpPr>
+        <p:spPr>
+          <a:xfrm>
+            <a:off x="1451578" y="3318163"/>
+            <a:ext cx="9603275" cy="1426116"/>
+          </a:xfrm>
+        </p:spPr>
+        <p:txBody>
+          <a:bodyPr>
+            <a:normAutofit/>
+          </a:bodyPr>
+          <a:lstStyle/>
+          <a:p>
+            <a:pPr marL="0" indent="0" algn="ctr">
+              <a:buNone/>
+            </a:pPr>
+            <a:r>
+              <a:rPr lang="en-US" sz="3200" dirty="0"/>
+              <a:t>Main issue that we had was getting the </a:t>
+            </a:r>
+            <a:r>
+              <a:rPr lang="en-US" sz="3200" dirty="0" err="1"/>
+              <a:t>spotcrime</a:t>
+            </a:r>
+            <a:r>
+              <a:rPr lang="en-US" sz="3200" dirty="0"/>
+              <a:t> </a:t>
+            </a:r>
+            <a:r>
+              <a:rPr lang="en-US" sz="3200" dirty="0" err="1"/>
+              <a:t>api</a:t>
+            </a:r>
+            <a:r>
+              <a:rPr lang="en-US" sz="3200" dirty="0"/>
+              <a:t> to work with Heroku</a:t>
+            </a:r>
+          </a:p>
+          <a:p>
+            <a:pPr algn="ctr"/>
+            <a:endParaRPr lang="en-US" sz="3200" dirty="0"/>
           </a:p>
         </p:txBody>
       </p:sp>
     </p:spTree>
     <p:extLst>
       <p:ext uri="{BB962C8B-B14F-4D97-AF65-F5344CB8AC3E}">
-        <p14:creationId xmlns:p14="http://schemas.microsoft.com/office/powerpoint/2010/main" val="4256489261"/>
+        <p14:creationId xmlns:p14="http://schemas.microsoft.com/office/powerpoint/2010/main" val="2164757299"/>
       </p:ext>
     </p:extLst>
   </p:cSld>
   <p:clrMapOvr>
     <a:masterClrMapping/>
   </p:clrMapOvr>
-  <mc:AlternateContent xmlns:mc="http://schemas.openxmlformats.org/markup-compatibility/2006">
-    <mc:Choice xmlns:p14="http://schemas.microsoft.com/office/powerpoint/2010/main" Requires="p14">
+  <mc:AlternateContent xmlns:mc="http://schemas.openxmlformats.org/markup-compatibility/2006" xmlns:p14="http://schemas.microsoft.com/office/powerpoint/2010/main">
+    <mc:Choice Requires="p14">
       <p:transition spd="med" p14:dur="700">
         <p:fade/>
       </p:transition>
     </mc:Choice>
-    <mc:Fallback>
+    <mc:Fallback xmlns="">
+      <p:transition spd="med">
+        <p:fade/>
+      </p:transition>
+    </mc:Fallback>
+  </mc:AlternateContent>
+</p:sld>
+</file>
+
+<file path=ppt/slides/slide8.xml><?xml version="1.0" encoding="utf-8"?>
+<p:sld xmlns:a="http://schemas.openxmlformats.org/drawingml/2006/main" xmlns:r="http://schemas.openxmlformats.org/officeDocument/2006/relationships" xmlns:p="http://schemas.openxmlformats.org/presentationml/2006/main">
+  <p:cSld>
+    <p:spTree>
+      <p:nvGrpSpPr>
+        <p:cNvPr id="1" name=""/>
+        <p:cNvGrpSpPr/>
+        <p:nvPr/>
+      </p:nvGrpSpPr>
+      <p:grpSpPr>
+        <a:xfrm>
+          <a:off x="0" y="0"/>
+          <a:ext cx="0" cy="0"/>
+          <a:chOff x="0" y="0"/>
+          <a:chExt cx="0" cy="0"/>
+        </a:xfrm>
+      </p:grpSpPr>
+      <p:sp>
+        <p:nvSpPr>
+          <p:cNvPr id="2" name="Title 1">
+            <a:extLst>
+              <a:ext uri="{FF2B5EF4-FFF2-40B4-BE49-F238E27FC236}">
+                <a16:creationId xmlns:a16="http://schemas.microsoft.com/office/drawing/2014/main" id="{B3D7FB5C-4310-954C-9EF8-BE836080327B}"/>
+              </a:ext>
+            </a:extLst>
+          </p:cNvPr>
+          <p:cNvSpPr>
+            <a:spLocks noGrp="1"/>
+          </p:cNvSpPr>
+          <p:nvPr>
+            <p:ph type="title"/>
+          </p:nvPr>
+        </p:nvSpPr>
+        <p:spPr/>
+        <p:txBody>
+          <a:bodyPr/>
+          <a:lstStyle/>
+          <a:p>
+            <a:r>
+              <a:rPr lang="en-US" dirty="0"/>
+              <a:t>Improvements</a:t>
+            </a:r>
+          </a:p>
+        </p:txBody>
+      </p:sp>
+      <p:sp>
+        <p:nvSpPr>
+          <p:cNvPr id="3" name="Content Placeholder 2">
+            <a:extLst>
+              <a:ext uri="{FF2B5EF4-FFF2-40B4-BE49-F238E27FC236}">
+                <a16:creationId xmlns:a16="http://schemas.microsoft.com/office/drawing/2014/main" id="{BB81AC18-2F7E-7D40-B080-42E6AF6AF522}"/>
+              </a:ext>
+            </a:extLst>
+          </p:cNvPr>
+          <p:cNvSpPr>
+            <a:spLocks noGrp="1"/>
+          </p:cNvSpPr>
+          <p:nvPr>
+            <p:ph idx="1"/>
+          </p:nvPr>
+        </p:nvSpPr>
+        <p:spPr/>
+        <p:txBody>
+          <a:bodyPr/>
+          <a:lstStyle/>
+          <a:p>
+            <a:r>
+              <a:rPr lang="en-US" dirty="0"/>
+              <a:t>Be able to access crime information real-time so viewers could see crimes</a:t>
+            </a:r>
+          </a:p>
+          <a:p>
+            <a:r>
+              <a:rPr lang="en-US" dirty="0"/>
+              <a:t>Add more security protocols surrounding API-keys and a person’s </a:t>
+            </a:r>
+            <a:r>
+              <a:rPr lang="en-US" dirty="0" err="1"/>
+              <a:t>mysql</a:t>
+            </a:r>
+            <a:r>
+              <a:rPr lang="en-US" dirty="0"/>
+              <a:t> credentials to ensure that if someone accidentally commits their credentials they are protected from malicious use </a:t>
+            </a:r>
+          </a:p>
+          <a:p>
+            <a:r>
+              <a:rPr lang="en-US" dirty="0"/>
+              <a:t>Adding ways to communicate with local law enforcement, emergency services, </a:t>
+            </a:r>
+            <a:r>
+              <a:rPr lang="en-US" dirty="0" err="1"/>
+              <a:t>etc</a:t>
+            </a:r>
+            <a:endParaRPr lang="en-US" dirty="0"/>
+          </a:p>
+          <a:p>
+            <a:r>
+              <a:rPr lang="en-US" dirty="0"/>
+              <a:t>Adding social media profiles and potential login to application via social media </a:t>
+            </a:r>
+          </a:p>
+        </p:txBody>
+      </p:sp>
+    </p:spTree>
+    <p:extLst>
+      <p:ext uri="{BB962C8B-B14F-4D97-AF65-F5344CB8AC3E}">
+        <p14:creationId xmlns:p14="http://schemas.microsoft.com/office/powerpoint/2010/main" val="4174293239"/>
+      </p:ext>
+    </p:extLst>
+  </p:cSld>
+  <p:clrMapOvr>
+    <a:masterClrMapping/>
+  </p:clrMapOvr>
+  <mc:AlternateContent xmlns:mc="http://schemas.openxmlformats.org/markup-compatibility/2006" xmlns:p14="http://schemas.microsoft.com/office/powerpoint/2010/main">
+    <mc:Choice Requires="p14">
+      <p:transition spd="med" p14:dur="700">
+        <p:fade/>
+      </p:transition>
+    </mc:Choice>
+    <mc:Fallback xmlns="">
+      <p:transition spd="med">
+        <p:fade/>
+      </p:transition>
+    </mc:Fallback>
+  </mc:AlternateContent>
+</p:sld>
+</file>
+
+<file path=ppt/slides/slide9.xml><?xml version="1.0" encoding="utf-8"?>
+<p:sld xmlns:a="http://schemas.openxmlformats.org/drawingml/2006/main" xmlns:r="http://schemas.openxmlformats.org/officeDocument/2006/relationships" xmlns:p="http://schemas.openxmlformats.org/presentationml/2006/main">
+  <p:cSld>
+    <p:spTree>
+      <p:nvGrpSpPr>
+        <p:cNvPr id="1" name=""/>
+        <p:cNvGrpSpPr/>
+        <p:nvPr/>
+      </p:nvGrpSpPr>
+      <p:grpSpPr>
+        <a:xfrm>
+          <a:off x="0" y="0"/>
+          <a:ext cx="0" cy="0"/>
+          <a:chOff x="0" y="0"/>
+          <a:chExt cx="0" cy="0"/>
+        </a:xfrm>
+      </p:grpSpPr>
+      <p:sp>
+        <p:nvSpPr>
+          <p:cNvPr id="2" name="Title 1">
+            <a:extLst>
+              <a:ext uri="{FF2B5EF4-FFF2-40B4-BE49-F238E27FC236}">
+                <a16:creationId xmlns:a16="http://schemas.microsoft.com/office/drawing/2014/main" id="{C5D87C91-64CC-D44A-A664-F0F83EE35161}"/>
+              </a:ext>
+            </a:extLst>
+          </p:cNvPr>
+          <p:cNvSpPr>
+            <a:spLocks noGrp="1"/>
+          </p:cNvSpPr>
+          <p:nvPr>
+            <p:ph type="ctrTitle"/>
+          </p:nvPr>
+        </p:nvSpPr>
+        <p:spPr/>
+        <p:txBody>
+          <a:bodyPr/>
+          <a:lstStyle/>
+          <a:p>
+            <a:r>
+              <a:rPr lang="en-US" dirty="0"/>
+              <a:t>System demo</a:t>
+            </a:r>
+          </a:p>
+        </p:txBody>
+      </p:sp>
+    </p:spTree>
+    <p:extLst>
+      <p:ext uri="{BB962C8B-B14F-4D97-AF65-F5344CB8AC3E}">
+        <p14:creationId xmlns:p14="http://schemas.microsoft.com/office/powerpoint/2010/main" val="4128864021"/>
+      </p:ext>
+    </p:extLst>
+  </p:cSld>
+  <p:clrMapOvr>
+    <a:masterClrMapping/>
+  </p:clrMapOvr>
+  <mc:AlternateContent xmlns:mc="http://schemas.openxmlformats.org/markup-compatibility/2006" xmlns:p14="http://schemas.microsoft.com/office/powerpoint/2010/main">
+    <mc:Choice Requires="p14">
+      <p:transition spd="med" p14:dur="700">
+        <p:fade/>
+      </p:transition>
+    </mc:Choice>
+    <mc:Fallback xmlns="">
       <p:transition spd="med">
         <p:fade/>
       </p:transition>

</xml_diff>